<commit_message>
xaddapprox updates to Sections 1,2 and intro figures
</commit_message>
<xml_diff>
--- a/docs/papers/xaddapprox/Figures/xadds/intro_diagram.pptx
+++ b/docs/papers/xaddapprox/Figures/xadds/intro_diagram.pptx
@@ -3095,1866 +3095,2094 @@
           <a:chExt cx="0" cy="0"/>
         </a:xfrm>
       </p:grpSpPr>
-      <p:cxnSp>
-        <p:nvCxnSpPr>
-          <p:cNvPr id="5" name="Straight Connector 4"/>
-          <p:cNvCxnSpPr/>
+      <p:grpSp>
+        <p:nvGrpSpPr>
+          <p:cNvPr id="194" name="Group 193"/>
+          <p:cNvGrpSpPr/>
           <p:nvPr/>
-        </p:nvCxnSpPr>
-        <p:spPr>
+        </p:nvGrpSpPr>
+        <p:grpSpPr>
           <a:xfrm>
-            <a:off x="682834" y="260867"/>
-            <a:ext cx="0" cy="914400"/>
+            <a:off x="76200" y="73223"/>
+            <a:ext cx="4114800" cy="3018710"/>
+            <a:chOff x="-76200" y="73223"/>
+            <a:chExt cx="4114800" cy="3018710"/>
           </a:xfrm>
-          <a:prstGeom prst="line">
-            <a:avLst/>
-          </a:prstGeom>
-          <a:ln w="31750"/>
-        </p:spPr>
-        <p:style>
-          <a:lnRef idx="1">
-            <a:schemeClr val="accent1"/>
-          </a:lnRef>
-          <a:fillRef idx="0">
-            <a:schemeClr val="accent1"/>
-          </a:fillRef>
-          <a:effectRef idx="0">
-            <a:schemeClr val="accent1"/>
-          </a:effectRef>
-          <a:fontRef idx="minor">
-            <a:schemeClr val="tx1"/>
-          </a:fontRef>
-        </p:style>
-      </p:cxnSp>
-      <p:cxnSp>
-        <p:nvCxnSpPr>
-          <p:cNvPr id="6" name="Straight Connector 5"/>
-          <p:cNvCxnSpPr/>
-          <p:nvPr/>
-        </p:nvCxnSpPr>
-        <p:spPr>
-          <a:xfrm>
-            <a:off x="682834" y="1175267"/>
-            <a:ext cx="1066800" cy="0"/>
-          </a:xfrm>
-          <a:prstGeom prst="line">
-            <a:avLst/>
-          </a:prstGeom>
-          <a:ln w="31750"/>
-        </p:spPr>
-        <p:style>
-          <a:lnRef idx="1">
-            <a:schemeClr val="accent1"/>
-          </a:lnRef>
-          <a:fillRef idx="0">
-            <a:schemeClr val="accent1"/>
-          </a:fillRef>
-          <a:effectRef idx="0">
-            <a:schemeClr val="accent1"/>
-          </a:effectRef>
-          <a:fontRef idx="minor">
-            <a:schemeClr val="tx1"/>
-          </a:fontRef>
-        </p:style>
-      </p:cxnSp>
-      <p:sp>
-        <p:nvSpPr>
-          <p:cNvPr id="8" name="TextBox 7"/>
-          <p:cNvSpPr txBox="1"/>
-          <p:nvPr/>
-        </p:nvSpPr>
-        <p:spPr>
-          <a:xfrm>
-            <a:off x="1063834" y="1177326"/>
-            <a:ext cx="264816" cy="307777"/>
-          </a:xfrm>
-          <a:prstGeom prst="rect">
-            <a:avLst/>
-          </a:prstGeom>
-          <a:noFill/>
-        </p:spPr>
-        <p:txBody>
-          <a:bodyPr wrap="none" rtlCol="0">
-            <a:spAutoFit/>
-          </a:bodyPr>
-          <a:lstStyle/>
-          <a:p>
-            <a:r>
-              <a:rPr lang="en-US" sz="1400" i="1" dirty="0" smtClean="0">
+        </p:grpSpPr>
+        <p:sp>
+          <p:nvSpPr>
+            <p:cNvPr id="155" name="TextBox 154"/>
+            <p:cNvSpPr txBox="1"/>
+            <p:nvPr/>
+          </p:nvSpPr>
+          <p:spPr>
+            <a:xfrm>
+              <a:off x="-76200" y="73223"/>
+              <a:ext cx="571849" cy="307777"/>
+            </a:xfrm>
+            <a:prstGeom prst="rect">
+              <a:avLst/>
+            </a:prstGeom>
+            <a:noFill/>
+          </p:spPr>
+          <p:txBody>
+            <a:bodyPr wrap="square" rtlCol="0">
+              <a:spAutoFit/>
+            </a:bodyPr>
+            <a:lstStyle/>
+            <a:p>
+              <a:r>
+                <a:rPr lang="en-US" sz="1400" dirty="0" smtClean="0">
+                  <a:latin typeface="Times New Roman" pitchFamily="18" charset="0"/>
+                  <a:cs typeface="Times New Roman" pitchFamily="18" charset="0"/>
+                </a:rPr>
+                <a:t>(a)</a:t>
+              </a:r>
+              <a:endParaRPr lang="en-US" sz="1400" dirty="0">
                 <a:latin typeface="Times New Roman" pitchFamily="18" charset="0"/>
                 <a:cs typeface="Times New Roman" pitchFamily="18" charset="0"/>
-              </a:rPr>
-              <a:t>x</a:t>
-            </a:r>
-            <a:endParaRPr lang="en-US" sz="1400" i="1" dirty="0">
-              <a:latin typeface="Times New Roman" pitchFamily="18" charset="0"/>
-              <a:cs typeface="Times New Roman" pitchFamily="18" charset="0"/>
-            </a:endParaRPr>
-          </a:p>
-        </p:txBody>
-      </p:sp>
-      <p:sp>
-        <p:nvSpPr>
-          <p:cNvPr id="9" name="TextBox 8"/>
-          <p:cNvSpPr txBox="1"/>
-          <p:nvPr/>
-        </p:nvSpPr>
-        <p:spPr>
-          <a:xfrm>
-            <a:off x="149434" y="533401"/>
-            <a:ext cx="571849" cy="307777"/>
-          </a:xfrm>
-          <a:prstGeom prst="rect">
-            <a:avLst/>
-          </a:prstGeom>
-          <a:noFill/>
-        </p:spPr>
-        <p:txBody>
-          <a:bodyPr wrap="square" rtlCol="0">
-            <a:spAutoFit/>
-          </a:bodyPr>
-          <a:lstStyle/>
-          <a:p>
-            <a:r>
-              <a:rPr lang="en-US" sz="1400" i="1" dirty="0" smtClean="0">
+              </a:endParaRPr>
+            </a:p>
+          </p:txBody>
+        </p:sp>
+        <p:cxnSp>
+          <p:nvCxnSpPr>
+            <p:cNvPr id="5" name="Straight Connector 4"/>
+            <p:cNvCxnSpPr/>
+            <p:nvPr/>
+          </p:nvCxnSpPr>
+          <p:spPr>
+            <a:xfrm>
+              <a:off x="682834" y="260867"/>
+              <a:ext cx="0" cy="914400"/>
+            </a:xfrm>
+            <a:prstGeom prst="line">
+              <a:avLst/>
+            </a:prstGeom>
+            <a:ln w="31750"/>
+          </p:spPr>
+          <p:style>
+            <a:lnRef idx="1">
+              <a:schemeClr val="accent1"/>
+            </a:lnRef>
+            <a:fillRef idx="0">
+              <a:schemeClr val="accent1"/>
+            </a:fillRef>
+            <a:effectRef idx="0">
+              <a:schemeClr val="accent1"/>
+            </a:effectRef>
+            <a:fontRef idx="minor">
+              <a:schemeClr val="tx1"/>
+            </a:fontRef>
+          </p:style>
+        </p:cxnSp>
+        <p:cxnSp>
+          <p:nvCxnSpPr>
+            <p:cNvPr id="6" name="Straight Connector 5"/>
+            <p:cNvCxnSpPr/>
+            <p:nvPr/>
+          </p:nvCxnSpPr>
+          <p:spPr>
+            <a:xfrm>
+              <a:off x="682834" y="1175267"/>
+              <a:ext cx="1066800" cy="0"/>
+            </a:xfrm>
+            <a:prstGeom prst="line">
+              <a:avLst/>
+            </a:prstGeom>
+            <a:ln w="31750"/>
+          </p:spPr>
+          <p:style>
+            <a:lnRef idx="1">
+              <a:schemeClr val="accent1"/>
+            </a:lnRef>
+            <a:fillRef idx="0">
+              <a:schemeClr val="accent1"/>
+            </a:fillRef>
+            <a:effectRef idx="0">
+              <a:schemeClr val="accent1"/>
+            </a:effectRef>
+            <a:fontRef idx="minor">
+              <a:schemeClr val="tx1"/>
+            </a:fontRef>
+          </p:style>
+        </p:cxnSp>
+        <p:sp>
+          <p:nvSpPr>
+            <p:cNvPr id="8" name="TextBox 7"/>
+            <p:cNvSpPr txBox="1"/>
+            <p:nvPr/>
+          </p:nvSpPr>
+          <p:spPr>
+            <a:xfrm>
+              <a:off x="1063834" y="1177326"/>
+              <a:ext cx="264816" cy="307777"/>
+            </a:xfrm>
+            <a:prstGeom prst="rect">
+              <a:avLst/>
+            </a:prstGeom>
+            <a:noFill/>
+          </p:spPr>
+          <p:txBody>
+            <a:bodyPr wrap="none" rtlCol="0">
+              <a:spAutoFit/>
+            </a:bodyPr>
+            <a:lstStyle/>
+            <a:p>
+              <a:r>
+                <a:rPr lang="en-US" sz="1400" i="1" dirty="0" smtClean="0">
+                  <a:latin typeface="Times New Roman" pitchFamily="18" charset="0"/>
+                  <a:cs typeface="Times New Roman" pitchFamily="18" charset="0"/>
+                </a:rPr>
+                <a:t>x</a:t>
+              </a:r>
+              <a:endParaRPr lang="en-US" sz="1400" i="1" dirty="0">
                 <a:latin typeface="Times New Roman" pitchFamily="18" charset="0"/>
                 <a:cs typeface="Times New Roman" pitchFamily="18" charset="0"/>
-              </a:rPr>
-              <a:t>f(x)</a:t>
-            </a:r>
-            <a:endParaRPr lang="en-US" sz="1400" i="1" dirty="0">
-              <a:latin typeface="Times New Roman" pitchFamily="18" charset="0"/>
-              <a:cs typeface="Times New Roman" pitchFamily="18" charset="0"/>
-            </a:endParaRPr>
-          </a:p>
-        </p:txBody>
-      </p:sp>
-      <p:cxnSp>
-        <p:nvCxnSpPr>
-          <p:cNvPr id="10" name="Straight Connector 9"/>
-          <p:cNvCxnSpPr/>
-          <p:nvPr/>
-        </p:nvCxnSpPr>
-        <p:spPr>
-          <a:xfrm>
-            <a:off x="2817002" y="260867"/>
-            <a:ext cx="0" cy="914400"/>
-          </a:xfrm>
-          <a:prstGeom prst="line">
-            <a:avLst/>
-          </a:prstGeom>
-          <a:ln w="31750"/>
-        </p:spPr>
-        <p:style>
-          <a:lnRef idx="1">
-            <a:schemeClr val="accent1"/>
-          </a:lnRef>
-          <a:fillRef idx="0">
-            <a:schemeClr val="accent1"/>
-          </a:fillRef>
-          <a:effectRef idx="0">
-            <a:schemeClr val="accent1"/>
-          </a:effectRef>
-          <a:fontRef idx="minor">
-            <a:schemeClr val="tx1"/>
-          </a:fontRef>
-        </p:style>
-      </p:cxnSp>
-      <p:cxnSp>
-        <p:nvCxnSpPr>
-          <p:cNvPr id="11" name="Straight Connector 10"/>
-          <p:cNvCxnSpPr/>
-          <p:nvPr/>
-        </p:nvCxnSpPr>
-        <p:spPr>
-          <a:xfrm>
-            <a:off x="2817002" y="1175267"/>
-            <a:ext cx="1066800" cy="0"/>
-          </a:xfrm>
-          <a:prstGeom prst="line">
-            <a:avLst/>
-          </a:prstGeom>
-          <a:ln w="31750"/>
-        </p:spPr>
-        <p:style>
-          <a:lnRef idx="1">
-            <a:schemeClr val="accent1"/>
-          </a:lnRef>
-          <a:fillRef idx="0">
-            <a:schemeClr val="accent1"/>
-          </a:fillRef>
-          <a:effectRef idx="0">
-            <a:schemeClr val="accent1"/>
-          </a:effectRef>
-          <a:fontRef idx="minor">
-            <a:schemeClr val="tx1"/>
-          </a:fontRef>
-        </p:style>
-      </p:cxnSp>
-      <p:sp>
-        <p:nvSpPr>
-          <p:cNvPr id="12" name="TextBox 11"/>
-          <p:cNvSpPr txBox="1"/>
-          <p:nvPr/>
-        </p:nvSpPr>
-        <p:spPr>
-          <a:xfrm>
-            <a:off x="3198001" y="1177326"/>
-            <a:ext cx="264816" cy="307777"/>
-          </a:xfrm>
-          <a:prstGeom prst="rect">
-            <a:avLst/>
-          </a:prstGeom>
-          <a:noFill/>
-        </p:spPr>
-        <p:txBody>
-          <a:bodyPr wrap="none" rtlCol="0">
-            <a:spAutoFit/>
-          </a:bodyPr>
-          <a:lstStyle/>
-          <a:p>
-            <a:r>
-              <a:rPr lang="en-US" sz="1400" i="1" dirty="0" smtClean="0">
+              </a:endParaRPr>
+            </a:p>
+          </p:txBody>
+        </p:sp>
+        <p:sp>
+          <p:nvSpPr>
+            <p:cNvPr id="9" name="TextBox 8"/>
+            <p:cNvSpPr txBox="1"/>
+            <p:nvPr/>
+          </p:nvSpPr>
+          <p:spPr>
+            <a:xfrm>
+              <a:off x="265783" y="533401"/>
+              <a:ext cx="571849" cy="307777"/>
+            </a:xfrm>
+            <a:prstGeom prst="rect">
+              <a:avLst/>
+            </a:prstGeom>
+            <a:noFill/>
+          </p:spPr>
+          <p:txBody>
+            <a:bodyPr wrap="square" rtlCol="0">
+              <a:spAutoFit/>
+            </a:bodyPr>
+            <a:lstStyle/>
+            <a:p>
+              <a:r>
+                <a:rPr lang="en-US" sz="1400" i="1" dirty="0" smtClean="0">
+                  <a:latin typeface="Times New Roman" pitchFamily="18" charset="0"/>
+                  <a:cs typeface="Times New Roman" pitchFamily="18" charset="0"/>
+                </a:rPr>
+                <a:t>f(x)</a:t>
+              </a:r>
+              <a:endParaRPr lang="en-US" sz="1400" i="1" dirty="0">
                 <a:latin typeface="Times New Roman" pitchFamily="18" charset="0"/>
                 <a:cs typeface="Times New Roman" pitchFamily="18" charset="0"/>
-              </a:rPr>
-              <a:t>x</a:t>
-            </a:r>
-            <a:endParaRPr lang="en-US" sz="1400" i="1" dirty="0">
-              <a:latin typeface="Times New Roman" pitchFamily="18" charset="0"/>
-              <a:cs typeface="Times New Roman" pitchFamily="18" charset="0"/>
-            </a:endParaRPr>
-          </a:p>
-        </p:txBody>
-      </p:sp>
-      <p:sp>
-        <p:nvSpPr>
-          <p:cNvPr id="13" name="TextBox 12"/>
-          <p:cNvSpPr txBox="1"/>
-          <p:nvPr/>
-        </p:nvSpPr>
-        <p:spPr>
-          <a:xfrm>
-            <a:off x="2283602" y="533401"/>
-            <a:ext cx="571849" cy="307777"/>
-          </a:xfrm>
-          <a:prstGeom prst="rect">
-            <a:avLst/>
-          </a:prstGeom>
-          <a:noFill/>
-        </p:spPr>
-        <p:txBody>
-          <a:bodyPr wrap="square" rtlCol="0">
-            <a:spAutoFit/>
-          </a:bodyPr>
-          <a:lstStyle/>
-          <a:p>
-            <a:r>
-              <a:rPr lang="en-US" sz="1400" i="1" dirty="0" smtClean="0">
+              </a:endParaRPr>
+            </a:p>
+          </p:txBody>
+        </p:sp>
+        <p:cxnSp>
+          <p:nvCxnSpPr>
+            <p:cNvPr id="10" name="Straight Connector 9"/>
+            <p:cNvCxnSpPr/>
+            <p:nvPr/>
+          </p:nvCxnSpPr>
+          <p:spPr>
+            <a:xfrm>
+              <a:off x="2817002" y="260867"/>
+              <a:ext cx="0" cy="914400"/>
+            </a:xfrm>
+            <a:prstGeom prst="line">
+              <a:avLst/>
+            </a:prstGeom>
+            <a:ln w="31750"/>
+          </p:spPr>
+          <p:style>
+            <a:lnRef idx="1">
+              <a:schemeClr val="accent1"/>
+            </a:lnRef>
+            <a:fillRef idx="0">
+              <a:schemeClr val="accent1"/>
+            </a:fillRef>
+            <a:effectRef idx="0">
+              <a:schemeClr val="accent1"/>
+            </a:effectRef>
+            <a:fontRef idx="minor">
+              <a:schemeClr val="tx1"/>
+            </a:fontRef>
+          </p:style>
+        </p:cxnSp>
+        <p:cxnSp>
+          <p:nvCxnSpPr>
+            <p:cNvPr id="11" name="Straight Connector 10"/>
+            <p:cNvCxnSpPr/>
+            <p:nvPr/>
+          </p:nvCxnSpPr>
+          <p:spPr>
+            <a:xfrm>
+              <a:off x="2817002" y="1175267"/>
+              <a:ext cx="1066800" cy="0"/>
+            </a:xfrm>
+            <a:prstGeom prst="line">
+              <a:avLst/>
+            </a:prstGeom>
+            <a:ln w="31750"/>
+          </p:spPr>
+          <p:style>
+            <a:lnRef idx="1">
+              <a:schemeClr val="accent1"/>
+            </a:lnRef>
+            <a:fillRef idx="0">
+              <a:schemeClr val="accent1"/>
+            </a:fillRef>
+            <a:effectRef idx="0">
+              <a:schemeClr val="accent1"/>
+            </a:effectRef>
+            <a:fontRef idx="minor">
+              <a:schemeClr val="tx1"/>
+            </a:fontRef>
+          </p:style>
+        </p:cxnSp>
+        <p:sp>
+          <p:nvSpPr>
+            <p:cNvPr id="12" name="TextBox 11"/>
+            <p:cNvSpPr txBox="1"/>
+            <p:nvPr/>
+          </p:nvSpPr>
+          <p:spPr>
+            <a:xfrm>
+              <a:off x="3198001" y="1177326"/>
+              <a:ext cx="264816" cy="307777"/>
+            </a:xfrm>
+            <a:prstGeom prst="rect">
+              <a:avLst/>
+            </a:prstGeom>
+            <a:noFill/>
+          </p:spPr>
+          <p:txBody>
+            <a:bodyPr wrap="none" rtlCol="0">
+              <a:spAutoFit/>
+            </a:bodyPr>
+            <a:lstStyle/>
+            <a:p>
+              <a:r>
+                <a:rPr lang="en-US" sz="1400" i="1" dirty="0" smtClean="0">
+                  <a:latin typeface="Times New Roman" pitchFamily="18" charset="0"/>
+                  <a:cs typeface="Times New Roman" pitchFamily="18" charset="0"/>
+                </a:rPr>
+                <a:t>x</a:t>
+              </a:r>
+              <a:endParaRPr lang="en-US" sz="1400" i="1" dirty="0">
                 <a:latin typeface="Times New Roman" pitchFamily="18" charset="0"/>
                 <a:cs typeface="Times New Roman" pitchFamily="18" charset="0"/>
-              </a:rPr>
-              <a:t>g(x)</a:t>
-            </a:r>
-            <a:endParaRPr lang="en-US" sz="1400" i="1" dirty="0">
-              <a:latin typeface="Times New Roman" pitchFamily="18" charset="0"/>
-              <a:cs typeface="Times New Roman" pitchFamily="18" charset="0"/>
-            </a:endParaRPr>
-          </a:p>
-        </p:txBody>
-      </p:sp>
-      <p:cxnSp>
-        <p:nvCxnSpPr>
-          <p:cNvPr id="23" name="Elbow Connector 22"/>
-          <p:cNvCxnSpPr/>
-          <p:nvPr/>
-        </p:nvCxnSpPr>
-        <p:spPr>
-          <a:xfrm flipV="1">
-            <a:off x="682834" y="718067"/>
-            <a:ext cx="381000" cy="228600"/>
-          </a:xfrm>
-          <a:prstGeom prst="bentConnector3">
-            <a:avLst/>
-          </a:prstGeom>
-          <a:ln w="15875"/>
-        </p:spPr>
-        <p:style>
-          <a:lnRef idx="1">
-            <a:schemeClr val="accent1"/>
-          </a:lnRef>
-          <a:fillRef idx="0">
-            <a:schemeClr val="accent1"/>
-          </a:fillRef>
-          <a:effectRef idx="0">
-            <a:schemeClr val="accent1"/>
-          </a:effectRef>
-          <a:fontRef idx="minor">
-            <a:schemeClr val="tx1"/>
-          </a:fontRef>
-        </p:style>
-      </p:cxnSp>
-      <p:cxnSp>
-        <p:nvCxnSpPr>
-          <p:cNvPr id="24" name="Elbow Connector 23"/>
-          <p:cNvCxnSpPr/>
-          <p:nvPr/>
-        </p:nvCxnSpPr>
-        <p:spPr>
-          <a:xfrm flipV="1">
-            <a:off x="873334" y="491526"/>
-            <a:ext cx="381000" cy="228600"/>
-          </a:xfrm>
-          <a:prstGeom prst="bentConnector3">
-            <a:avLst/>
-          </a:prstGeom>
-          <a:ln w="15875"/>
-        </p:spPr>
-        <p:style>
-          <a:lnRef idx="1">
-            <a:schemeClr val="accent1"/>
-          </a:lnRef>
-          <a:fillRef idx="0">
-            <a:schemeClr val="accent1"/>
-          </a:fillRef>
-          <a:effectRef idx="0">
-            <a:schemeClr val="accent1"/>
-          </a:effectRef>
-          <a:fontRef idx="minor">
-            <a:schemeClr val="tx1"/>
-          </a:fontRef>
-        </p:style>
-      </p:cxnSp>
-      <p:cxnSp>
-        <p:nvCxnSpPr>
-          <p:cNvPr id="25" name="Elbow Connector 24"/>
-          <p:cNvCxnSpPr/>
-          <p:nvPr/>
-        </p:nvCxnSpPr>
-        <p:spPr>
-          <a:xfrm>
-            <a:off x="1140034" y="491526"/>
-            <a:ext cx="279057" cy="113270"/>
-          </a:xfrm>
-          <a:prstGeom prst="bentConnector3">
-            <a:avLst>
-              <a:gd name="adj1" fmla="val 50000"/>
-            </a:avLst>
-          </a:prstGeom>
-          <a:ln w="15875"/>
-        </p:spPr>
-        <p:style>
-          <a:lnRef idx="1">
-            <a:schemeClr val="accent1"/>
-          </a:lnRef>
-          <a:fillRef idx="0">
-            <a:schemeClr val="accent1"/>
-          </a:fillRef>
-          <a:effectRef idx="0">
-            <a:schemeClr val="accent1"/>
-          </a:effectRef>
-          <a:fontRef idx="minor">
-            <a:schemeClr val="tx1"/>
-          </a:fontRef>
-        </p:style>
-      </p:cxnSp>
-      <p:cxnSp>
-        <p:nvCxnSpPr>
-          <p:cNvPr id="28" name="Elbow Connector 27"/>
-          <p:cNvCxnSpPr/>
-          <p:nvPr/>
-        </p:nvCxnSpPr>
-        <p:spPr>
-          <a:xfrm>
-            <a:off x="1299304" y="602737"/>
-            <a:ext cx="379456" cy="118419"/>
-          </a:xfrm>
-          <a:prstGeom prst="bentConnector3">
-            <a:avLst>
-              <a:gd name="adj1" fmla="val 50000"/>
-            </a:avLst>
-          </a:prstGeom>
-          <a:ln w="15875"/>
-        </p:spPr>
-        <p:style>
-          <a:lnRef idx="1">
-            <a:schemeClr val="accent1"/>
-          </a:lnRef>
-          <a:fillRef idx="0">
-            <a:schemeClr val="accent1"/>
-          </a:fillRef>
-          <a:effectRef idx="0">
-            <a:schemeClr val="accent1"/>
-          </a:effectRef>
-          <a:fontRef idx="minor">
-            <a:schemeClr val="tx1"/>
-          </a:fontRef>
-        </p:style>
-      </p:cxnSp>
-      <p:cxnSp>
-        <p:nvCxnSpPr>
-          <p:cNvPr id="38" name="Straight Connector 37"/>
-          <p:cNvCxnSpPr/>
-          <p:nvPr/>
-        </p:nvCxnSpPr>
-        <p:spPr>
-          <a:xfrm flipV="1">
-            <a:off x="2817002" y="494615"/>
-            <a:ext cx="571500" cy="453084"/>
-          </a:xfrm>
-          <a:prstGeom prst="line">
-            <a:avLst/>
-          </a:prstGeom>
-          <a:ln w="15875"/>
-        </p:spPr>
-        <p:style>
-          <a:lnRef idx="1">
-            <a:schemeClr val="accent1"/>
-          </a:lnRef>
-          <a:fillRef idx="0">
-            <a:schemeClr val="accent1"/>
-          </a:fillRef>
-          <a:effectRef idx="0">
-            <a:schemeClr val="accent1"/>
-          </a:effectRef>
-          <a:fontRef idx="minor">
-            <a:schemeClr val="tx1"/>
-          </a:fontRef>
-        </p:style>
-      </p:cxnSp>
-      <p:cxnSp>
-        <p:nvCxnSpPr>
-          <p:cNvPr id="39" name="Straight Connector 38"/>
-          <p:cNvCxnSpPr/>
-          <p:nvPr/>
-        </p:nvCxnSpPr>
-        <p:spPr>
-          <a:xfrm>
-            <a:off x="3388502" y="494615"/>
-            <a:ext cx="424426" cy="225511"/>
-          </a:xfrm>
-          <a:prstGeom prst="line">
-            <a:avLst/>
-          </a:prstGeom>
-          <a:ln w="15875"/>
-        </p:spPr>
-        <p:style>
-          <a:lnRef idx="1">
-            <a:schemeClr val="accent1"/>
-          </a:lnRef>
-          <a:fillRef idx="0">
-            <a:schemeClr val="accent1"/>
-          </a:fillRef>
-          <a:effectRef idx="0">
-            <a:schemeClr val="accent1"/>
-          </a:effectRef>
-          <a:fontRef idx="minor">
-            <a:schemeClr val="tx1"/>
-          </a:fontRef>
-        </p:style>
-      </p:cxnSp>
-      <p:sp>
-        <p:nvSpPr>
-          <p:cNvPr id="41" name="TextBox 40"/>
-          <p:cNvSpPr txBox="1"/>
-          <p:nvPr/>
-        </p:nvSpPr>
-        <p:spPr>
-          <a:xfrm>
-            <a:off x="454805" y="1099068"/>
-            <a:ext cx="274434" cy="307777"/>
-          </a:xfrm>
-          <a:prstGeom prst="rect">
-            <a:avLst/>
-          </a:prstGeom>
-          <a:noFill/>
-        </p:spPr>
-        <p:txBody>
-          <a:bodyPr wrap="none" rtlCol="0">
-            <a:spAutoFit/>
-          </a:bodyPr>
-          <a:lstStyle/>
-          <a:p>
-            <a:r>
-              <a:rPr lang="en-US" sz="1400" i="1" dirty="0" smtClean="0">
+              </a:endParaRPr>
+            </a:p>
+          </p:txBody>
+        </p:sp>
+        <p:sp>
+          <p:nvSpPr>
+            <p:cNvPr id="13" name="TextBox 12"/>
+            <p:cNvSpPr txBox="1"/>
+            <p:nvPr/>
+          </p:nvSpPr>
+          <p:spPr>
+            <a:xfrm>
+              <a:off x="2399951" y="533401"/>
+              <a:ext cx="571849" cy="307777"/>
+            </a:xfrm>
+            <a:prstGeom prst="rect">
+              <a:avLst/>
+            </a:prstGeom>
+            <a:noFill/>
+          </p:spPr>
+          <p:txBody>
+            <a:bodyPr wrap="square" rtlCol="0">
+              <a:spAutoFit/>
+            </a:bodyPr>
+            <a:lstStyle/>
+            <a:p>
+              <a:r>
+                <a:rPr lang="en-US" sz="1400" i="1" dirty="0" smtClean="0">
+                  <a:latin typeface="Times New Roman" pitchFamily="18" charset="0"/>
+                  <a:cs typeface="Times New Roman" pitchFamily="18" charset="0"/>
+                </a:rPr>
+                <a:t>g(x)</a:t>
+              </a:r>
+              <a:endParaRPr lang="en-US" sz="1400" i="1" dirty="0">
                 <a:latin typeface="Times New Roman" pitchFamily="18" charset="0"/>
                 <a:cs typeface="Times New Roman" pitchFamily="18" charset="0"/>
-              </a:rPr>
-              <a:t>0</a:t>
-            </a:r>
-            <a:endParaRPr lang="en-US" sz="1400" i="1" dirty="0">
-              <a:latin typeface="Times New Roman" pitchFamily="18" charset="0"/>
-              <a:cs typeface="Times New Roman" pitchFamily="18" charset="0"/>
-            </a:endParaRPr>
-          </a:p>
-        </p:txBody>
-      </p:sp>
-      <p:sp>
-        <p:nvSpPr>
-          <p:cNvPr id="42" name="TextBox 41"/>
-          <p:cNvSpPr txBox="1"/>
-          <p:nvPr/>
-        </p:nvSpPr>
-        <p:spPr>
-          <a:xfrm>
-            <a:off x="1528718" y="1101126"/>
-            <a:ext cx="274434" cy="307777"/>
-          </a:xfrm>
-          <a:prstGeom prst="rect">
-            <a:avLst/>
-          </a:prstGeom>
-          <a:noFill/>
-        </p:spPr>
-        <p:txBody>
-          <a:bodyPr wrap="none" rtlCol="0">
-            <a:spAutoFit/>
-          </a:bodyPr>
-          <a:lstStyle/>
-          <a:p>
-            <a:r>
-              <a:rPr lang="en-US" sz="1400" i="1" dirty="0" smtClean="0">
+              </a:endParaRPr>
+            </a:p>
+          </p:txBody>
+        </p:sp>
+        <p:cxnSp>
+          <p:nvCxnSpPr>
+            <p:cNvPr id="23" name="Elbow Connector 22"/>
+            <p:cNvCxnSpPr/>
+            <p:nvPr/>
+          </p:nvCxnSpPr>
+          <p:spPr>
+            <a:xfrm flipV="1">
+              <a:off x="682834" y="718067"/>
+              <a:ext cx="381000" cy="228600"/>
+            </a:xfrm>
+            <a:prstGeom prst="bentConnector3">
+              <a:avLst/>
+            </a:prstGeom>
+            <a:ln w="15875"/>
+          </p:spPr>
+          <p:style>
+            <a:lnRef idx="1">
+              <a:schemeClr val="accent1"/>
+            </a:lnRef>
+            <a:fillRef idx="0">
+              <a:schemeClr val="accent1"/>
+            </a:fillRef>
+            <a:effectRef idx="0">
+              <a:schemeClr val="accent1"/>
+            </a:effectRef>
+            <a:fontRef idx="minor">
+              <a:schemeClr val="tx1"/>
+            </a:fontRef>
+          </p:style>
+        </p:cxnSp>
+        <p:cxnSp>
+          <p:nvCxnSpPr>
+            <p:cNvPr id="24" name="Elbow Connector 23"/>
+            <p:cNvCxnSpPr/>
+            <p:nvPr/>
+          </p:nvCxnSpPr>
+          <p:spPr>
+            <a:xfrm flipV="1">
+              <a:off x="873334" y="491526"/>
+              <a:ext cx="381000" cy="228600"/>
+            </a:xfrm>
+            <a:prstGeom prst="bentConnector3">
+              <a:avLst/>
+            </a:prstGeom>
+            <a:ln w="15875"/>
+          </p:spPr>
+          <p:style>
+            <a:lnRef idx="1">
+              <a:schemeClr val="accent1"/>
+            </a:lnRef>
+            <a:fillRef idx="0">
+              <a:schemeClr val="accent1"/>
+            </a:fillRef>
+            <a:effectRef idx="0">
+              <a:schemeClr val="accent1"/>
+            </a:effectRef>
+            <a:fontRef idx="minor">
+              <a:schemeClr val="tx1"/>
+            </a:fontRef>
+          </p:style>
+        </p:cxnSp>
+        <p:cxnSp>
+          <p:nvCxnSpPr>
+            <p:cNvPr id="25" name="Elbow Connector 24"/>
+            <p:cNvCxnSpPr/>
+            <p:nvPr/>
+          </p:nvCxnSpPr>
+          <p:spPr>
+            <a:xfrm>
+              <a:off x="1140034" y="491526"/>
+              <a:ext cx="281035" cy="59724"/>
+            </a:xfrm>
+            <a:prstGeom prst="bentConnector3">
+              <a:avLst>
+                <a:gd name="adj1" fmla="val 50000"/>
+              </a:avLst>
+            </a:prstGeom>
+            <a:ln w="15875"/>
+          </p:spPr>
+          <p:style>
+            <a:lnRef idx="1">
+              <a:schemeClr val="accent1"/>
+            </a:lnRef>
+            <a:fillRef idx="0">
+              <a:schemeClr val="accent1"/>
+            </a:fillRef>
+            <a:effectRef idx="0">
+              <a:schemeClr val="accent1"/>
+            </a:effectRef>
+            <a:fontRef idx="minor">
+              <a:schemeClr val="tx1"/>
+            </a:fontRef>
+          </p:style>
+        </p:cxnSp>
+        <p:cxnSp>
+          <p:nvCxnSpPr>
+            <p:cNvPr id="28" name="Elbow Connector 27"/>
+            <p:cNvCxnSpPr/>
+            <p:nvPr/>
+          </p:nvCxnSpPr>
+          <p:spPr>
+            <a:xfrm>
+              <a:off x="1296944" y="551250"/>
+              <a:ext cx="383929" cy="59209"/>
+            </a:xfrm>
+            <a:prstGeom prst="bentConnector3">
+              <a:avLst>
+                <a:gd name="adj1" fmla="val 50000"/>
+              </a:avLst>
+            </a:prstGeom>
+            <a:ln w="15875"/>
+          </p:spPr>
+          <p:style>
+            <a:lnRef idx="1">
+              <a:schemeClr val="accent1"/>
+            </a:lnRef>
+            <a:fillRef idx="0">
+              <a:schemeClr val="accent1"/>
+            </a:fillRef>
+            <a:effectRef idx="0">
+              <a:schemeClr val="accent1"/>
+            </a:effectRef>
+            <a:fontRef idx="minor">
+              <a:schemeClr val="tx1"/>
+            </a:fontRef>
+          </p:style>
+        </p:cxnSp>
+        <p:cxnSp>
+          <p:nvCxnSpPr>
+            <p:cNvPr id="38" name="Straight Connector 37"/>
+            <p:cNvCxnSpPr/>
+            <p:nvPr/>
+          </p:nvCxnSpPr>
+          <p:spPr>
+            <a:xfrm flipV="1">
+              <a:off x="2819400" y="491526"/>
+              <a:ext cx="609599" cy="455141"/>
+            </a:xfrm>
+            <a:prstGeom prst="line">
+              <a:avLst/>
+            </a:prstGeom>
+            <a:ln w="15875"/>
+          </p:spPr>
+          <p:style>
+            <a:lnRef idx="1">
+              <a:schemeClr val="accent1"/>
+            </a:lnRef>
+            <a:fillRef idx="0">
+              <a:schemeClr val="accent1"/>
+            </a:fillRef>
+            <a:effectRef idx="0">
+              <a:schemeClr val="accent1"/>
+            </a:effectRef>
+            <a:fontRef idx="minor">
+              <a:schemeClr val="tx1"/>
+            </a:fontRef>
+          </p:style>
+        </p:cxnSp>
+        <p:cxnSp>
+          <p:nvCxnSpPr>
+            <p:cNvPr id="39" name="Straight Connector 38"/>
+            <p:cNvCxnSpPr/>
+            <p:nvPr/>
+          </p:nvCxnSpPr>
+          <p:spPr>
+            <a:xfrm>
+              <a:off x="3417491" y="492942"/>
+              <a:ext cx="397272" cy="154758"/>
+            </a:xfrm>
+            <a:prstGeom prst="line">
+              <a:avLst/>
+            </a:prstGeom>
+            <a:ln w="15875"/>
+          </p:spPr>
+          <p:style>
+            <a:lnRef idx="1">
+              <a:schemeClr val="accent1"/>
+            </a:lnRef>
+            <a:fillRef idx="0">
+              <a:schemeClr val="accent1"/>
+            </a:fillRef>
+            <a:effectRef idx="0">
+              <a:schemeClr val="accent1"/>
+            </a:effectRef>
+            <a:fontRef idx="minor">
+              <a:schemeClr val="tx1"/>
+            </a:fontRef>
+          </p:style>
+        </p:cxnSp>
+        <p:sp>
+          <p:nvSpPr>
+            <p:cNvPr id="41" name="TextBox 40"/>
+            <p:cNvSpPr txBox="1"/>
+            <p:nvPr/>
+          </p:nvSpPr>
+          <p:spPr>
+            <a:xfrm>
+              <a:off x="454805" y="1099068"/>
+              <a:ext cx="274434" cy="307777"/>
+            </a:xfrm>
+            <a:prstGeom prst="rect">
+              <a:avLst/>
+            </a:prstGeom>
+            <a:noFill/>
+          </p:spPr>
+          <p:txBody>
+            <a:bodyPr wrap="none" rtlCol="0">
+              <a:spAutoFit/>
+            </a:bodyPr>
+            <a:lstStyle/>
+            <a:p>
+              <a:r>
+                <a:rPr lang="en-US" sz="1400" i="1" dirty="0" smtClean="0">
+                  <a:latin typeface="Times New Roman" pitchFamily="18" charset="0"/>
+                  <a:cs typeface="Times New Roman" pitchFamily="18" charset="0"/>
+                </a:rPr>
+                <a:t>0</a:t>
+              </a:r>
+              <a:endParaRPr lang="en-US" sz="1400" i="1" dirty="0">
                 <a:latin typeface="Times New Roman" pitchFamily="18" charset="0"/>
                 <a:cs typeface="Times New Roman" pitchFamily="18" charset="0"/>
-              </a:rPr>
-              <a:t>5</a:t>
-            </a:r>
-            <a:endParaRPr lang="en-US" sz="1400" i="1" dirty="0">
-              <a:latin typeface="Times New Roman" pitchFamily="18" charset="0"/>
-              <a:cs typeface="Times New Roman" pitchFamily="18" charset="0"/>
-            </a:endParaRPr>
-          </a:p>
-        </p:txBody>
-      </p:sp>
-      <p:sp>
-        <p:nvSpPr>
-          <p:cNvPr id="43" name="TextBox 42"/>
-          <p:cNvSpPr txBox="1"/>
-          <p:nvPr/>
-        </p:nvSpPr>
-        <p:spPr>
-          <a:xfrm>
-            <a:off x="458952" y="76201"/>
-            <a:ext cx="274434" cy="307777"/>
-          </a:xfrm>
-          <a:prstGeom prst="rect">
-            <a:avLst/>
-          </a:prstGeom>
-          <a:noFill/>
-        </p:spPr>
-        <p:txBody>
-          <a:bodyPr wrap="none" rtlCol="0">
-            <a:spAutoFit/>
-          </a:bodyPr>
-          <a:lstStyle/>
-          <a:p>
-            <a:r>
-              <a:rPr lang="en-US" sz="1400" i="1" dirty="0" smtClean="0">
+              </a:endParaRPr>
+            </a:p>
+          </p:txBody>
+        </p:sp>
+        <p:sp>
+          <p:nvSpPr>
+            <p:cNvPr id="42" name="TextBox 41"/>
+            <p:cNvSpPr txBox="1"/>
+            <p:nvPr/>
+          </p:nvSpPr>
+          <p:spPr>
+            <a:xfrm>
+              <a:off x="1524000" y="1110968"/>
+              <a:ext cx="274434" cy="307777"/>
+            </a:xfrm>
+            <a:prstGeom prst="rect">
+              <a:avLst/>
+            </a:prstGeom>
+            <a:noFill/>
+          </p:spPr>
+          <p:txBody>
+            <a:bodyPr wrap="none" rtlCol="0">
+              <a:spAutoFit/>
+            </a:bodyPr>
+            <a:lstStyle/>
+            <a:p>
+              <a:r>
+                <a:rPr lang="en-US" sz="1400" i="1" dirty="0" smtClean="0">
+                  <a:latin typeface="Times New Roman" pitchFamily="18" charset="0"/>
+                  <a:cs typeface="Times New Roman" pitchFamily="18" charset="0"/>
+                </a:rPr>
+                <a:t>5</a:t>
+              </a:r>
+              <a:endParaRPr lang="en-US" sz="1400" i="1" dirty="0">
                 <a:latin typeface="Times New Roman" pitchFamily="18" charset="0"/>
                 <a:cs typeface="Times New Roman" pitchFamily="18" charset="0"/>
-              </a:rPr>
-              <a:t>4</a:t>
-            </a:r>
-            <a:endParaRPr lang="en-US" sz="1400" i="1" dirty="0">
-              <a:latin typeface="Times New Roman" pitchFamily="18" charset="0"/>
-              <a:cs typeface="Times New Roman" pitchFamily="18" charset="0"/>
-            </a:endParaRPr>
-          </a:p>
-        </p:txBody>
-      </p:sp>
-      <p:sp>
-        <p:nvSpPr>
-          <p:cNvPr id="44" name="TextBox 43"/>
-          <p:cNvSpPr txBox="1"/>
-          <p:nvPr/>
-        </p:nvSpPr>
-        <p:spPr>
-          <a:xfrm>
-            <a:off x="2588401" y="1108677"/>
-            <a:ext cx="274434" cy="307777"/>
-          </a:xfrm>
-          <a:prstGeom prst="rect">
-            <a:avLst/>
-          </a:prstGeom>
-          <a:noFill/>
-        </p:spPr>
-        <p:txBody>
-          <a:bodyPr wrap="none" rtlCol="0">
-            <a:spAutoFit/>
-          </a:bodyPr>
-          <a:lstStyle/>
-          <a:p>
-            <a:r>
-              <a:rPr lang="en-US" sz="1400" i="1" dirty="0" smtClean="0">
+              </a:endParaRPr>
+            </a:p>
+          </p:txBody>
+        </p:sp>
+        <p:sp>
+          <p:nvSpPr>
+            <p:cNvPr id="43" name="TextBox 42"/>
+            <p:cNvSpPr txBox="1"/>
+            <p:nvPr/>
+          </p:nvSpPr>
+          <p:spPr>
+            <a:xfrm>
+              <a:off x="458952" y="76201"/>
+              <a:ext cx="274434" cy="307777"/>
+            </a:xfrm>
+            <a:prstGeom prst="rect">
+              <a:avLst/>
+            </a:prstGeom>
+            <a:noFill/>
+          </p:spPr>
+          <p:txBody>
+            <a:bodyPr wrap="none" rtlCol="0">
+              <a:spAutoFit/>
+            </a:bodyPr>
+            <a:lstStyle/>
+            <a:p>
+              <a:r>
+                <a:rPr lang="en-US" sz="1400" i="1" dirty="0" smtClean="0">
+                  <a:latin typeface="Times New Roman" pitchFamily="18" charset="0"/>
+                  <a:cs typeface="Times New Roman" pitchFamily="18" charset="0"/>
+                </a:rPr>
+                <a:t>4</a:t>
+              </a:r>
+              <a:endParaRPr lang="en-US" sz="1400" i="1" dirty="0">
                 <a:latin typeface="Times New Roman" pitchFamily="18" charset="0"/>
                 <a:cs typeface="Times New Roman" pitchFamily="18" charset="0"/>
-              </a:rPr>
-              <a:t>0</a:t>
-            </a:r>
-            <a:endParaRPr lang="en-US" sz="1400" i="1" dirty="0">
-              <a:latin typeface="Times New Roman" pitchFamily="18" charset="0"/>
-              <a:cs typeface="Times New Roman" pitchFamily="18" charset="0"/>
-            </a:endParaRPr>
-          </a:p>
-        </p:txBody>
-      </p:sp>
-      <p:sp>
-        <p:nvSpPr>
-          <p:cNvPr id="45" name="TextBox 44"/>
-          <p:cNvSpPr txBox="1"/>
-          <p:nvPr/>
-        </p:nvSpPr>
-        <p:spPr>
-          <a:xfrm>
-            <a:off x="3662317" y="1110735"/>
-            <a:ext cx="300082" cy="369332"/>
-          </a:xfrm>
-          <a:prstGeom prst="rect">
-            <a:avLst/>
-          </a:prstGeom>
-          <a:noFill/>
-        </p:spPr>
-        <p:txBody>
-          <a:bodyPr wrap="none" rtlCol="0">
-            <a:spAutoFit/>
-          </a:bodyPr>
-          <a:lstStyle/>
-          <a:p>
-            <a:r>
-              <a:rPr lang="en-US" i="1" dirty="0" smtClean="0">
+              </a:endParaRPr>
+            </a:p>
+          </p:txBody>
+        </p:sp>
+        <p:sp>
+          <p:nvSpPr>
+            <p:cNvPr id="44" name="TextBox 43"/>
+            <p:cNvSpPr txBox="1"/>
+            <p:nvPr/>
+          </p:nvSpPr>
+          <p:spPr>
+            <a:xfrm>
+              <a:off x="2588401" y="1108677"/>
+              <a:ext cx="274434" cy="307777"/>
+            </a:xfrm>
+            <a:prstGeom prst="rect">
+              <a:avLst/>
+            </a:prstGeom>
+            <a:noFill/>
+          </p:spPr>
+          <p:txBody>
+            <a:bodyPr wrap="none" rtlCol="0">
+              <a:spAutoFit/>
+            </a:bodyPr>
+            <a:lstStyle/>
+            <a:p>
+              <a:r>
+                <a:rPr lang="en-US" sz="1400" i="1" dirty="0" smtClean="0">
+                  <a:latin typeface="Times New Roman" pitchFamily="18" charset="0"/>
+                  <a:cs typeface="Times New Roman" pitchFamily="18" charset="0"/>
+                </a:rPr>
+                <a:t>0</a:t>
+              </a:r>
+              <a:endParaRPr lang="en-US" sz="1400" i="1" dirty="0">
                 <a:latin typeface="Times New Roman" pitchFamily="18" charset="0"/>
                 <a:cs typeface="Times New Roman" pitchFamily="18" charset="0"/>
-              </a:rPr>
-              <a:t>5</a:t>
-            </a:r>
-            <a:endParaRPr lang="en-US" i="1" dirty="0">
-              <a:latin typeface="Times New Roman" pitchFamily="18" charset="0"/>
-              <a:cs typeface="Times New Roman" pitchFamily="18" charset="0"/>
-            </a:endParaRPr>
-          </a:p>
-        </p:txBody>
-      </p:sp>
-      <p:sp>
-        <p:nvSpPr>
-          <p:cNvPr id="46" name="TextBox 45"/>
-          <p:cNvSpPr txBox="1"/>
-          <p:nvPr/>
-        </p:nvSpPr>
-        <p:spPr>
-          <a:xfrm>
-            <a:off x="2593120" y="85810"/>
-            <a:ext cx="274434" cy="307777"/>
-          </a:xfrm>
-          <a:prstGeom prst="rect">
-            <a:avLst/>
-          </a:prstGeom>
-          <a:noFill/>
-        </p:spPr>
-        <p:txBody>
-          <a:bodyPr wrap="none" rtlCol="0">
-            <a:spAutoFit/>
-          </a:bodyPr>
-          <a:lstStyle/>
-          <a:p>
-            <a:r>
-              <a:rPr lang="en-US" sz="1400" i="1" dirty="0" smtClean="0">
+              </a:endParaRPr>
+            </a:p>
+          </p:txBody>
+        </p:sp>
+        <p:sp>
+          <p:nvSpPr>
+            <p:cNvPr id="45" name="TextBox 44"/>
+            <p:cNvSpPr txBox="1"/>
+            <p:nvPr/>
+          </p:nvSpPr>
+          <p:spPr>
+            <a:xfrm>
+              <a:off x="3662317" y="1110735"/>
+              <a:ext cx="274434" cy="307777"/>
+            </a:xfrm>
+            <a:prstGeom prst="rect">
+              <a:avLst/>
+            </a:prstGeom>
+            <a:noFill/>
+          </p:spPr>
+          <p:txBody>
+            <a:bodyPr wrap="none" rtlCol="0">
+              <a:spAutoFit/>
+            </a:bodyPr>
+            <a:lstStyle/>
+            <a:p>
+              <a:r>
+                <a:rPr lang="en-US" sz="1400" i="1" dirty="0" smtClean="0">
+                  <a:latin typeface="Times New Roman" pitchFamily="18" charset="0"/>
+                  <a:cs typeface="Times New Roman" pitchFamily="18" charset="0"/>
+                </a:rPr>
+                <a:t>5</a:t>
+              </a:r>
+              <a:endParaRPr lang="en-US" sz="1400" i="1" dirty="0">
                 <a:latin typeface="Times New Roman" pitchFamily="18" charset="0"/>
                 <a:cs typeface="Times New Roman" pitchFamily="18" charset="0"/>
-              </a:rPr>
-              <a:t>4</a:t>
-            </a:r>
-            <a:endParaRPr lang="en-US" sz="1400" i="1" dirty="0">
-              <a:latin typeface="Times New Roman" pitchFamily="18" charset="0"/>
-              <a:cs typeface="Times New Roman" pitchFamily="18" charset="0"/>
-            </a:endParaRPr>
-          </a:p>
-        </p:txBody>
-      </p:sp>
-      <p:cxnSp>
-        <p:nvCxnSpPr>
-          <p:cNvPr id="49" name="Elbow Connector 48"/>
-          <p:cNvCxnSpPr/>
-          <p:nvPr/>
-        </p:nvCxnSpPr>
-        <p:spPr>
-          <a:xfrm flipV="1">
-            <a:off x="2817002" y="721156"/>
-            <a:ext cx="381000" cy="228600"/>
-          </a:xfrm>
-          <a:prstGeom prst="bentConnector3">
-            <a:avLst/>
-          </a:prstGeom>
-          <a:ln w="15875">
-            <a:prstDash val="sysDot"/>
-          </a:ln>
-        </p:spPr>
-        <p:style>
-          <a:lnRef idx="1">
-            <a:schemeClr val="accent1"/>
-          </a:lnRef>
-          <a:fillRef idx="0">
-            <a:schemeClr val="accent1"/>
-          </a:fillRef>
-          <a:effectRef idx="0">
-            <a:schemeClr val="accent1"/>
-          </a:effectRef>
-          <a:fontRef idx="minor">
-            <a:schemeClr val="tx1"/>
-          </a:fontRef>
-        </p:style>
-      </p:cxnSp>
-      <p:cxnSp>
-        <p:nvCxnSpPr>
-          <p:cNvPr id="50" name="Elbow Connector 49"/>
-          <p:cNvCxnSpPr/>
-          <p:nvPr/>
-        </p:nvCxnSpPr>
-        <p:spPr>
-          <a:xfrm flipV="1">
-            <a:off x="3007502" y="494615"/>
-            <a:ext cx="381000" cy="228600"/>
-          </a:xfrm>
-          <a:prstGeom prst="bentConnector3">
-            <a:avLst/>
-          </a:prstGeom>
-          <a:ln w="15875">
-            <a:prstDash val="sysDot"/>
-          </a:ln>
-        </p:spPr>
-        <p:style>
-          <a:lnRef idx="1">
-            <a:schemeClr val="accent1"/>
-          </a:lnRef>
-          <a:fillRef idx="0">
-            <a:schemeClr val="accent1"/>
-          </a:fillRef>
-          <a:effectRef idx="0">
-            <a:schemeClr val="accent1"/>
-          </a:effectRef>
-          <a:fontRef idx="minor">
-            <a:schemeClr val="tx1"/>
-          </a:fontRef>
-        </p:style>
-      </p:cxnSp>
-      <p:cxnSp>
-        <p:nvCxnSpPr>
-          <p:cNvPr id="51" name="Elbow Connector 50"/>
-          <p:cNvCxnSpPr/>
-          <p:nvPr/>
-        </p:nvCxnSpPr>
-        <p:spPr>
-          <a:xfrm>
-            <a:off x="3274202" y="494615"/>
-            <a:ext cx="279057" cy="113270"/>
-          </a:xfrm>
-          <a:prstGeom prst="bentConnector3">
-            <a:avLst>
-              <a:gd name="adj1" fmla="val 50000"/>
-            </a:avLst>
-          </a:prstGeom>
-          <a:ln w="15875">
-            <a:prstDash val="sysDot"/>
-          </a:ln>
-        </p:spPr>
-        <p:style>
-          <a:lnRef idx="1">
-            <a:schemeClr val="accent1"/>
-          </a:lnRef>
-          <a:fillRef idx="0">
-            <a:schemeClr val="accent1"/>
-          </a:fillRef>
-          <a:effectRef idx="0">
-            <a:schemeClr val="accent1"/>
-          </a:effectRef>
-          <a:fontRef idx="minor">
-            <a:schemeClr val="tx1"/>
-          </a:fontRef>
-        </p:style>
-      </p:cxnSp>
-      <p:cxnSp>
-        <p:nvCxnSpPr>
-          <p:cNvPr id="52" name="Elbow Connector 51"/>
-          <p:cNvCxnSpPr/>
-          <p:nvPr/>
-        </p:nvCxnSpPr>
-        <p:spPr>
-          <a:xfrm>
-            <a:off x="3433472" y="605826"/>
-            <a:ext cx="379456" cy="118419"/>
-          </a:xfrm>
-          <a:prstGeom prst="bentConnector3">
-            <a:avLst>
-              <a:gd name="adj1" fmla="val 50000"/>
-            </a:avLst>
-          </a:prstGeom>
-          <a:ln w="15875">
-            <a:prstDash val="sysDot"/>
-          </a:ln>
-        </p:spPr>
-        <p:style>
-          <a:lnRef idx="1">
-            <a:schemeClr val="accent1"/>
-          </a:lnRef>
-          <a:fillRef idx="0">
-            <a:schemeClr val="accent1"/>
-          </a:fillRef>
-          <a:effectRef idx="0">
-            <a:schemeClr val="accent1"/>
-          </a:effectRef>
-          <a:fontRef idx="minor">
-            <a:schemeClr val="tx1"/>
-          </a:fontRef>
-        </p:style>
-      </p:cxnSp>
-      <p:sp>
-        <p:nvSpPr>
-          <p:cNvPr id="58" name="Oval 57"/>
-          <p:cNvSpPr/>
-          <p:nvPr/>
-        </p:nvSpPr>
-        <p:spPr>
-          <a:xfrm>
-            <a:off x="496903" y="1524000"/>
-            <a:ext cx="457201" cy="266700"/>
-          </a:xfrm>
-          <a:prstGeom prst="ellipse">
-            <a:avLst/>
-          </a:prstGeom>
-          <a:solidFill>
-            <a:schemeClr val="accent5">
-              <a:lumMod val="40000"/>
-              <a:lumOff val="60000"/>
-            </a:schemeClr>
-          </a:solidFill>
-          <a:ln w="12700">
+              </a:endParaRPr>
+            </a:p>
+          </p:txBody>
+        </p:sp>
+        <p:sp>
+          <p:nvSpPr>
+            <p:cNvPr id="46" name="TextBox 45"/>
+            <p:cNvSpPr txBox="1"/>
+            <p:nvPr/>
+          </p:nvSpPr>
+          <p:spPr>
+            <a:xfrm>
+              <a:off x="2593120" y="85810"/>
+              <a:ext cx="274434" cy="307777"/>
+            </a:xfrm>
+            <a:prstGeom prst="rect">
+              <a:avLst/>
+            </a:prstGeom>
+            <a:noFill/>
+          </p:spPr>
+          <p:txBody>
+            <a:bodyPr wrap="none" rtlCol="0">
+              <a:spAutoFit/>
+            </a:bodyPr>
+            <a:lstStyle/>
+            <a:p>
+              <a:r>
+                <a:rPr lang="en-US" sz="1400" i="1" dirty="0" smtClean="0">
+                  <a:latin typeface="Times New Roman" pitchFamily="18" charset="0"/>
+                  <a:cs typeface="Times New Roman" pitchFamily="18" charset="0"/>
+                </a:rPr>
+                <a:t>4</a:t>
+              </a:r>
+              <a:endParaRPr lang="en-US" sz="1400" i="1" dirty="0">
+                <a:latin typeface="Times New Roman" pitchFamily="18" charset="0"/>
+                <a:cs typeface="Times New Roman" pitchFamily="18" charset="0"/>
+              </a:endParaRPr>
+            </a:p>
+          </p:txBody>
+        </p:sp>
+        <p:sp>
+          <p:nvSpPr>
+            <p:cNvPr id="58" name="Oval 57"/>
+            <p:cNvSpPr/>
+            <p:nvPr/>
+          </p:nvSpPr>
+          <p:spPr>
+            <a:xfrm>
+              <a:off x="232562" y="1524000"/>
+              <a:ext cx="457201" cy="266700"/>
+            </a:xfrm>
+            <a:prstGeom prst="ellipse">
+              <a:avLst/>
+            </a:prstGeom>
             <a:solidFill>
-              <a:schemeClr val="tx1"/>
+              <a:srgbClr val="C1EEF7"/>
             </a:solidFill>
-          </a:ln>
-        </p:spPr>
-        <p:style>
-          <a:lnRef idx="2">
-            <a:schemeClr val="accent5">
-              <a:shade val="50000"/>
-            </a:schemeClr>
-          </a:lnRef>
-          <a:fillRef idx="1">
-            <a:schemeClr val="accent5"/>
-          </a:fillRef>
-          <a:effectRef idx="0">
-            <a:schemeClr val="accent5"/>
-          </a:effectRef>
-          <a:fontRef idx="minor">
-            <a:schemeClr val="lt1"/>
-          </a:fontRef>
-        </p:style>
-        <p:txBody>
-          <a:bodyPr lIns="0" tIns="0" rIns="0" bIns="0" rtlCol="0" anchor="ctr"/>
-          <a:lstStyle/>
-          <a:p>
-            <a:pPr algn="ctr"/>
-            <a:r>
-              <a:rPr lang="en-US" sz="900" b="1" i="1" dirty="0">
+            <a:ln w="12700">
+              <a:solidFill>
+                <a:schemeClr val="tx1"/>
+              </a:solidFill>
+            </a:ln>
+          </p:spPr>
+          <p:style>
+            <a:lnRef idx="2">
+              <a:schemeClr val="accent5">
+                <a:shade val="50000"/>
+              </a:schemeClr>
+            </a:lnRef>
+            <a:fillRef idx="1">
+              <a:schemeClr val="accent5"/>
+            </a:fillRef>
+            <a:effectRef idx="0">
+              <a:schemeClr val="accent5"/>
+            </a:effectRef>
+            <a:fontRef idx="minor">
+              <a:schemeClr val="lt1"/>
+            </a:fontRef>
+          </p:style>
+          <p:txBody>
+            <a:bodyPr lIns="0" tIns="0" rIns="0" bIns="0" rtlCol="0" anchor="ctr"/>
+            <a:lstStyle/>
+            <a:p>
+              <a:pPr algn="ctr"/>
+              <a:r>
+                <a:rPr lang="en-US" sz="900" b="1" i="1" dirty="0">
+                  <a:solidFill>
+                    <a:schemeClr val="tx1"/>
+                  </a:solidFill>
+                  <a:latin typeface="Times New Roman" pitchFamily="18" charset="0"/>
+                  <a:cs typeface="Times New Roman" pitchFamily="18" charset="0"/>
+                </a:rPr>
+                <a:t>x &lt; </a:t>
+              </a:r>
+              <a:r>
+                <a:rPr lang="en-US" sz="900" b="1" dirty="0">
+                  <a:solidFill>
+                    <a:schemeClr val="tx1"/>
+                  </a:solidFill>
+                  <a:latin typeface="Times New Roman" pitchFamily="18" charset="0"/>
+                  <a:cs typeface="Times New Roman" pitchFamily="18" charset="0"/>
+                </a:rPr>
+                <a:t>1</a:t>
+              </a:r>
+            </a:p>
+          </p:txBody>
+        </p:sp>
+        <p:sp>
+          <p:nvSpPr>
+            <p:cNvPr id="61" name="Oval 60"/>
+            <p:cNvSpPr/>
+            <p:nvPr/>
+          </p:nvSpPr>
+          <p:spPr>
+            <a:xfrm>
+              <a:off x="571460" y="1834633"/>
+              <a:ext cx="457201" cy="266700"/>
+            </a:xfrm>
+            <a:prstGeom prst="ellipse">
+              <a:avLst/>
+            </a:prstGeom>
+            <a:solidFill>
+              <a:srgbClr val="C1EEF7"/>
+            </a:solidFill>
+            <a:ln w="12700">
+              <a:solidFill>
+                <a:schemeClr val="tx1"/>
+              </a:solidFill>
+            </a:ln>
+          </p:spPr>
+          <p:style>
+            <a:lnRef idx="2">
+              <a:schemeClr val="accent5">
+                <a:shade val="50000"/>
+              </a:schemeClr>
+            </a:lnRef>
+            <a:fillRef idx="1">
+              <a:schemeClr val="accent5"/>
+            </a:fillRef>
+            <a:effectRef idx="0">
+              <a:schemeClr val="accent5"/>
+            </a:effectRef>
+            <a:fontRef idx="minor">
+              <a:schemeClr val="lt1"/>
+            </a:fontRef>
+          </p:style>
+          <p:txBody>
+            <a:bodyPr lIns="0" tIns="0" rIns="0" bIns="0" rtlCol="0" anchor="ctr"/>
+            <a:lstStyle/>
+            <a:p>
+              <a:pPr algn="ctr"/>
+              <a:r>
+                <a:rPr lang="en-US" sz="900" b="1" i="1" dirty="0">
+                  <a:solidFill>
+                    <a:schemeClr val="tx1"/>
+                  </a:solidFill>
+                  <a:latin typeface="Times New Roman" pitchFamily="18" charset="0"/>
+                  <a:cs typeface="Times New Roman" pitchFamily="18" charset="0"/>
+                </a:rPr>
+                <a:t>x &lt; </a:t>
+              </a:r>
+              <a:r>
+                <a:rPr lang="en-US" sz="900" b="1" dirty="0">
+                  <a:solidFill>
+                    <a:schemeClr val="tx1"/>
+                  </a:solidFill>
+                  <a:latin typeface="Times New Roman" pitchFamily="18" charset="0"/>
+                  <a:cs typeface="Times New Roman" pitchFamily="18" charset="0"/>
+                </a:rPr>
+                <a:t>2</a:t>
+              </a:r>
+            </a:p>
+          </p:txBody>
+        </p:sp>
+        <p:sp>
+          <p:nvSpPr>
+            <p:cNvPr id="62" name="Oval 61"/>
+            <p:cNvSpPr/>
+            <p:nvPr/>
+          </p:nvSpPr>
+          <p:spPr>
+            <a:xfrm>
+              <a:off x="959331" y="2146942"/>
+              <a:ext cx="457201" cy="266700"/>
+            </a:xfrm>
+            <a:prstGeom prst="ellipse">
+              <a:avLst/>
+            </a:prstGeom>
+            <a:solidFill>
+              <a:srgbClr val="C1EEF7"/>
+            </a:solidFill>
+            <a:ln w="12700">
+              <a:solidFill>
+                <a:schemeClr val="tx1"/>
+              </a:solidFill>
+            </a:ln>
+          </p:spPr>
+          <p:style>
+            <a:lnRef idx="2">
+              <a:schemeClr val="accent5">
+                <a:shade val="50000"/>
+              </a:schemeClr>
+            </a:lnRef>
+            <a:fillRef idx="1">
+              <a:schemeClr val="accent5"/>
+            </a:fillRef>
+            <a:effectRef idx="0">
+              <a:schemeClr val="accent5"/>
+            </a:effectRef>
+            <a:fontRef idx="minor">
+              <a:schemeClr val="lt1"/>
+            </a:fontRef>
+          </p:style>
+          <p:txBody>
+            <a:bodyPr lIns="0" tIns="0" rIns="0" bIns="0" rtlCol="0" anchor="ctr"/>
+            <a:lstStyle/>
+            <a:p>
+              <a:pPr algn="ctr"/>
+              <a:r>
+                <a:rPr lang="en-US" sz="900" b="1" i="1" dirty="0">
+                  <a:solidFill>
+                    <a:schemeClr val="tx1"/>
+                  </a:solidFill>
+                  <a:latin typeface="Times New Roman" pitchFamily="18" charset="0"/>
+                  <a:cs typeface="Times New Roman" pitchFamily="18" charset="0"/>
+                </a:rPr>
+                <a:t>x &lt; </a:t>
+              </a:r>
+              <a:r>
+                <a:rPr lang="en-US" sz="900" b="1" dirty="0">
+                  <a:solidFill>
+                    <a:schemeClr val="tx1"/>
+                  </a:solidFill>
+                  <a:latin typeface="Times New Roman" pitchFamily="18" charset="0"/>
+                  <a:cs typeface="Times New Roman" pitchFamily="18" charset="0"/>
+                </a:rPr>
+                <a:t>3</a:t>
+              </a:r>
+            </a:p>
+          </p:txBody>
+        </p:sp>
+        <p:sp>
+          <p:nvSpPr>
+            <p:cNvPr id="63" name="Oval 62"/>
+            <p:cNvSpPr/>
+            <p:nvPr/>
+          </p:nvSpPr>
+          <p:spPr>
+            <a:xfrm>
+              <a:off x="1342428" y="2443929"/>
+              <a:ext cx="457201" cy="266700"/>
+            </a:xfrm>
+            <a:prstGeom prst="ellipse">
+              <a:avLst/>
+            </a:prstGeom>
+            <a:solidFill>
+              <a:srgbClr val="C1EEF7"/>
+            </a:solidFill>
+            <a:ln w="12700">
+              <a:solidFill>
+                <a:schemeClr val="tx1"/>
+              </a:solidFill>
+            </a:ln>
+          </p:spPr>
+          <p:style>
+            <a:lnRef idx="2">
+              <a:schemeClr val="accent5">
+                <a:shade val="50000"/>
+              </a:schemeClr>
+            </a:lnRef>
+            <a:fillRef idx="1">
+              <a:schemeClr val="accent5"/>
+            </a:fillRef>
+            <a:effectRef idx="0">
+              <a:schemeClr val="accent5"/>
+            </a:effectRef>
+            <a:fontRef idx="minor">
+              <a:schemeClr val="lt1"/>
+            </a:fontRef>
+          </p:style>
+          <p:txBody>
+            <a:bodyPr lIns="0" tIns="0" rIns="0" bIns="0" rtlCol="0" anchor="ctr"/>
+            <a:lstStyle/>
+            <a:p>
+              <a:pPr algn="ctr"/>
+              <a:r>
+                <a:rPr lang="en-US" sz="900" b="1" i="1" dirty="0">
+                  <a:solidFill>
+                    <a:schemeClr val="tx1"/>
+                  </a:solidFill>
+                  <a:latin typeface="Times New Roman" pitchFamily="18" charset="0"/>
+                  <a:cs typeface="Times New Roman" pitchFamily="18" charset="0"/>
+                </a:rPr>
+                <a:t>x </a:t>
+              </a:r>
+              <a:r>
+                <a:rPr lang="en-US" sz="900" b="1" i="1" dirty="0" smtClean="0">
+                  <a:solidFill>
+                    <a:schemeClr val="tx1"/>
+                  </a:solidFill>
+                  <a:latin typeface="Times New Roman" pitchFamily="18" charset="0"/>
+                  <a:cs typeface="Times New Roman" pitchFamily="18" charset="0"/>
+                </a:rPr>
+                <a:t>&lt; </a:t>
+              </a:r>
+              <a:r>
+                <a:rPr lang="en-US" sz="900" b="1" dirty="0">
+                  <a:solidFill>
+                    <a:schemeClr val="tx1"/>
+                  </a:solidFill>
+                  <a:latin typeface="Times New Roman" pitchFamily="18" charset="0"/>
+                  <a:cs typeface="Times New Roman" pitchFamily="18" charset="0"/>
+                </a:rPr>
+                <a:t>4</a:t>
+              </a:r>
+            </a:p>
+          </p:txBody>
+        </p:sp>
+        <p:sp>
+          <p:nvSpPr>
+            <p:cNvPr id="64" name="Rectangle 63"/>
+            <p:cNvSpPr/>
+            <p:nvPr/>
+          </p:nvSpPr>
+          <p:spPr>
+            <a:xfrm>
+              <a:off x="76200" y="2863333"/>
+              <a:ext cx="266699" cy="228600"/>
+            </a:xfrm>
+            <a:prstGeom prst="rect">
+              <a:avLst/>
+            </a:prstGeom>
+            <a:solidFill>
+              <a:srgbClr val="FFB9B9"/>
+            </a:solidFill>
+            <a:ln w="12700">
+              <a:solidFill>
+                <a:schemeClr val="tx1"/>
+              </a:solidFill>
+            </a:ln>
+          </p:spPr>
+          <p:style>
+            <a:lnRef idx="2">
+              <a:schemeClr val="accent1">
+                <a:shade val="50000"/>
+              </a:schemeClr>
+            </a:lnRef>
+            <a:fillRef idx="1">
+              <a:schemeClr val="accent1"/>
+            </a:fillRef>
+            <a:effectRef idx="0">
+              <a:schemeClr val="accent1"/>
+            </a:effectRef>
+            <a:fontRef idx="minor">
+              <a:schemeClr val="lt1"/>
+            </a:fontRef>
+          </p:style>
+          <p:txBody>
+            <a:bodyPr lIns="0" tIns="0" rIns="0" bIns="0" rtlCol="0" anchor="ctr"/>
+            <a:lstStyle/>
+            <a:p>
+              <a:pPr algn="ctr"/>
+              <a:r>
+                <a:rPr lang="en-US" sz="900" b="1" dirty="0">
+                  <a:solidFill>
+                    <a:schemeClr val="tx1"/>
+                  </a:solidFill>
+                  <a:latin typeface="Times New Roman" pitchFamily="18" charset="0"/>
+                  <a:cs typeface="Times New Roman" pitchFamily="18" charset="0"/>
+                </a:rPr>
+                <a:t>1</a:t>
+              </a:r>
+            </a:p>
+          </p:txBody>
+        </p:sp>
+        <p:sp>
+          <p:nvSpPr>
+            <p:cNvPr id="65" name="Rectangle 64"/>
+            <p:cNvSpPr/>
+            <p:nvPr/>
+          </p:nvSpPr>
+          <p:spPr>
+            <a:xfrm>
+              <a:off x="524465" y="2863333"/>
+              <a:ext cx="266699" cy="228600"/>
+            </a:xfrm>
+            <a:prstGeom prst="rect">
+              <a:avLst/>
+            </a:prstGeom>
+            <a:solidFill>
+              <a:srgbClr val="FFB9B9"/>
+            </a:solidFill>
+            <a:ln w="12700">
+              <a:solidFill>
+                <a:schemeClr val="tx1"/>
+              </a:solidFill>
+            </a:ln>
+          </p:spPr>
+          <p:style>
+            <a:lnRef idx="2">
+              <a:schemeClr val="accent1">
+                <a:shade val="50000"/>
+              </a:schemeClr>
+            </a:lnRef>
+            <a:fillRef idx="1">
+              <a:schemeClr val="accent1"/>
+            </a:fillRef>
+            <a:effectRef idx="0">
+              <a:schemeClr val="accent1"/>
+            </a:effectRef>
+            <a:fontRef idx="minor">
+              <a:schemeClr val="lt1"/>
+            </a:fontRef>
+          </p:style>
+          <p:txBody>
+            <a:bodyPr lIns="0" tIns="0" rIns="0" bIns="0" rtlCol="0" anchor="ctr"/>
+            <a:lstStyle/>
+            <a:p>
+              <a:pPr algn="ctr"/>
+              <a:r>
+                <a:rPr lang="en-US" sz="900" b="1" dirty="0">
+                  <a:solidFill>
+                    <a:schemeClr val="tx1"/>
+                  </a:solidFill>
+                  <a:latin typeface="Times New Roman" pitchFamily="18" charset="0"/>
+                  <a:cs typeface="Times New Roman" pitchFamily="18" charset="0"/>
+                </a:rPr>
+                <a:t>2</a:t>
+              </a:r>
+            </a:p>
+          </p:txBody>
+        </p:sp>
+        <p:sp>
+          <p:nvSpPr>
+            <p:cNvPr id="66" name="Rectangle 65"/>
+            <p:cNvSpPr/>
+            <p:nvPr/>
+          </p:nvSpPr>
+          <p:spPr>
+            <a:xfrm>
+              <a:off x="972730" y="2863333"/>
+              <a:ext cx="266699" cy="228600"/>
+            </a:xfrm>
+            <a:prstGeom prst="rect">
+              <a:avLst/>
+            </a:prstGeom>
+            <a:solidFill>
+              <a:srgbClr val="FFB9B9"/>
+            </a:solidFill>
+            <a:ln w="12700">
+              <a:solidFill>
+                <a:schemeClr val="tx1"/>
+              </a:solidFill>
+            </a:ln>
+          </p:spPr>
+          <p:style>
+            <a:lnRef idx="2">
+              <a:schemeClr val="accent1">
+                <a:shade val="50000"/>
+              </a:schemeClr>
+            </a:lnRef>
+            <a:fillRef idx="1">
+              <a:schemeClr val="accent1"/>
+            </a:fillRef>
+            <a:effectRef idx="0">
+              <a:schemeClr val="accent1"/>
+            </a:effectRef>
+            <a:fontRef idx="minor">
+              <a:schemeClr val="lt1"/>
+            </a:fontRef>
+          </p:style>
+          <p:txBody>
+            <a:bodyPr lIns="0" tIns="0" rIns="0" bIns="0" rtlCol="0" anchor="ctr"/>
+            <a:lstStyle/>
+            <a:p>
+              <a:pPr algn="ctr"/>
+              <a:r>
+                <a:rPr lang="en-US" sz="900" b="1" dirty="0">
+                  <a:solidFill>
+                    <a:schemeClr val="tx1"/>
+                  </a:solidFill>
+                  <a:latin typeface="Times New Roman" pitchFamily="18" charset="0"/>
+                  <a:cs typeface="Times New Roman" pitchFamily="18" charset="0"/>
+                </a:rPr>
+                <a:t>3</a:t>
+              </a:r>
+            </a:p>
+          </p:txBody>
+        </p:sp>
+        <p:sp>
+          <p:nvSpPr>
+            <p:cNvPr id="67" name="Rectangle 66"/>
+            <p:cNvSpPr/>
+            <p:nvPr/>
+          </p:nvSpPr>
+          <p:spPr>
+            <a:xfrm>
+              <a:off x="1420995" y="2863333"/>
+              <a:ext cx="300627" cy="228600"/>
+            </a:xfrm>
+            <a:prstGeom prst="rect">
+              <a:avLst/>
+            </a:prstGeom>
+            <a:solidFill>
+              <a:srgbClr val="FFB9B9"/>
+            </a:solidFill>
+            <a:ln w="12700">
+              <a:solidFill>
+                <a:schemeClr val="tx1"/>
+              </a:solidFill>
+            </a:ln>
+          </p:spPr>
+          <p:style>
+            <a:lnRef idx="2">
+              <a:schemeClr val="accent1">
+                <a:shade val="50000"/>
+              </a:schemeClr>
+            </a:lnRef>
+            <a:fillRef idx="1">
+              <a:schemeClr val="accent1"/>
+            </a:fillRef>
+            <a:effectRef idx="0">
+              <a:schemeClr val="accent1"/>
+            </a:effectRef>
+            <a:fontRef idx="minor">
+              <a:schemeClr val="lt1"/>
+            </a:fontRef>
+          </p:style>
+          <p:txBody>
+            <a:bodyPr lIns="0" tIns="0" rIns="0" bIns="0" rtlCol="0" anchor="ctr"/>
+            <a:lstStyle/>
+            <a:p>
+              <a:pPr algn="ctr"/>
+              <a:r>
+                <a:rPr lang="en-US" sz="900" b="1" dirty="0" smtClean="0">
+                  <a:solidFill>
+                    <a:schemeClr val="tx1"/>
+                  </a:solidFill>
+                  <a:latin typeface="Times New Roman" pitchFamily="18" charset="0"/>
+                  <a:cs typeface="Times New Roman" pitchFamily="18" charset="0"/>
+                </a:rPr>
+                <a:t>2.75</a:t>
+              </a:r>
+              <a:endParaRPr lang="en-US" sz="900" b="1" dirty="0">
                 <a:solidFill>
                   <a:schemeClr val="tx1"/>
                 </a:solidFill>
                 <a:latin typeface="Times New Roman" pitchFamily="18" charset="0"/>
                 <a:cs typeface="Times New Roman" pitchFamily="18" charset="0"/>
-              </a:rPr>
-              <a:t>x &lt; 1</a:t>
-            </a:r>
-          </a:p>
-        </p:txBody>
-      </p:sp>
-      <p:sp>
-        <p:nvSpPr>
-          <p:cNvPr id="61" name="Oval 60"/>
-          <p:cNvSpPr/>
-          <p:nvPr/>
-        </p:nvSpPr>
-        <p:spPr>
-          <a:xfrm>
-            <a:off x="835801" y="1834633"/>
-            <a:ext cx="457201" cy="266700"/>
-          </a:xfrm>
-          <a:prstGeom prst="ellipse">
-            <a:avLst/>
-          </a:prstGeom>
-          <a:solidFill>
-            <a:schemeClr val="accent5">
-              <a:lumMod val="40000"/>
-              <a:lumOff val="60000"/>
-            </a:schemeClr>
-          </a:solidFill>
-          <a:ln w="12700">
+              </a:endParaRPr>
+            </a:p>
+          </p:txBody>
+        </p:sp>
+        <p:cxnSp>
+          <p:nvCxnSpPr>
+            <p:cNvPr id="69" name="Straight Arrow Connector 68"/>
+            <p:cNvCxnSpPr>
+              <a:stCxn id="58" idx="4"/>
+              <a:endCxn id="64" idx="0"/>
+            </p:cNvCxnSpPr>
+            <p:nvPr/>
+          </p:nvCxnSpPr>
+          <p:spPr>
+            <a:xfrm flipH="1">
+              <a:off x="209550" y="1790700"/>
+              <a:ext cx="251613" cy="1072633"/>
+            </a:xfrm>
+            <a:prstGeom prst="straightConnector1">
+              <a:avLst/>
+            </a:prstGeom>
+            <a:ln w="12700">
+              <a:solidFill>
+                <a:schemeClr val="tx1"/>
+              </a:solidFill>
+              <a:tailEnd type="triangle" w="med" len="med"/>
+            </a:ln>
+          </p:spPr>
+          <p:style>
+            <a:lnRef idx="1">
+              <a:schemeClr val="accent1"/>
+            </a:lnRef>
+            <a:fillRef idx="0">
+              <a:schemeClr val="accent1"/>
+            </a:fillRef>
+            <a:effectRef idx="0">
+              <a:schemeClr val="accent1"/>
+            </a:effectRef>
+            <a:fontRef idx="minor">
+              <a:schemeClr val="tx1"/>
+            </a:fontRef>
+          </p:style>
+        </p:cxnSp>
+        <p:cxnSp>
+          <p:nvCxnSpPr>
+            <p:cNvPr id="70" name="Straight Arrow Connector 69"/>
+            <p:cNvCxnSpPr>
+              <a:stCxn id="61" idx="4"/>
+              <a:endCxn id="65" idx="0"/>
+            </p:cNvCxnSpPr>
+            <p:nvPr/>
+          </p:nvCxnSpPr>
+          <p:spPr>
+            <a:xfrm flipH="1">
+              <a:off x="657815" y="2101333"/>
+              <a:ext cx="142246" cy="762000"/>
+            </a:xfrm>
+            <a:prstGeom prst="straightConnector1">
+              <a:avLst/>
+            </a:prstGeom>
+            <a:ln w="12700">
+              <a:solidFill>
+                <a:schemeClr val="tx1"/>
+              </a:solidFill>
+              <a:tailEnd type="triangle" w="med" len="med"/>
+            </a:ln>
+          </p:spPr>
+          <p:style>
+            <a:lnRef idx="1">
+              <a:schemeClr val="accent1"/>
+            </a:lnRef>
+            <a:fillRef idx="0">
+              <a:schemeClr val="accent1"/>
+            </a:fillRef>
+            <a:effectRef idx="0">
+              <a:schemeClr val="accent1"/>
+            </a:effectRef>
+            <a:fontRef idx="minor">
+              <a:schemeClr val="tx1"/>
+            </a:fontRef>
+          </p:style>
+        </p:cxnSp>
+        <p:cxnSp>
+          <p:nvCxnSpPr>
+            <p:cNvPr id="72" name="Straight Arrow Connector 71"/>
+            <p:cNvCxnSpPr>
+              <a:stCxn id="62" idx="4"/>
+              <a:endCxn id="66" idx="0"/>
+            </p:cNvCxnSpPr>
+            <p:nvPr/>
+          </p:nvCxnSpPr>
+          <p:spPr>
+            <a:xfrm flipH="1">
+              <a:off x="1106080" y="2413642"/>
+              <a:ext cx="81852" cy="449691"/>
+            </a:xfrm>
+            <a:prstGeom prst="straightConnector1">
+              <a:avLst/>
+            </a:prstGeom>
+            <a:ln w="12700">
+              <a:solidFill>
+                <a:schemeClr val="tx1"/>
+              </a:solidFill>
+              <a:tailEnd type="triangle" w="med" len="med"/>
+            </a:ln>
+          </p:spPr>
+          <p:style>
+            <a:lnRef idx="1">
+              <a:schemeClr val="accent1"/>
+            </a:lnRef>
+            <a:fillRef idx="0">
+              <a:schemeClr val="accent1"/>
+            </a:fillRef>
+            <a:effectRef idx="0">
+              <a:schemeClr val="accent1"/>
+            </a:effectRef>
+            <a:fontRef idx="minor">
+              <a:schemeClr val="tx1"/>
+            </a:fontRef>
+          </p:style>
+        </p:cxnSp>
+        <p:cxnSp>
+          <p:nvCxnSpPr>
+            <p:cNvPr id="75" name="Straight Arrow Connector 74"/>
+            <p:cNvCxnSpPr/>
+            <p:nvPr/>
+          </p:nvCxnSpPr>
+          <p:spPr>
+            <a:xfrm>
+              <a:off x="1721622" y="2681288"/>
+              <a:ext cx="316728" cy="176212"/>
+            </a:xfrm>
+            <a:prstGeom prst="straightConnector1">
+              <a:avLst/>
+            </a:prstGeom>
+            <a:ln w="12700">
+              <a:solidFill>
+                <a:schemeClr val="tx1"/>
+              </a:solidFill>
+              <a:prstDash val="sysDash"/>
+              <a:tailEnd type="triangle" w="med" len="med"/>
+            </a:ln>
+          </p:spPr>
+          <p:style>
+            <a:lnRef idx="1">
+              <a:schemeClr val="accent1"/>
+            </a:lnRef>
+            <a:fillRef idx="0">
+              <a:schemeClr val="accent1"/>
+            </a:fillRef>
+            <a:effectRef idx="0">
+              <a:schemeClr val="accent1"/>
+            </a:effectRef>
+            <a:fontRef idx="minor">
+              <a:schemeClr val="tx1"/>
+            </a:fontRef>
+          </p:style>
+        </p:cxnSp>
+        <p:cxnSp>
+          <p:nvCxnSpPr>
+            <p:cNvPr id="77" name="Straight Arrow Connector 76"/>
+            <p:cNvCxnSpPr/>
+            <p:nvPr/>
+          </p:nvCxnSpPr>
+          <p:spPr>
+            <a:xfrm flipH="1">
+              <a:off x="1536043" y="2714625"/>
+              <a:ext cx="33179" cy="142875"/>
+            </a:xfrm>
+            <a:prstGeom prst="straightConnector1">
+              <a:avLst/>
+            </a:prstGeom>
+            <a:ln w="12700">
+              <a:solidFill>
+                <a:schemeClr val="tx1"/>
+              </a:solidFill>
+              <a:prstDash val="solid"/>
+              <a:tailEnd type="triangle" w="med" len="med"/>
+            </a:ln>
+          </p:spPr>
+          <p:style>
+            <a:lnRef idx="1">
+              <a:schemeClr val="accent1"/>
+            </a:lnRef>
+            <a:fillRef idx="0">
+              <a:schemeClr val="accent1"/>
+            </a:fillRef>
+            <a:effectRef idx="0">
+              <a:schemeClr val="accent1"/>
+            </a:effectRef>
+            <a:fontRef idx="minor">
+              <a:schemeClr val="tx1"/>
+            </a:fontRef>
+          </p:style>
+        </p:cxnSp>
+        <p:cxnSp>
+          <p:nvCxnSpPr>
+            <p:cNvPr id="80" name="Straight Arrow Connector 79"/>
+            <p:cNvCxnSpPr/>
+            <p:nvPr/>
+          </p:nvCxnSpPr>
+          <p:spPr>
+            <a:xfrm>
+              <a:off x="1391464" y="2348468"/>
+              <a:ext cx="189471" cy="98854"/>
+            </a:xfrm>
+            <a:prstGeom prst="straightConnector1">
+              <a:avLst/>
+            </a:prstGeom>
+            <a:ln w="12700">
+              <a:solidFill>
+                <a:schemeClr val="tx1"/>
+              </a:solidFill>
+              <a:prstDash val="sysDash"/>
+              <a:tailEnd type="triangle" w="med" len="med"/>
+            </a:ln>
+          </p:spPr>
+          <p:style>
+            <a:lnRef idx="1">
+              <a:schemeClr val="accent1"/>
+            </a:lnRef>
+            <a:fillRef idx="0">
+              <a:schemeClr val="accent1"/>
+            </a:fillRef>
+            <a:effectRef idx="0">
+              <a:schemeClr val="accent1"/>
+            </a:effectRef>
+            <a:fontRef idx="minor">
+              <a:schemeClr val="tx1"/>
+            </a:fontRef>
+          </p:style>
+        </p:cxnSp>
+        <p:cxnSp>
+          <p:nvCxnSpPr>
+            <p:cNvPr id="83" name="Straight Arrow Connector 82"/>
+            <p:cNvCxnSpPr/>
+            <p:nvPr/>
+          </p:nvCxnSpPr>
+          <p:spPr>
+            <a:xfrm>
+              <a:off x="1012524" y="2035430"/>
+              <a:ext cx="205946" cy="123568"/>
+            </a:xfrm>
+            <a:prstGeom prst="straightConnector1">
+              <a:avLst/>
+            </a:prstGeom>
+            <a:ln w="12700">
+              <a:solidFill>
+                <a:schemeClr val="tx1"/>
+              </a:solidFill>
+              <a:prstDash val="sysDash"/>
+              <a:tailEnd type="triangle" w="med" len="med"/>
+            </a:ln>
+          </p:spPr>
+          <p:style>
+            <a:lnRef idx="1">
+              <a:schemeClr val="accent1"/>
+            </a:lnRef>
+            <a:fillRef idx="0">
+              <a:schemeClr val="accent1"/>
+            </a:fillRef>
+            <a:effectRef idx="0">
+              <a:schemeClr val="accent1"/>
+            </a:effectRef>
+            <a:fontRef idx="minor">
+              <a:schemeClr val="tx1"/>
+            </a:fontRef>
+          </p:style>
+        </p:cxnSp>
+        <p:cxnSp>
+          <p:nvCxnSpPr>
+            <p:cNvPr id="85" name="Straight Arrow Connector 84"/>
+            <p:cNvCxnSpPr/>
+            <p:nvPr/>
+          </p:nvCxnSpPr>
+          <p:spPr>
+            <a:xfrm>
+              <a:off x="638416" y="1730629"/>
+              <a:ext cx="184638" cy="115331"/>
+            </a:xfrm>
+            <a:prstGeom prst="straightConnector1">
+              <a:avLst/>
+            </a:prstGeom>
+            <a:ln w="12700">
+              <a:solidFill>
+                <a:schemeClr val="tx1"/>
+              </a:solidFill>
+              <a:prstDash val="sysDash"/>
+              <a:tailEnd type="triangle" w="med" len="med"/>
+            </a:ln>
+          </p:spPr>
+          <p:style>
+            <a:lnRef idx="1">
+              <a:schemeClr val="accent1"/>
+            </a:lnRef>
+            <a:fillRef idx="0">
+              <a:schemeClr val="accent1"/>
+            </a:fillRef>
+            <a:effectRef idx="0">
+              <a:schemeClr val="accent1"/>
+            </a:effectRef>
+            <a:fontRef idx="minor">
+              <a:schemeClr val="tx1"/>
+            </a:fontRef>
+          </p:style>
+        </p:cxnSp>
+        <p:sp>
+          <p:nvSpPr>
+            <p:cNvPr id="105" name="Oval 104"/>
+            <p:cNvSpPr/>
+            <p:nvPr/>
+          </p:nvSpPr>
+          <p:spPr>
+            <a:xfrm>
+              <a:off x="3113031" y="1982157"/>
+              <a:ext cx="457201" cy="266700"/>
+            </a:xfrm>
+            <a:prstGeom prst="ellipse">
+              <a:avLst/>
+            </a:prstGeom>
             <a:solidFill>
-              <a:schemeClr val="tx1"/>
+              <a:srgbClr val="C1EEF7"/>
             </a:solidFill>
-          </a:ln>
-        </p:spPr>
-        <p:style>
-          <a:lnRef idx="2">
-            <a:schemeClr val="accent5">
-              <a:shade val="50000"/>
-            </a:schemeClr>
-          </a:lnRef>
-          <a:fillRef idx="1">
-            <a:schemeClr val="accent5"/>
-          </a:fillRef>
-          <a:effectRef idx="0">
-            <a:schemeClr val="accent5"/>
-          </a:effectRef>
-          <a:fontRef idx="minor">
-            <a:schemeClr val="lt1"/>
-          </a:fontRef>
-        </p:style>
-        <p:txBody>
-          <a:bodyPr lIns="0" tIns="0" rIns="0" bIns="0" rtlCol="0" anchor="ctr"/>
-          <a:lstStyle/>
-          <a:p>
-            <a:pPr algn="ctr"/>
-            <a:r>
-              <a:rPr lang="en-US" sz="900" b="1" i="1" dirty="0">
+            <a:ln w="12700">
+              <a:solidFill>
+                <a:schemeClr val="tx1"/>
+              </a:solidFill>
+            </a:ln>
+          </p:spPr>
+          <p:style>
+            <a:lnRef idx="2">
+              <a:schemeClr val="accent5">
+                <a:shade val="50000"/>
+              </a:schemeClr>
+            </a:lnRef>
+            <a:fillRef idx="1">
+              <a:schemeClr val="accent5"/>
+            </a:fillRef>
+            <a:effectRef idx="0">
+              <a:schemeClr val="accent5"/>
+            </a:effectRef>
+            <a:fontRef idx="minor">
+              <a:schemeClr val="lt1"/>
+            </a:fontRef>
+          </p:style>
+          <p:txBody>
+            <a:bodyPr lIns="0" tIns="0" rIns="0" bIns="0" rtlCol="0" anchor="ctr"/>
+            <a:lstStyle/>
+            <a:p>
+              <a:pPr algn="ctr"/>
+              <a:r>
+                <a:rPr lang="en-US" sz="900" b="1" i="1" dirty="0">
+                  <a:solidFill>
+                    <a:schemeClr val="tx1"/>
+                  </a:solidFill>
+                  <a:latin typeface="Times New Roman" pitchFamily="18" charset="0"/>
+                  <a:cs typeface="Times New Roman" pitchFamily="18" charset="0"/>
+                </a:rPr>
+                <a:t>x &lt; </a:t>
+              </a:r>
+              <a:r>
+                <a:rPr lang="en-US" sz="900" b="1" dirty="0">
+                  <a:solidFill>
+                    <a:schemeClr val="tx1"/>
+                  </a:solidFill>
+                  <a:latin typeface="Times New Roman" pitchFamily="18" charset="0"/>
+                  <a:cs typeface="Times New Roman" pitchFamily="18" charset="0"/>
+                </a:rPr>
+                <a:t>3</a:t>
+              </a:r>
+            </a:p>
+          </p:txBody>
+        </p:sp>
+        <p:sp>
+          <p:nvSpPr>
+            <p:cNvPr id="109" name="Rectangle 108"/>
+            <p:cNvSpPr/>
+            <p:nvPr/>
+          </p:nvSpPr>
+          <p:spPr>
+            <a:xfrm>
+              <a:off x="2669320" y="2514600"/>
+              <a:ext cx="607280" cy="228600"/>
+            </a:xfrm>
+            <a:prstGeom prst="rect">
+              <a:avLst/>
+            </a:prstGeom>
+            <a:solidFill>
+              <a:srgbClr val="FFB9B9"/>
+            </a:solidFill>
+            <a:ln w="12700">
+              <a:solidFill>
+                <a:schemeClr val="tx1"/>
+              </a:solidFill>
+            </a:ln>
+          </p:spPr>
+          <p:style>
+            <a:lnRef idx="2">
+              <a:schemeClr val="accent1">
+                <a:shade val="50000"/>
+              </a:schemeClr>
+            </a:lnRef>
+            <a:fillRef idx="1">
+              <a:schemeClr val="accent1"/>
+            </a:fillRef>
+            <a:effectRef idx="0">
+              <a:schemeClr val="accent1"/>
+            </a:effectRef>
+            <a:fontRef idx="minor">
+              <a:schemeClr val="lt1"/>
+            </a:fontRef>
+          </p:style>
+          <p:txBody>
+            <a:bodyPr lIns="0" tIns="0" rIns="0" bIns="0" rtlCol="0" anchor="ctr"/>
+            <a:lstStyle/>
+            <a:p>
+              <a:pPr algn="ctr"/>
+              <a:r>
+                <a:rPr lang="en-US" sz="900" b="1" dirty="0" smtClean="0">
+                  <a:solidFill>
+                    <a:schemeClr val="tx1"/>
+                  </a:solidFill>
+                  <a:latin typeface="Times New Roman" pitchFamily="18" charset="0"/>
+                  <a:cs typeface="Times New Roman" pitchFamily="18" charset="0"/>
+                </a:rPr>
+                <a:t>1 + 0.67</a:t>
+              </a:r>
+              <a:r>
+                <a:rPr lang="en-US" sz="900" b="1" i="1" dirty="0" smtClean="0">
+                  <a:solidFill>
+                    <a:schemeClr val="tx1"/>
+                  </a:solidFill>
+                  <a:latin typeface="Times New Roman" pitchFamily="18" charset="0"/>
+                  <a:cs typeface="Times New Roman" pitchFamily="18" charset="0"/>
+                </a:rPr>
+                <a:t>x</a:t>
+              </a:r>
+              <a:endParaRPr lang="en-US" sz="900" b="1" i="1" dirty="0">
                 <a:solidFill>
                   <a:schemeClr val="tx1"/>
                 </a:solidFill>
                 <a:latin typeface="Times New Roman" pitchFamily="18" charset="0"/>
                 <a:cs typeface="Times New Roman" pitchFamily="18" charset="0"/>
-              </a:rPr>
-              <a:t>x &lt; 2</a:t>
-            </a:r>
-          </a:p>
-        </p:txBody>
-      </p:sp>
-      <p:sp>
-        <p:nvSpPr>
-          <p:cNvPr id="62" name="Oval 61"/>
-          <p:cNvSpPr/>
-          <p:nvPr/>
-        </p:nvSpPr>
-        <p:spPr>
-          <a:xfrm>
-            <a:off x="1223672" y="2146942"/>
-            <a:ext cx="457201" cy="266700"/>
-          </a:xfrm>
-          <a:prstGeom prst="ellipse">
-            <a:avLst/>
-          </a:prstGeom>
-          <a:solidFill>
-            <a:schemeClr val="accent5">
-              <a:lumMod val="40000"/>
-              <a:lumOff val="60000"/>
-            </a:schemeClr>
-          </a:solidFill>
-          <a:ln w="12700">
+              </a:endParaRPr>
+            </a:p>
+          </p:txBody>
+        </p:sp>
+        <p:sp>
+          <p:nvSpPr>
+            <p:cNvPr id="110" name="Rectangle 109"/>
+            <p:cNvSpPr/>
+            <p:nvPr/>
+          </p:nvSpPr>
+          <p:spPr>
+            <a:xfrm>
+              <a:off x="3371850" y="2515887"/>
+              <a:ext cx="666750" cy="228600"/>
+            </a:xfrm>
+            <a:prstGeom prst="rect">
+              <a:avLst/>
+            </a:prstGeom>
             <a:solidFill>
-              <a:schemeClr val="tx1"/>
+              <a:srgbClr val="FFB9B9"/>
             </a:solidFill>
-          </a:ln>
-        </p:spPr>
-        <p:style>
-          <a:lnRef idx="2">
-            <a:schemeClr val="accent5">
-              <a:shade val="50000"/>
-            </a:schemeClr>
-          </a:lnRef>
-          <a:fillRef idx="1">
-            <a:schemeClr val="accent5"/>
-          </a:fillRef>
-          <a:effectRef idx="0">
-            <a:schemeClr val="accent5"/>
-          </a:effectRef>
-          <a:fontRef idx="minor">
-            <a:schemeClr val="lt1"/>
-          </a:fontRef>
-        </p:style>
-        <p:txBody>
-          <a:bodyPr lIns="0" tIns="0" rIns="0" bIns="0" rtlCol="0" anchor="ctr"/>
-          <a:lstStyle/>
-          <a:p>
-            <a:pPr algn="ctr"/>
-            <a:r>
-              <a:rPr lang="en-US" sz="900" b="1" i="1" dirty="0">
+            <a:ln w="12700">
+              <a:solidFill>
+                <a:schemeClr val="tx1"/>
+              </a:solidFill>
+            </a:ln>
+          </p:spPr>
+          <p:style>
+            <a:lnRef idx="2">
+              <a:schemeClr val="accent1">
+                <a:shade val="50000"/>
+              </a:schemeClr>
+            </a:lnRef>
+            <a:fillRef idx="1">
+              <a:schemeClr val="accent1"/>
+            </a:fillRef>
+            <a:effectRef idx="0">
+              <a:schemeClr val="accent1"/>
+            </a:effectRef>
+            <a:fontRef idx="minor">
+              <a:schemeClr val="lt1"/>
+            </a:fontRef>
+          </p:style>
+          <p:txBody>
+            <a:bodyPr lIns="0" tIns="0" rIns="0" bIns="0" rtlCol="0" anchor="ctr"/>
+            <a:lstStyle/>
+            <a:p>
+              <a:pPr algn="ctr"/>
+              <a:r>
+                <a:rPr lang="en-US" sz="900" b="1" dirty="0" smtClean="0">
+                  <a:solidFill>
+                    <a:schemeClr val="tx1"/>
+                  </a:solidFill>
+                  <a:latin typeface="Times New Roman" pitchFamily="18" charset="0"/>
+                  <a:cs typeface="Times New Roman" pitchFamily="18" charset="0"/>
+                </a:rPr>
+                <a:t>3.8 </a:t>
+              </a:r>
+              <a:r>
+                <a:rPr lang="en-US" sz="900" b="1" dirty="0">
+                  <a:solidFill>
+                    <a:schemeClr val="tx1"/>
+                  </a:solidFill>
+                  <a:latin typeface="Times New Roman" pitchFamily="18" charset="0"/>
+                  <a:cs typeface="Times New Roman" pitchFamily="18" charset="0"/>
+                </a:rPr>
+                <a:t>– </a:t>
+              </a:r>
+              <a:r>
+                <a:rPr lang="en-US" sz="900" b="1" dirty="0" smtClean="0">
+                  <a:solidFill>
+                    <a:schemeClr val="tx1"/>
+                  </a:solidFill>
+                  <a:latin typeface="Times New Roman" pitchFamily="18" charset="0"/>
+                  <a:cs typeface="Times New Roman" pitchFamily="18" charset="0"/>
+                </a:rPr>
+                <a:t>0.27</a:t>
+              </a:r>
+              <a:r>
+                <a:rPr lang="en-US" sz="900" b="1" i="1" dirty="0" smtClean="0">
+                  <a:solidFill>
+                    <a:schemeClr val="tx1"/>
+                  </a:solidFill>
+                  <a:latin typeface="Times New Roman" pitchFamily="18" charset="0"/>
+                  <a:cs typeface="Times New Roman" pitchFamily="18" charset="0"/>
+                </a:rPr>
+                <a:t>x</a:t>
+              </a:r>
+              <a:endParaRPr lang="en-US" sz="900" b="1" i="1" dirty="0">
                 <a:solidFill>
                   <a:schemeClr val="tx1"/>
                 </a:solidFill>
                 <a:latin typeface="Times New Roman" pitchFamily="18" charset="0"/>
                 <a:cs typeface="Times New Roman" pitchFamily="18" charset="0"/>
-              </a:rPr>
-              <a:t>x &lt; 3</a:t>
-            </a:r>
-          </a:p>
-        </p:txBody>
-      </p:sp>
-      <p:sp>
-        <p:nvSpPr>
-          <p:cNvPr id="63" name="Oval 62"/>
-          <p:cNvSpPr/>
-          <p:nvPr/>
-        </p:nvSpPr>
-        <p:spPr>
-          <a:xfrm>
-            <a:off x="1606769" y="2443929"/>
-            <a:ext cx="457201" cy="266700"/>
-          </a:xfrm>
-          <a:prstGeom prst="ellipse">
-            <a:avLst/>
-          </a:prstGeom>
-          <a:solidFill>
-            <a:schemeClr val="accent5">
-              <a:lumMod val="40000"/>
-              <a:lumOff val="60000"/>
-            </a:schemeClr>
-          </a:solidFill>
-          <a:ln w="12700">
+              </a:endParaRPr>
+            </a:p>
+          </p:txBody>
+        </p:sp>
+        <p:cxnSp>
+          <p:nvCxnSpPr>
+            <p:cNvPr id="113" name="Straight Arrow Connector 112"/>
+            <p:cNvCxnSpPr>
+              <a:endCxn id="109" idx="0"/>
+            </p:cNvCxnSpPr>
+            <p:nvPr/>
+          </p:nvCxnSpPr>
+          <p:spPr>
+            <a:xfrm flipH="1">
+              <a:off x="2972960" y="2247900"/>
+              <a:ext cx="303640" cy="266700"/>
+            </a:xfrm>
+            <a:prstGeom prst="straightConnector1">
+              <a:avLst/>
+            </a:prstGeom>
+            <a:ln w="12700">
+              <a:solidFill>
+                <a:schemeClr val="tx1"/>
+              </a:solidFill>
+              <a:tailEnd type="triangle" w="med" len="med"/>
+            </a:ln>
+          </p:spPr>
+          <p:style>
+            <a:lnRef idx="1">
+              <a:schemeClr val="accent1"/>
+            </a:lnRef>
+            <a:fillRef idx="0">
+              <a:schemeClr val="accent1"/>
+            </a:fillRef>
+            <a:effectRef idx="0">
+              <a:schemeClr val="accent1"/>
+            </a:effectRef>
+            <a:fontRef idx="minor">
+              <a:schemeClr val="tx1"/>
+            </a:fontRef>
+          </p:style>
+        </p:cxnSp>
+        <p:cxnSp>
+          <p:nvCxnSpPr>
+            <p:cNvPr id="125" name="Straight Arrow Connector 124"/>
+            <p:cNvCxnSpPr>
+              <a:endCxn id="110" idx="0"/>
+            </p:cNvCxnSpPr>
+            <p:nvPr/>
+          </p:nvCxnSpPr>
+          <p:spPr>
+            <a:xfrm>
+              <a:off x="3405188" y="2252663"/>
+              <a:ext cx="300037" cy="263224"/>
+            </a:xfrm>
+            <a:prstGeom prst="straightConnector1">
+              <a:avLst/>
+            </a:prstGeom>
+            <a:ln w="12700">
+              <a:solidFill>
+                <a:schemeClr val="tx1"/>
+              </a:solidFill>
+              <a:prstDash val="sysDash"/>
+              <a:tailEnd type="triangle" w="med" len="med"/>
+            </a:ln>
+          </p:spPr>
+          <p:style>
+            <a:lnRef idx="1">
+              <a:schemeClr val="accent1"/>
+            </a:lnRef>
+            <a:fillRef idx="0">
+              <a:schemeClr val="accent1"/>
+            </a:fillRef>
+            <a:effectRef idx="0">
+              <a:schemeClr val="accent1"/>
+            </a:effectRef>
+            <a:fontRef idx="minor">
+              <a:schemeClr val="tx1"/>
+            </a:fontRef>
+          </p:style>
+        </p:cxnSp>
+        <p:sp>
+          <p:nvSpPr>
+            <p:cNvPr id="156" name="TextBox 155"/>
+            <p:cNvSpPr txBox="1"/>
+            <p:nvPr/>
+          </p:nvSpPr>
+          <p:spPr>
+            <a:xfrm>
+              <a:off x="2095151" y="77912"/>
+              <a:ext cx="571849" cy="307777"/>
+            </a:xfrm>
+            <a:prstGeom prst="rect">
+              <a:avLst/>
+            </a:prstGeom>
+            <a:noFill/>
+          </p:spPr>
+          <p:txBody>
+            <a:bodyPr wrap="square" rtlCol="0">
+              <a:spAutoFit/>
+            </a:bodyPr>
+            <a:lstStyle/>
+            <a:p>
+              <a:r>
+                <a:rPr lang="en-US" sz="1400" dirty="0" smtClean="0">
+                  <a:latin typeface="Times New Roman" pitchFamily="18" charset="0"/>
+                  <a:cs typeface="Times New Roman" pitchFamily="18" charset="0"/>
+                </a:rPr>
+                <a:t>(b)</a:t>
+              </a:r>
+              <a:endParaRPr lang="en-US" sz="1400" dirty="0">
+                <a:latin typeface="Times New Roman" pitchFamily="18" charset="0"/>
+                <a:cs typeface="Times New Roman" pitchFamily="18" charset="0"/>
+              </a:endParaRPr>
+            </a:p>
+          </p:txBody>
+        </p:sp>
+        <p:cxnSp>
+          <p:nvCxnSpPr>
+            <p:cNvPr id="160" name="Elbow Connector 159"/>
+            <p:cNvCxnSpPr/>
+            <p:nvPr/>
+          </p:nvCxnSpPr>
+          <p:spPr>
+            <a:xfrm flipV="1">
+              <a:off x="2819400" y="721157"/>
+              <a:ext cx="381000" cy="228600"/>
+            </a:xfrm>
+            <a:prstGeom prst="bentConnector3">
+              <a:avLst/>
+            </a:prstGeom>
+            <a:ln w="15875">
+              <a:prstDash val="sysDot"/>
+            </a:ln>
+          </p:spPr>
+          <p:style>
+            <a:lnRef idx="1">
+              <a:schemeClr val="accent1"/>
+            </a:lnRef>
+            <a:fillRef idx="0">
+              <a:schemeClr val="accent1"/>
+            </a:fillRef>
+            <a:effectRef idx="0">
+              <a:schemeClr val="accent1"/>
+            </a:effectRef>
+            <a:fontRef idx="minor">
+              <a:schemeClr val="tx1"/>
+            </a:fontRef>
+          </p:style>
+        </p:cxnSp>
+        <p:cxnSp>
+          <p:nvCxnSpPr>
+            <p:cNvPr id="161" name="Elbow Connector 160"/>
+            <p:cNvCxnSpPr/>
+            <p:nvPr/>
+          </p:nvCxnSpPr>
+          <p:spPr>
+            <a:xfrm flipV="1">
+              <a:off x="3009900" y="494616"/>
+              <a:ext cx="381000" cy="228600"/>
+            </a:xfrm>
+            <a:prstGeom prst="bentConnector3">
+              <a:avLst/>
+            </a:prstGeom>
+            <a:ln w="15875">
+              <a:prstDash val="sysDot"/>
+            </a:ln>
+          </p:spPr>
+          <p:style>
+            <a:lnRef idx="1">
+              <a:schemeClr val="accent1"/>
+            </a:lnRef>
+            <a:fillRef idx="0">
+              <a:schemeClr val="accent1"/>
+            </a:fillRef>
+            <a:effectRef idx="0">
+              <a:schemeClr val="accent1"/>
+            </a:effectRef>
+            <a:fontRef idx="minor">
+              <a:schemeClr val="tx1"/>
+            </a:fontRef>
+          </p:style>
+        </p:cxnSp>
+        <p:cxnSp>
+          <p:nvCxnSpPr>
+            <p:cNvPr id="162" name="Elbow Connector 161"/>
+            <p:cNvCxnSpPr/>
+            <p:nvPr/>
+          </p:nvCxnSpPr>
+          <p:spPr>
+            <a:xfrm>
+              <a:off x="3276600" y="494616"/>
+              <a:ext cx="281035" cy="59724"/>
+            </a:xfrm>
+            <a:prstGeom prst="bentConnector3">
+              <a:avLst>
+                <a:gd name="adj1" fmla="val 50000"/>
+              </a:avLst>
+            </a:prstGeom>
+            <a:ln w="15875">
+              <a:prstDash val="sysDot"/>
+            </a:ln>
+          </p:spPr>
+          <p:style>
+            <a:lnRef idx="1">
+              <a:schemeClr val="accent1"/>
+            </a:lnRef>
+            <a:fillRef idx="0">
+              <a:schemeClr val="accent1"/>
+            </a:fillRef>
+            <a:effectRef idx="0">
+              <a:schemeClr val="accent1"/>
+            </a:effectRef>
+            <a:fontRef idx="minor">
+              <a:schemeClr val="tx1"/>
+            </a:fontRef>
+          </p:style>
+        </p:cxnSp>
+        <p:cxnSp>
+          <p:nvCxnSpPr>
+            <p:cNvPr id="163" name="Elbow Connector 162"/>
+            <p:cNvCxnSpPr/>
+            <p:nvPr/>
+          </p:nvCxnSpPr>
+          <p:spPr>
+            <a:xfrm>
+              <a:off x="3422209" y="554340"/>
+              <a:ext cx="383929" cy="59209"/>
+            </a:xfrm>
+            <a:prstGeom prst="bentConnector3">
+              <a:avLst>
+                <a:gd name="adj1" fmla="val 50000"/>
+              </a:avLst>
+            </a:prstGeom>
+            <a:ln w="15875">
+              <a:prstDash val="sysDot"/>
+            </a:ln>
+          </p:spPr>
+          <p:style>
+            <a:lnRef idx="1">
+              <a:schemeClr val="accent1"/>
+            </a:lnRef>
+            <a:fillRef idx="0">
+              <a:schemeClr val="accent1"/>
+            </a:fillRef>
+            <a:effectRef idx="0">
+              <a:schemeClr val="accent1"/>
+            </a:effectRef>
+            <a:fontRef idx="minor">
+              <a:schemeClr val="tx1"/>
+            </a:fontRef>
+          </p:style>
+        </p:cxnSp>
+        <p:sp>
+          <p:nvSpPr>
+            <p:cNvPr id="164" name="Rectangle 163"/>
+            <p:cNvSpPr/>
+            <p:nvPr/>
+          </p:nvSpPr>
+          <p:spPr>
+            <a:xfrm>
+              <a:off x="1905000" y="2863333"/>
+              <a:ext cx="266699" cy="228600"/>
+            </a:xfrm>
+            <a:prstGeom prst="rect">
+              <a:avLst/>
+            </a:prstGeom>
             <a:solidFill>
-              <a:schemeClr val="tx1"/>
+              <a:srgbClr val="FFB9B9"/>
             </a:solidFill>
-          </a:ln>
-        </p:spPr>
-        <p:style>
-          <a:lnRef idx="2">
-            <a:schemeClr val="accent5">
-              <a:shade val="50000"/>
-            </a:schemeClr>
-          </a:lnRef>
-          <a:fillRef idx="1">
-            <a:schemeClr val="accent5"/>
-          </a:fillRef>
-          <a:effectRef idx="0">
-            <a:schemeClr val="accent5"/>
-          </a:effectRef>
-          <a:fontRef idx="minor">
-            <a:schemeClr val="lt1"/>
-          </a:fontRef>
-        </p:style>
-        <p:txBody>
-          <a:bodyPr lIns="0" tIns="0" rIns="0" bIns="0" rtlCol="0" anchor="ctr"/>
-          <a:lstStyle/>
-          <a:p>
-            <a:pPr algn="ctr"/>
-            <a:r>
-              <a:rPr lang="en-US" sz="900" b="1" i="1" dirty="0">
+            <a:ln w="12700">
+              <a:solidFill>
+                <a:schemeClr val="tx1"/>
+              </a:solidFill>
+            </a:ln>
+          </p:spPr>
+          <p:style>
+            <a:lnRef idx="2">
+              <a:schemeClr val="accent1">
+                <a:shade val="50000"/>
+              </a:schemeClr>
+            </a:lnRef>
+            <a:fillRef idx="1">
+              <a:schemeClr val="accent1"/>
+            </a:fillRef>
+            <a:effectRef idx="0">
+              <a:schemeClr val="accent1"/>
+            </a:effectRef>
+            <a:fontRef idx="minor">
+              <a:schemeClr val="lt1"/>
+            </a:fontRef>
+          </p:style>
+          <p:txBody>
+            <a:bodyPr lIns="0" tIns="0" rIns="0" bIns="0" rtlCol="0" anchor="ctr"/>
+            <a:lstStyle/>
+            <a:p>
+              <a:pPr algn="ctr"/>
+              <a:r>
+                <a:rPr lang="en-US" sz="900" b="1" dirty="0" smtClean="0">
+                  <a:solidFill>
+                    <a:schemeClr val="tx1"/>
+                  </a:solidFill>
+                  <a:latin typeface="Times New Roman" pitchFamily="18" charset="0"/>
+                  <a:cs typeface="Times New Roman" pitchFamily="18" charset="0"/>
+                </a:rPr>
+                <a:t>2.5</a:t>
+              </a:r>
+              <a:endParaRPr lang="en-US" sz="900" b="1" dirty="0">
                 <a:solidFill>
                   <a:schemeClr val="tx1"/>
                 </a:solidFill>
                 <a:latin typeface="Times New Roman" pitchFamily="18" charset="0"/>
                 <a:cs typeface="Times New Roman" pitchFamily="18" charset="0"/>
-              </a:rPr>
-              <a:t>x &gt; 4</a:t>
-            </a:r>
-          </a:p>
-        </p:txBody>
-      </p:sp>
-      <p:sp>
-        <p:nvSpPr>
-          <p:cNvPr id="64" name="Rectangle 63"/>
-          <p:cNvSpPr/>
-          <p:nvPr/>
-        </p:nvSpPr>
-        <p:spPr>
-          <a:xfrm>
-            <a:off x="340541" y="2863333"/>
-            <a:ext cx="266699" cy="228600"/>
-          </a:xfrm>
-          <a:prstGeom prst="rect">
-            <a:avLst/>
-          </a:prstGeom>
-          <a:solidFill>
-            <a:schemeClr val="accent6">
-              <a:lumMod val="40000"/>
-              <a:lumOff val="60000"/>
-            </a:schemeClr>
-          </a:solidFill>
-          <a:ln w="12700">
-            <a:solidFill>
-              <a:schemeClr val="tx1"/>
-            </a:solidFill>
-          </a:ln>
-        </p:spPr>
-        <p:style>
-          <a:lnRef idx="2">
-            <a:schemeClr val="accent1">
-              <a:shade val="50000"/>
-            </a:schemeClr>
-          </a:lnRef>
-          <a:fillRef idx="1">
-            <a:schemeClr val="accent1"/>
-          </a:fillRef>
-          <a:effectRef idx="0">
-            <a:schemeClr val="accent1"/>
-          </a:effectRef>
-          <a:fontRef idx="minor">
-            <a:schemeClr val="lt1"/>
-          </a:fontRef>
-        </p:style>
-        <p:txBody>
-          <a:bodyPr lIns="0" tIns="0" rIns="0" bIns="0" rtlCol="0" anchor="ctr"/>
-          <a:lstStyle/>
-          <a:p>
-            <a:pPr algn="ctr"/>
-            <a:r>
-              <a:rPr lang="en-US" sz="900" b="1" dirty="0">
-                <a:solidFill>
-                  <a:schemeClr val="tx1"/>
-                </a:solidFill>
-                <a:latin typeface="Times New Roman" pitchFamily="18" charset="0"/>
-                <a:cs typeface="Times New Roman" pitchFamily="18" charset="0"/>
-              </a:rPr>
-              <a:t>1</a:t>
-            </a:r>
-          </a:p>
-        </p:txBody>
-      </p:sp>
-      <p:sp>
-        <p:nvSpPr>
-          <p:cNvPr id="65" name="Rectangle 64"/>
-          <p:cNvSpPr/>
-          <p:nvPr/>
-        </p:nvSpPr>
-        <p:spPr>
-          <a:xfrm>
-            <a:off x="798528" y="2863333"/>
-            <a:ext cx="266699" cy="228600"/>
-          </a:xfrm>
-          <a:prstGeom prst="rect">
-            <a:avLst/>
-          </a:prstGeom>
-          <a:solidFill>
-            <a:schemeClr val="accent6">
-              <a:lumMod val="40000"/>
-              <a:lumOff val="60000"/>
-            </a:schemeClr>
-          </a:solidFill>
-          <a:ln w="12700">
-            <a:solidFill>
-              <a:schemeClr val="tx1"/>
-            </a:solidFill>
-          </a:ln>
-        </p:spPr>
-        <p:style>
-          <a:lnRef idx="2">
-            <a:schemeClr val="accent1">
-              <a:shade val="50000"/>
-            </a:schemeClr>
-          </a:lnRef>
-          <a:fillRef idx="1">
-            <a:schemeClr val="accent1"/>
-          </a:fillRef>
-          <a:effectRef idx="0">
-            <a:schemeClr val="accent1"/>
-          </a:effectRef>
-          <a:fontRef idx="minor">
-            <a:schemeClr val="lt1"/>
-          </a:fontRef>
-        </p:style>
-        <p:txBody>
-          <a:bodyPr lIns="0" tIns="0" rIns="0" bIns="0" rtlCol="0" anchor="ctr"/>
-          <a:lstStyle/>
-          <a:p>
-            <a:pPr algn="ctr"/>
-            <a:r>
-              <a:rPr lang="en-US" sz="900" b="1" dirty="0">
-                <a:solidFill>
-                  <a:schemeClr val="tx1"/>
-                </a:solidFill>
-                <a:latin typeface="Times New Roman" pitchFamily="18" charset="0"/>
-                <a:cs typeface="Times New Roman" pitchFamily="18" charset="0"/>
-              </a:rPr>
-              <a:t>2</a:t>
-            </a:r>
-          </a:p>
-        </p:txBody>
-      </p:sp>
-      <p:sp>
-        <p:nvSpPr>
-          <p:cNvPr id="66" name="Rectangle 65"/>
-          <p:cNvSpPr/>
-          <p:nvPr/>
-        </p:nvSpPr>
-        <p:spPr>
-          <a:xfrm>
-            <a:off x="1256515" y="2863333"/>
-            <a:ext cx="266699" cy="228600"/>
-          </a:xfrm>
-          <a:prstGeom prst="rect">
-            <a:avLst/>
-          </a:prstGeom>
-          <a:solidFill>
-            <a:schemeClr val="accent6">
-              <a:lumMod val="40000"/>
-              <a:lumOff val="60000"/>
-            </a:schemeClr>
-          </a:solidFill>
-          <a:ln w="12700">
-            <a:solidFill>
-              <a:schemeClr val="tx1"/>
-            </a:solidFill>
-          </a:ln>
-        </p:spPr>
-        <p:style>
-          <a:lnRef idx="2">
-            <a:schemeClr val="accent1">
-              <a:shade val="50000"/>
-            </a:schemeClr>
-          </a:lnRef>
-          <a:fillRef idx="1">
-            <a:schemeClr val="accent1"/>
-          </a:fillRef>
-          <a:effectRef idx="0">
-            <a:schemeClr val="accent1"/>
-          </a:effectRef>
-          <a:fontRef idx="minor">
-            <a:schemeClr val="lt1"/>
-          </a:fontRef>
-        </p:style>
-        <p:txBody>
-          <a:bodyPr lIns="0" tIns="0" rIns="0" bIns="0" rtlCol="0" anchor="ctr"/>
-          <a:lstStyle/>
-          <a:p>
-            <a:pPr algn="ctr"/>
-            <a:r>
-              <a:rPr lang="en-US" sz="900" b="1" dirty="0">
-                <a:solidFill>
-                  <a:schemeClr val="tx1"/>
-                </a:solidFill>
-                <a:latin typeface="Times New Roman" pitchFamily="18" charset="0"/>
-                <a:cs typeface="Times New Roman" pitchFamily="18" charset="0"/>
-              </a:rPr>
-              <a:t>3</a:t>
-            </a:r>
-          </a:p>
-        </p:txBody>
-      </p:sp>
-      <p:sp>
-        <p:nvSpPr>
-          <p:cNvPr id="67" name="Rectangle 66"/>
-          <p:cNvSpPr/>
-          <p:nvPr/>
-        </p:nvSpPr>
-        <p:spPr>
-          <a:xfrm>
-            <a:off x="1790701" y="2863333"/>
-            <a:ext cx="266699" cy="228600"/>
-          </a:xfrm>
-          <a:prstGeom prst="rect">
-            <a:avLst/>
-          </a:prstGeom>
-          <a:solidFill>
-            <a:schemeClr val="accent6">
-              <a:lumMod val="40000"/>
-              <a:lumOff val="60000"/>
-            </a:schemeClr>
-          </a:solidFill>
-          <a:ln w="12700">
-            <a:solidFill>
-              <a:schemeClr val="tx1"/>
-            </a:solidFill>
-          </a:ln>
-        </p:spPr>
-        <p:style>
-          <a:lnRef idx="2">
-            <a:schemeClr val="accent1">
-              <a:shade val="50000"/>
-            </a:schemeClr>
-          </a:lnRef>
-          <a:fillRef idx="1">
-            <a:schemeClr val="accent1"/>
-          </a:fillRef>
-          <a:effectRef idx="0">
-            <a:schemeClr val="accent1"/>
-          </a:effectRef>
-          <a:fontRef idx="minor">
-            <a:schemeClr val="lt1"/>
-          </a:fontRef>
-        </p:style>
-        <p:txBody>
-          <a:bodyPr lIns="0" tIns="0" rIns="0" bIns="0" rtlCol="0" anchor="ctr"/>
-          <a:lstStyle/>
-          <a:p>
-            <a:pPr algn="ctr"/>
-            <a:r>
-              <a:rPr lang="en-US" sz="900" b="1" dirty="0">
-                <a:solidFill>
-                  <a:schemeClr val="tx1"/>
-                </a:solidFill>
-                <a:latin typeface="Times New Roman" pitchFamily="18" charset="0"/>
-                <a:cs typeface="Times New Roman" pitchFamily="18" charset="0"/>
-              </a:rPr>
-              <a:t>3.5</a:t>
-            </a:r>
-          </a:p>
-        </p:txBody>
-      </p:sp>
-      <p:cxnSp>
-        <p:nvCxnSpPr>
-          <p:cNvPr id="69" name="Straight Arrow Connector 68"/>
-          <p:cNvCxnSpPr>
-            <a:stCxn id="58" idx="4"/>
-            <a:endCxn id="64" idx="0"/>
-          </p:cNvCxnSpPr>
-          <p:nvPr/>
-        </p:nvCxnSpPr>
-        <p:spPr>
-          <a:xfrm flipH="1">
-            <a:off x="473891" y="1790700"/>
-            <a:ext cx="251613" cy="1072633"/>
-          </a:xfrm>
-          <a:prstGeom prst="straightConnector1">
-            <a:avLst/>
-          </a:prstGeom>
-          <a:ln w="12700">
-            <a:solidFill>
-              <a:schemeClr val="tx1"/>
-            </a:solidFill>
-            <a:tailEnd type="triangle" w="med" len="med"/>
-          </a:ln>
-        </p:spPr>
-        <p:style>
-          <a:lnRef idx="1">
-            <a:schemeClr val="accent1"/>
-          </a:lnRef>
-          <a:fillRef idx="0">
-            <a:schemeClr val="accent1"/>
-          </a:fillRef>
-          <a:effectRef idx="0">
-            <a:schemeClr val="accent1"/>
-          </a:effectRef>
-          <a:fontRef idx="minor">
-            <a:schemeClr val="tx1"/>
-          </a:fontRef>
-        </p:style>
-      </p:cxnSp>
-      <p:cxnSp>
-        <p:nvCxnSpPr>
-          <p:cNvPr id="70" name="Straight Arrow Connector 69"/>
-          <p:cNvCxnSpPr>
-            <a:stCxn id="61" idx="4"/>
-            <a:endCxn id="65" idx="0"/>
-          </p:cNvCxnSpPr>
-          <p:nvPr/>
-        </p:nvCxnSpPr>
-        <p:spPr>
-          <a:xfrm flipH="1">
-            <a:off x="931878" y="2101333"/>
-            <a:ext cx="132524" cy="762000"/>
-          </a:xfrm>
-          <a:prstGeom prst="straightConnector1">
-            <a:avLst/>
-          </a:prstGeom>
-          <a:ln w="12700">
-            <a:solidFill>
-              <a:schemeClr val="tx1"/>
-            </a:solidFill>
-            <a:tailEnd type="triangle" w="med" len="med"/>
-          </a:ln>
-        </p:spPr>
-        <p:style>
-          <a:lnRef idx="1">
-            <a:schemeClr val="accent1"/>
-          </a:lnRef>
-          <a:fillRef idx="0">
-            <a:schemeClr val="accent1"/>
-          </a:fillRef>
-          <a:effectRef idx="0">
-            <a:schemeClr val="accent1"/>
-          </a:effectRef>
-          <a:fontRef idx="minor">
-            <a:schemeClr val="tx1"/>
-          </a:fontRef>
-        </p:style>
-      </p:cxnSp>
-      <p:cxnSp>
-        <p:nvCxnSpPr>
-          <p:cNvPr id="72" name="Straight Arrow Connector 71"/>
-          <p:cNvCxnSpPr>
-            <a:stCxn id="62" idx="4"/>
-            <a:endCxn id="66" idx="0"/>
-          </p:cNvCxnSpPr>
-          <p:nvPr/>
-        </p:nvCxnSpPr>
-        <p:spPr>
-          <a:xfrm flipH="1">
-            <a:off x="1389865" y="2413642"/>
-            <a:ext cx="62408" cy="449691"/>
-          </a:xfrm>
-          <a:prstGeom prst="straightConnector1">
-            <a:avLst/>
-          </a:prstGeom>
-          <a:ln w="12700">
-            <a:solidFill>
-              <a:schemeClr val="tx1"/>
-            </a:solidFill>
-            <a:tailEnd type="triangle" w="med" len="med"/>
-          </a:ln>
-        </p:spPr>
-        <p:style>
-          <a:lnRef idx="1">
-            <a:schemeClr val="accent1"/>
-          </a:lnRef>
-          <a:fillRef idx="0">
-            <a:schemeClr val="accent1"/>
-          </a:fillRef>
-          <a:effectRef idx="0">
-            <a:schemeClr val="accent1"/>
-          </a:effectRef>
-          <a:fontRef idx="minor">
-            <a:schemeClr val="tx1"/>
-          </a:fontRef>
-        </p:style>
-      </p:cxnSp>
-      <p:cxnSp>
-        <p:nvCxnSpPr>
-          <p:cNvPr id="75" name="Straight Arrow Connector 74"/>
-          <p:cNvCxnSpPr>
-            <a:endCxn id="67" idx="0"/>
-          </p:cNvCxnSpPr>
-          <p:nvPr/>
-        </p:nvCxnSpPr>
-        <p:spPr>
-          <a:xfrm>
-            <a:off x="1894703" y="2710933"/>
-            <a:ext cx="29348" cy="152400"/>
-          </a:xfrm>
-          <a:prstGeom prst="straightConnector1">
-            <a:avLst/>
-          </a:prstGeom>
-          <a:ln w="12700">
-            <a:solidFill>
-              <a:schemeClr val="tx1"/>
-            </a:solidFill>
-            <a:tailEnd type="triangle" w="med" len="med"/>
-          </a:ln>
-        </p:spPr>
-        <p:style>
-          <a:lnRef idx="1">
-            <a:schemeClr val="accent1"/>
-          </a:lnRef>
-          <a:fillRef idx="0">
-            <a:schemeClr val="accent1"/>
-          </a:fillRef>
-          <a:effectRef idx="0">
-            <a:schemeClr val="accent1"/>
-          </a:effectRef>
-          <a:fontRef idx="minor">
-            <a:schemeClr val="tx1"/>
-          </a:fontRef>
-        </p:style>
-      </p:cxnSp>
-      <p:cxnSp>
-        <p:nvCxnSpPr>
-          <p:cNvPr id="77" name="Straight Arrow Connector 76"/>
-          <p:cNvCxnSpPr>
-            <a:stCxn id="63" idx="3"/>
-            <a:endCxn id="66" idx="0"/>
-          </p:cNvCxnSpPr>
-          <p:nvPr/>
-        </p:nvCxnSpPr>
-        <p:spPr>
-          <a:xfrm flipH="1">
-            <a:off x="1389865" y="2671572"/>
-            <a:ext cx="283860" cy="191761"/>
-          </a:xfrm>
-          <a:prstGeom prst="straightConnector1">
-            <a:avLst/>
-          </a:prstGeom>
-          <a:ln w="12700">
-            <a:solidFill>
-              <a:schemeClr val="tx1"/>
-            </a:solidFill>
-            <a:prstDash val="sysDash"/>
-            <a:tailEnd type="triangle" w="med" len="med"/>
-          </a:ln>
-        </p:spPr>
-        <p:style>
-          <a:lnRef idx="1">
-            <a:schemeClr val="accent1"/>
-          </a:lnRef>
-          <a:fillRef idx="0">
-            <a:schemeClr val="accent1"/>
-          </a:fillRef>
-          <a:effectRef idx="0">
-            <a:schemeClr val="accent1"/>
-          </a:effectRef>
-          <a:fontRef idx="minor">
-            <a:schemeClr val="tx1"/>
-          </a:fontRef>
-        </p:style>
-      </p:cxnSp>
-      <p:cxnSp>
-        <p:nvCxnSpPr>
-          <p:cNvPr id="80" name="Straight Arrow Connector 79"/>
-          <p:cNvCxnSpPr/>
-          <p:nvPr/>
-        </p:nvCxnSpPr>
-        <p:spPr>
-          <a:xfrm>
-            <a:off x="1655805" y="2348468"/>
-            <a:ext cx="189471" cy="98854"/>
-          </a:xfrm>
-          <a:prstGeom prst="straightConnector1">
-            <a:avLst/>
-          </a:prstGeom>
-          <a:ln w="12700">
-            <a:solidFill>
-              <a:schemeClr val="tx1"/>
-            </a:solidFill>
-            <a:prstDash val="sysDash"/>
-            <a:tailEnd type="triangle" w="med" len="med"/>
-          </a:ln>
-        </p:spPr>
-        <p:style>
-          <a:lnRef idx="1">
-            <a:schemeClr val="accent1"/>
-          </a:lnRef>
-          <a:fillRef idx="0">
-            <a:schemeClr val="accent1"/>
-          </a:fillRef>
-          <a:effectRef idx="0">
-            <a:schemeClr val="accent1"/>
-          </a:effectRef>
-          <a:fontRef idx="minor">
-            <a:schemeClr val="tx1"/>
-          </a:fontRef>
-        </p:style>
-      </p:cxnSp>
-      <p:cxnSp>
-        <p:nvCxnSpPr>
-          <p:cNvPr id="83" name="Straight Arrow Connector 82"/>
-          <p:cNvCxnSpPr/>
-          <p:nvPr/>
-        </p:nvCxnSpPr>
-        <p:spPr>
-          <a:xfrm>
-            <a:off x="1276865" y="2035430"/>
-            <a:ext cx="205946" cy="123568"/>
-          </a:xfrm>
-          <a:prstGeom prst="straightConnector1">
-            <a:avLst/>
-          </a:prstGeom>
-          <a:ln w="12700">
-            <a:solidFill>
-              <a:schemeClr val="tx1"/>
-            </a:solidFill>
-            <a:prstDash val="sysDash"/>
-            <a:tailEnd type="triangle" w="med" len="med"/>
-          </a:ln>
-        </p:spPr>
-        <p:style>
-          <a:lnRef idx="1">
-            <a:schemeClr val="accent1"/>
-          </a:lnRef>
-          <a:fillRef idx="0">
-            <a:schemeClr val="accent1"/>
-          </a:fillRef>
-          <a:effectRef idx="0">
-            <a:schemeClr val="accent1"/>
-          </a:effectRef>
-          <a:fontRef idx="minor">
-            <a:schemeClr val="tx1"/>
-          </a:fontRef>
-        </p:style>
-      </p:cxnSp>
-      <p:cxnSp>
-        <p:nvCxnSpPr>
-          <p:cNvPr id="85" name="Straight Arrow Connector 84"/>
-          <p:cNvCxnSpPr/>
-          <p:nvPr/>
-        </p:nvCxnSpPr>
-        <p:spPr>
-          <a:xfrm>
-            <a:off x="902757" y="1730629"/>
-            <a:ext cx="184638" cy="115331"/>
-          </a:xfrm>
-          <a:prstGeom prst="straightConnector1">
-            <a:avLst/>
-          </a:prstGeom>
-          <a:ln w="12700">
-            <a:solidFill>
-              <a:schemeClr val="tx1"/>
-            </a:solidFill>
-            <a:prstDash val="sysDash"/>
-            <a:tailEnd type="triangle" w="med" len="med"/>
-          </a:ln>
-        </p:spPr>
-        <p:style>
-          <a:lnRef idx="1">
-            <a:schemeClr val="accent1"/>
-          </a:lnRef>
-          <a:fillRef idx="0">
-            <a:schemeClr val="accent1"/>
-          </a:fillRef>
-          <a:effectRef idx="0">
-            <a:schemeClr val="accent1"/>
-          </a:effectRef>
-          <a:fontRef idx="minor">
-            <a:schemeClr val="tx1"/>
-          </a:fontRef>
-        </p:style>
-      </p:cxnSp>
-      <p:sp>
-        <p:nvSpPr>
-          <p:cNvPr id="105" name="Oval 104"/>
-          <p:cNvSpPr/>
-          <p:nvPr/>
-        </p:nvSpPr>
-        <p:spPr>
-          <a:xfrm>
-            <a:off x="3113030" y="1982157"/>
-            <a:ext cx="457201" cy="266700"/>
-          </a:xfrm>
-          <a:prstGeom prst="ellipse">
-            <a:avLst/>
-          </a:prstGeom>
-          <a:solidFill>
-            <a:schemeClr val="accent5">
-              <a:lumMod val="40000"/>
-              <a:lumOff val="60000"/>
-            </a:schemeClr>
-          </a:solidFill>
-          <a:ln w="12700">
-            <a:solidFill>
-              <a:schemeClr val="tx1"/>
-            </a:solidFill>
-          </a:ln>
-        </p:spPr>
-        <p:style>
-          <a:lnRef idx="2">
-            <a:schemeClr val="accent5">
-              <a:shade val="50000"/>
-            </a:schemeClr>
-          </a:lnRef>
-          <a:fillRef idx="1">
-            <a:schemeClr val="accent5"/>
-          </a:fillRef>
-          <a:effectRef idx="0">
-            <a:schemeClr val="accent5"/>
-          </a:effectRef>
-          <a:fontRef idx="minor">
-            <a:schemeClr val="lt1"/>
-          </a:fontRef>
-        </p:style>
-        <p:txBody>
-          <a:bodyPr lIns="0" tIns="0" rIns="0" bIns="0" rtlCol="0" anchor="ctr"/>
-          <a:lstStyle/>
-          <a:p>
-            <a:pPr algn="ctr"/>
-            <a:r>
-              <a:rPr lang="en-US" sz="900" b="1" i="1" dirty="0">
-                <a:solidFill>
-                  <a:schemeClr val="tx1"/>
-                </a:solidFill>
-                <a:latin typeface="Times New Roman" pitchFamily="18" charset="0"/>
-                <a:cs typeface="Times New Roman" pitchFamily="18" charset="0"/>
-              </a:rPr>
-              <a:t>x &lt; 3</a:t>
-            </a:r>
-          </a:p>
-        </p:txBody>
-      </p:sp>
-      <p:sp>
-        <p:nvSpPr>
-          <p:cNvPr id="109" name="Rectangle 108"/>
-          <p:cNvSpPr/>
-          <p:nvPr/>
-        </p:nvSpPr>
-        <p:spPr>
-          <a:xfrm>
-            <a:off x="2817002" y="2514600"/>
-            <a:ext cx="353664" cy="228600"/>
-          </a:xfrm>
-          <a:prstGeom prst="rect">
-            <a:avLst/>
-          </a:prstGeom>
-          <a:solidFill>
-            <a:schemeClr val="accent6">
-              <a:lumMod val="40000"/>
-              <a:lumOff val="60000"/>
-            </a:schemeClr>
-          </a:solidFill>
-          <a:ln w="12700">
-            <a:solidFill>
-              <a:schemeClr val="tx1"/>
-            </a:solidFill>
-          </a:ln>
-        </p:spPr>
-        <p:style>
-          <a:lnRef idx="2">
-            <a:schemeClr val="accent1">
-              <a:shade val="50000"/>
-            </a:schemeClr>
-          </a:lnRef>
-          <a:fillRef idx="1">
-            <a:schemeClr val="accent1"/>
-          </a:fillRef>
-          <a:effectRef idx="0">
-            <a:schemeClr val="accent1"/>
-          </a:effectRef>
-          <a:fontRef idx="minor">
-            <a:schemeClr val="lt1"/>
-          </a:fontRef>
-        </p:style>
-        <p:txBody>
-          <a:bodyPr lIns="0" tIns="0" rIns="0" bIns="0" rtlCol="0" anchor="ctr"/>
-          <a:lstStyle/>
-          <a:p>
-            <a:pPr algn="ctr"/>
-            <a:r>
-              <a:rPr lang="en-US" sz="900" b="1" i="1" dirty="0">
-                <a:solidFill>
-                  <a:schemeClr val="tx1"/>
-                </a:solidFill>
-                <a:latin typeface="Times New Roman" pitchFamily="18" charset="0"/>
-                <a:cs typeface="Times New Roman" pitchFamily="18" charset="0"/>
-              </a:rPr>
-              <a:t>x+1</a:t>
-            </a:r>
-          </a:p>
-        </p:txBody>
-      </p:sp>
-      <p:sp>
-        <p:nvSpPr>
-          <p:cNvPr id="110" name="Rectangle 109"/>
-          <p:cNvSpPr/>
-          <p:nvPr/>
-        </p:nvSpPr>
-        <p:spPr>
-          <a:xfrm>
-            <a:off x="3428999" y="2514600"/>
-            <a:ext cx="533400" cy="228600"/>
-          </a:xfrm>
-          <a:prstGeom prst="rect">
-            <a:avLst/>
-          </a:prstGeom>
-          <a:solidFill>
-            <a:schemeClr val="accent6">
-              <a:lumMod val="40000"/>
-              <a:lumOff val="60000"/>
-            </a:schemeClr>
-          </a:solidFill>
-          <a:ln w="12700">
-            <a:solidFill>
-              <a:schemeClr val="tx1"/>
-            </a:solidFill>
-          </a:ln>
-        </p:spPr>
-        <p:style>
-          <a:lnRef idx="2">
-            <a:schemeClr val="accent1">
-              <a:shade val="50000"/>
-            </a:schemeClr>
-          </a:lnRef>
-          <a:fillRef idx="1">
-            <a:schemeClr val="accent1"/>
-          </a:fillRef>
-          <a:effectRef idx="0">
-            <a:schemeClr val="accent1"/>
-          </a:effectRef>
-          <a:fontRef idx="minor">
-            <a:schemeClr val="lt1"/>
-          </a:fontRef>
-        </p:style>
-        <p:txBody>
-          <a:bodyPr lIns="0" tIns="0" rIns="0" bIns="0" rtlCol="0" anchor="ctr"/>
-          <a:lstStyle/>
-          <a:p>
-            <a:pPr algn="ctr"/>
-            <a:r>
-              <a:rPr lang="en-US" sz="900" b="1" i="1" dirty="0">
-                <a:solidFill>
-                  <a:schemeClr val="tx1"/>
-                </a:solidFill>
-                <a:latin typeface="Times New Roman" pitchFamily="18" charset="0"/>
-                <a:cs typeface="Times New Roman" pitchFamily="18" charset="0"/>
-              </a:rPr>
-              <a:t>4 – 0.5x</a:t>
-            </a:r>
-            <a:endParaRPr lang="en-US" sz="900" b="1" i="1" dirty="0">
-              <a:solidFill>
-                <a:schemeClr val="tx1"/>
-              </a:solidFill>
-              <a:latin typeface="Times New Roman" pitchFamily="18" charset="0"/>
-              <a:cs typeface="Times New Roman" pitchFamily="18" charset="0"/>
-            </a:endParaRPr>
-          </a:p>
-        </p:txBody>
-      </p:sp>
-      <p:cxnSp>
-        <p:nvCxnSpPr>
-          <p:cNvPr id="113" name="Straight Arrow Connector 112"/>
-          <p:cNvCxnSpPr>
-            <a:endCxn id="109" idx="0"/>
-          </p:cNvCxnSpPr>
-          <p:nvPr/>
-        </p:nvCxnSpPr>
-        <p:spPr>
-          <a:xfrm flipH="1">
-            <a:off x="2993834" y="2237530"/>
-            <a:ext cx="278309" cy="277070"/>
-          </a:xfrm>
-          <a:prstGeom prst="straightConnector1">
-            <a:avLst/>
-          </a:prstGeom>
-          <a:ln w="12700">
-            <a:solidFill>
-              <a:schemeClr val="tx1"/>
-            </a:solidFill>
-            <a:tailEnd type="triangle" w="med" len="med"/>
-          </a:ln>
-        </p:spPr>
-        <p:style>
-          <a:lnRef idx="1">
-            <a:schemeClr val="accent1"/>
-          </a:lnRef>
-          <a:fillRef idx="0">
-            <a:schemeClr val="accent1"/>
-          </a:fillRef>
-          <a:effectRef idx="0">
-            <a:schemeClr val="accent1"/>
-          </a:effectRef>
-          <a:fontRef idx="minor">
-            <a:schemeClr val="tx1"/>
-          </a:fontRef>
-        </p:style>
-      </p:cxnSp>
-      <p:cxnSp>
-        <p:nvCxnSpPr>
-          <p:cNvPr id="125" name="Straight Arrow Connector 124"/>
-          <p:cNvCxnSpPr>
-            <a:endCxn id="110" idx="0"/>
-          </p:cNvCxnSpPr>
-          <p:nvPr/>
-        </p:nvCxnSpPr>
-        <p:spPr>
-          <a:xfrm>
-            <a:off x="3428661" y="2245768"/>
-            <a:ext cx="267038" cy="268832"/>
-          </a:xfrm>
-          <a:prstGeom prst="straightConnector1">
-            <a:avLst/>
-          </a:prstGeom>
-          <a:ln w="12700">
-            <a:solidFill>
-              <a:schemeClr val="tx1"/>
-            </a:solidFill>
-            <a:prstDash val="sysDash"/>
-            <a:tailEnd type="triangle" w="med" len="med"/>
-          </a:ln>
-        </p:spPr>
-        <p:style>
-          <a:lnRef idx="1">
-            <a:schemeClr val="accent1"/>
-          </a:lnRef>
-          <a:fillRef idx="0">
-            <a:schemeClr val="accent1"/>
-          </a:fillRef>
-          <a:effectRef idx="0">
-            <a:schemeClr val="accent1"/>
-          </a:effectRef>
-          <a:fontRef idx="minor">
-            <a:schemeClr val="tx1"/>
-          </a:fontRef>
-        </p:style>
-      </p:cxnSp>
+              </a:endParaRPr>
+            </a:p>
+          </p:txBody>
+        </p:sp>
+      </p:grpSp>
     </p:spTree>
     <p:extLst>
       <p:ext uri="{BB962C8B-B14F-4D97-AF65-F5344CB8AC3E}">

</xml_diff>

<commit_message>
Near final for sections 1,2,3
</commit_message>
<xml_diff>
--- a/docs/papers/xaddapprox/Figures/xadds/intro_diagram.pptx
+++ b/docs/papers/xaddapprox/Figures/xadds/intro_diagram.pptx
@@ -3095,2094 +3095,2131 @@
           <a:chExt cx="0" cy="0"/>
         </a:xfrm>
       </p:grpSpPr>
-      <p:grpSp>
-        <p:nvGrpSpPr>
-          <p:cNvPr id="194" name="Group 193"/>
-          <p:cNvGrpSpPr/>
+      <p:cxnSp>
+        <p:nvCxnSpPr>
+          <p:cNvPr id="160" name="Elbow Connector 159"/>
+          <p:cNvCxnSpPr/>
           <p:nvPr/>
-        </p:nvGrpSpPr>
-        <p:grpSpPr>
+        </p:nvCxnSpPr>
+        <p:spPr>
+          <a:xfrm flipV="1">
+            <a:off x="2971800" y="721157"/>
+            <a:ext cx="381000" cy="228600"/>
+          </a:xfrm>
+          <a:prstGeom prst="bentConnector3">
+            <a:avLst/>
+          </a:prstGeom>
+          <a:ln w="15875">
+            <a:solidFill>
+              <a:srgbClr val="92D050"/>
+            </a:solidFill>
+            <a:prstDash val="sysDot"/>
+          </a:ln>
+        </p:spPr>
+        <p:style>
+          <a:lnRef idx="1">
+            <a:schemeClr val="accent1"/>
+          </a:lnRef>
+          <a:fillRef idx="0">
+            <a:schemeClr val="accent1"/>
+          </a:fillRef>
+          <a:effectRef idx="0">
+            <a:schemeClr val="accent1"/>
+          </a:effectRef>
+          <a:fontRef idx="minor">
+            <a:schemeClr val="tx1"/>
+          </a:fontRef>
+        </p:style>
+      </p:cxnSp>
+      <p:cxnSp>
+        <p:nvCxnSpPr>
+          <p:cNvPr id="161" name="Elbow Connector 160"/>
+          <p:cNvCxnSpPr/>
+          <p:nvPr/>
+        </p:nvCxnSpPr>
+        <p:spPr>
+          <a:xfrm flipV="1">
+            <a:off x="3162300" y="494616"/>
+            <a:ext cx="381000" cy="228600"/>
+          </a:xfrm>
+          <a:prstGeom prst="bentConnector3">
+            <a:avLst/>
+          </a:prstGeom>
+          <a:ln w="15875">
+            <a:solidFill>
+              <a:srgbClr val="92D050"/>
+            </a:solidFill>
+            <a:prstDash val="sysDot"/>
+          </a:ln>
+        </p:spPr>
+        <p:style>
+          <a:lnRef idx="1">
+            <a:schemeClr val="accent1"/>
+          </a:lnRef>
+          <a:fillRef idx="0">
+            <a:schemeClr val="accent1"/>
+          </a:fillRef>
+          <a:effectRef idx="0">
+            <a:schemeClr val="accent1"/>
+          </a:effectRef>
+          <a:fontRef idx="minor">
+            <a:schemeClr val="tx1"/>
+          </a:fontRef>
+        </p:style>
+      </p:cxnSp>
+      <p:cxnSp>
+        <p:nvCxnSpPr>
+          <p:cNvPr id="162" name="Elbow Connector 161"/>
+          <p:cNvCxnSpPr/>
+          <p:nvPr/>
+        </p:nvCxnSpPr>
+        <p:spPr>
+          <a:xfrm>
+            <a:off x="3429000" y="494616"/>
+            <a:ext cx="281035" cy="59724"/>
+          </a:xfrm>
+          <a:prstGeom prst="bentConnector3">
+            <a:avLst>
+              <a:gd name="adj1" fmla="val 50000"/>
+            </a:avLst>
+          </a:prstGeom>
+          <a:ln w="15875">
+            <a:solidFill>
+              <a:srgbClr val="92D050"/>
+            </a:solidFill>
+            <a:prstDash val="sysDot"/>
+          </a:ln>
+        </p:spPr>
+        <p:style>
+          <a:lnRef idx="1">
+            <a:schemeClr val="accent1"/>
+          </a:lnRef>
+          <a:fillRef idx="0">
+            <a:schemeClr val="accent1"/>
+          </a:fillRef>
+          <a:effectRef idx="0">
+            <a:schemeClr val="accent1"/>
+          </a:effectRef>
+          <a:fontRef idx="minor">
+            <a:schemeClr val="tx1"/>
+          </a:fontRef>
+        </p:style>
+      </p:cxnSp>
+      <p:cxnSp>
+        <p:nvCxnSpPr>
+          <p:cNvPr id="163" name="Elbow Connector 162"/>
+          <p:cNvCxnSpPr/>
+          <p:nvPr/>
+        </p:nvCxnSpPr>
+        <p:spPr>
+          <a:xfrm>
+            <a:off x="3574609" y="554340"/>
+            <a:ext cx="383929" cy="59209"/>
+          </a:xfrm>
+          <a:prstGeom prst="bentConnector3">
+            <a:avLst>
+              <a:gd name="adj1" fmla="val 50000"/>
+            </a:avLst>
+          </a:prstGeom>
+          <a:ln w="15875">
+            <a:solidFill>
+              <a:srgbClr val="92D050"/>
+            </a:solidFill>
+            <a:prstDash val="sysDot"/>
+          </a:ln>
+        </p:spPr>
+        <p:style>
+          <a:lnRef idx="1">
+            <a:schemeClr val="accent1"/>
+          </a:lnRef>
+          <a:fillRef idx="0">
+            <a:schemeClr val="accent1"/>
+          </a:fillRef>
+          <a:effectRef idx="0">
+            <a:schemeClr val="accent1"/>
+          </a:effectRef>
+          <a:fontRef idx="minor">
+            <a:schemeClr val="tx1"/>
+          </a:fontRef>
+        </p:style>
+      </p:cxnSp>
+      <p:sp>
+        <p:nvSpPr>
+          <p:cNvPr id="155" name="TextBox 154"/>
+          <p:cNvSpPr txBox="1"/>
+          <p:nvPr/>
+        </p:nvSpPr>
+        <p:spPr>
           <a:xfrm>
             <a:off x="76200" y="73223"/>
-            <a:ext cx="4114800" cy="3018710"/>
-            <a:chOff x="-76200" y="73223"/>
-            <a:chExt cx="4114800" cy="3018710"/>
-          </a:xfrm>
-        </p:grpSpPr>
-        <p:sp>
-          <p:nvSpPr>
-            <p:cNvPr id="155" name="TextBox 154"/>
-            <p:cNvSpPr txBox="1"/>
-            <p:nvPr/>
-          </p:nvSpPr>
-          <p:spPr>
-            <a:xfrm>
-              <a:off x="-76200" y="73223"/>
-              <a:ext cx="571849" cy="307777"/>
-            </a:xfrm>
-            <a:prstGeom prst="rect">
-              <a:avLst/>
-            </a:prstGeom>
-            <a:noFill/>
-          </p:spPr>
-          <p:txBody>
-            <a:bodyPr wrap="square" rtlCol="0">
-              <a:spAutoFit/>
-            </a:bodyPr>
-            <a:lstStyle/>
-            <a:p>
-              <a:r>
-                <a:rPr lang="en-US" sz="1400" dirty="0" smtClean="0">
-                  <a:latin typeface="Times New Roman" pitchFamily="18" charset="0"/>
-                  <a:cs typeface="Times New Roman" pitchFamily="18" charset="0"/>
-                </a:rPr>
-                <a:t>(a)</a:t>
-              </a:r>
-              <a:endParaRPr lang="en-US" sz="1400" dirty="0">
+            <a:ext cx="571849" cy="307777"/>
+          </a:xfrm>
+          <a:prstGeom prst="rect">
+            <a:avLst/>
+          </a:prstGeom>
+          <a:noFill/>
+        </p:spPr>
+        <p:txBody>
+          <a:bodyPr wrap="square" rtlCol="0">
+            <a:spAutoFit/>
+          </a:bodyPr>
+          <a:lstStyle/>
+          <a:p>
+            <a:r>
+              <a:rPr lang="en-US" sz="1400" dirty="0" smtClean="0">
                 <a:latin typeface="Times New Roman" pitchFamily="18" charset="0"/>
                 <a:cs typeface="Times New Roman" pitchFamily="18" charset="0"/>
-              </a:endParaRPr>
-            </a:p>
-          </p:txBody>
-        </p:sp>
-        <p:cxnSp>
-          <p:nvCxnSpPr>
-            <p:cNvPr id="5" name="Straight Connector 4"/>
-            <p:cNvCxnSpPr/>
-            <p:nvPr/>
-          </p:nvCxnSpPr>
-          <p:spPr>
-            <a:xfrm>
-              <a:off x="682834" y="260867"/>
-              <a:ext cx="0" cy="914400"/>
-            </a:xfrm>
-            <a:prstGeom prst="line">
-              <a:avLst/>
-            </a:prstGeom>
-            <a:ln w="31750"/>
-          </p:spPr>
-          <p:style>
-            <a:lnRef idx="1">
-              <a:schemeClr val="accent1"/>
-            </a:lnRef>
-            <a:fillRef idx="0">
-              <a:schemeClr val="accent1"/>
-            </a:fillRef>
-            <a:effectRef idx="0">
-              <a:schemeClr val="accent1"/>
-            </a:effectRef>
-            <a:fontRef idx="minor">
+              </a:rPr>
+              <a:t>(a)</a:t>
+            </a:r>
+            <a:endParaRPr lang="en-US" sz="1400" dirty="0">
+              <a:latin typeface="Times New Roman" pitchFamily="18" charset="0"/>
+              <a:cs typeface="Times New Roman" pitchFamily="18" charset="0"/>
+            </a:endParaRPr>
+          </a:p>
+        </p:txBody>
+      </p:sp>
+      <p:cxnSp>
+        <p:nvCxnSpPr>
+          <p:cNvPr id="5" name="Straight Connector 4"/>
+          <p:cNvCxnSpPr/>
+          <p:nvPr/>
+        </p:nvCxnSpPr>
+        <p:spPr>
+          <a:xfrm>
+            <a:off x="835234" y="260867"/>
+            <a:ext cx="0" cy="914400"/>
+          </a:xfrm>
+          <a:prstGeom prst="line">
+            <a:avLst/>
+          </a:prstGeom>
+          <a:ln w="19050">
+            <a:solidFill>
               <a:schemeClr val="tx1"/>
-            </a:fontRef>
-          </p:style>
-        </p:cxnSp>
-        <p:cxnSp>
-          <p:nvCxnSpPr>
-            <p:cNvPr id="6" name="Straight Connector 5"/>
-            <p:cNvCxnSpPr/>
-            <p:nvPr/>
-          </p:nvCxnSpPr>
-          <p:spPr>
-            <a:xfrm>
-              <a:off x="682834" y="1175267"/>
-              <a:ext cx="1066800" cy="0"/>
-            </a:xfrm>
-            <a:prstGeom prst="line">
-              <a:avLst/>
-            </a:prstGeom>
-            <a:ln w="31750"/>
-          </p:spPr>
-          <p:style>
-            <a:lnRef idx="1">
-              <a:schemeClr val="accent1"/>
-            </a:lnRef>
-            <a:fillRef idx="0">
-              <a:schemeClr val="accent1"/>
-            </a:fillRef>
-            <a:effectRef idx="0">
-              <a:schemeClr val="accent1"/>
-            </a:effectRef>
-            <a:fontRef idx="minor">
+            </a:solidFill>
+          </a:ln>
+        </p:spPr>
+        <p:style>
+          <a:lnRef idx="1">
+            <a:schemeClr val="accent1"/>
+          </a:lnRef>
+          <a:fillRef idx="0">
+            <a:schemeClr val="accent1"/>
+          </a:fillRef>
+          <a:effectRef idx="0">
+            <a:schemeClr val="accent1"/>
+          </a:effectRef>
+          <a:fontRef idx="minor">
+            <a:schemeClr val="tx1"/>
+          </a:fontRef>
+        </p:style>
+      </p:cxnSp>
+      <p:cxnSp>
+        <p:nvCxnSpPr>
+          <p:cNvPr id="6" name="Straight Connector 5"/>
+          <p:cNvCxnSpPr/>
+          <p:nvPr/>
+        </p:nvCxnSpPr>
+        <p:spPr>
+          <a:xfrm>
+            <a:off x="835234" y="1175267"/>
+            <a:ext cx="1066800" cy="0"/>
+          </a:xfrm>
+          <a:prstGeom prst="line">
+            <a:avLst/>
+          </a:prstGeom>
+          <a:ln w="19050">
+            <a:solidFill>
               <a:schemeClr val="tx1"/>
-            </a:fontRef>
-          </p:style>
-        </p:cxnSp>
-        <p:sp>
-          <p:nvSpPr>
-            <p:cNvPr id="8" name="TextBox 7"/>
-            <p:cNvSpPr txBox="1"/>
-            <p:nvPr/>
-          </p:nvSpPr>
-          <p:spPr>
-            <a:xfrm>
-              <a:off x="1063834" y="1177326"/>
-              <a:ext cx="264816" cy="307777"/>
-            </a:xfrm>
-            <a:prstGeom prst="rect">
-              <a:avLst/>
-            </a:prstGeom>
-            <a:noFill/>
-          </p:spPr>
-          <p:txBody>
-            <a:bodyPr wrap="none" rtlCol="0">
-              <a:spAutoFit/>
-            </a:bodyPr>
-            <a:lstStyle/>
-            <a:p>
-              <a:r>
-                <a:rPr lang="en-US" sz="1400" i="1" dirty="0" smtClean="0">
-                  <a:latin typeface="Times New Roman" pitchFamily="18" charset="0"/>
-                  <a:cs typeface="Times New Roman" pitchFamily="18" charset="0"/>
-                </a:rPr>
-                <a:t>x</a:t>
-              </a:r>
-              <a:endParaRPr lang="en-US" sz="1400" i="1" dirty="0">
+            </a:solidFill>
+          </a:ln>
+        </p:spPr>
+        <p:style>
+          <a:lnRef idx="1">
+            <a:schemeClr val="accent1"/>
+          </a:lnRef>
+          <a:fillRef idx="0">
+            <a:schemeClr val="accent1"/>
+          </a:fillRef>
+          <a:effectRef idx="0">
+            <a:schemeClr val="accent1"/>
+          </a:effectRef>
+          <a:fontRef idx="minor">
+            <a:schemeClr val="tx1"/>
+          </a:fontRef>
+        </p:style>
+      </p:cxnSp>
+      <p:sp>
+        <p:nvSpPr>
+          <p:cNvPr id="8" name="TextBox 7"/>
+          <p:cNvSpPr txBox="1"/>
+          <p:nvPr/>
+        </p:nvSpPr>
+        <p:spPr>
+          <a:xfrm>
+            <a:off x="1216234" y="1177326"/>
+            <a:ext cx="264816" cy="307777"/>
+          </a:xfrm>
+          <a:prstGeom prst="rect">
+            <a:avLst/>
+          </a:prstGeom>
+          <a:noFill/>
+        </p:spPr>
+        <p:txBody>
+          <a:bodyPr wrap="none" rtlCol="0">
+            <a:spAutoFit/>
+          </a:bodyPr>
+          <a:lstStyle/>
+          <a:p>
+            <a:r>
+              <a:rPr lang="en-US" sz="1400" i="1" dirty="0" smtClean="0">
                 <a:latin typeface="Times New Roman" pitchFamily="18" charset="0"/>
                 <a:cs typeface="Times New Roman" pitchFamily="18" charset="0"/>
-              </a:endParaRPr>
-            </a:p>
-          </p:txBody>
-        </p:sp>
-        <p:sp>
-          <p:nvSpPr>
-            <p:cNvPr id="9" name="TextBox 8"/>
-            <p:cNvSpPr txBox="1"/>
-            <p:nvPr/>
-          </p:nvSpPr>
-          <p:spPr>
-            <a:xfrm>
-              <a:off x="265783" y="533401"/>
-              <a:ext cx="571849" cy="307777"/>
-            </a:xfrm>
-            <a:prstGeom prst="rect">
-              <a:avLst/>
-            </a:prstGeom>
-            <a:noFill/>
-          </p:spPr>
-          <p:txBody>
-            <a:bodyPr wrap="square" rtlCol="0">
-              <a:spAutoFit/>
-            </a:bodyPr>
-            <a:lstStyle/>
-            <a:p>
-              <a:r>
-                <a:rPr lang="en-US" sz="1400" i="1" dirty="0" smtClean="0">
-                  <a:latin typeface="Times New Roman" pitchFamily="18" charset="0"/>
-                  <a:cs typeface="Times New Roman" pitchFamily="18" charset="0"/>
-                </a:rPr>
-                <a:t>f(x)</a:t>
-              </a:r>
-              <a:endParaRPr lang="en-US" sz="1400" i="1" dirty="0">
+              </a:rPr>
+              <a:t>x</a:t>
+            </a:r>
+            <a:endParaRPr lang="en-US" sz="1400" i="1" dirty="0">
+              <a:latin typeface="Times New Roman" pitchFamily="18" charset="0"/>
+              <a:cs typeface="Times New Roman" pitchFamily="18" charset="0"/>
+            </a:endParaRPr>
+          </a:p>
+        </p:txBody>
+      </p:sp>
+      <p:sp>
+        <p:nvSpPr>
+          <p:cNvPr id="9" name="TextBox 8"/>
+          <p:cNvSpPr txBox="1"/>
+          <p:nvPr/>
+        </p:nvSpPr>
+        <p:spPr>
+          <a:xfrm>
+            <a:off x="418183" y="533401"/>
+            <a:ext cx="571849" cy="307777"/>
+          </a:xfrm>
+          <a:prstGeom prst="rect">
+            <a:avLst/>
+          </a:prstGeom>
+          <a:noFill/>
+        </p:spPr>
+        <p:txBody>
+          <a:bodyPr wrap="square" rtlCol="0">
+            <a:spAutoFit/>
+          </a:bodyPr>
+          <a:lstStyle/>
+          <a:p>
+            <a:r>
+              <a:rPr lang="en-US" sz="1400" i="1" dirty="0" smtClean="0">
                 <a:latin typeface="Times New Roman" pitchFamily="18" charset="0"/>
                 <a:cs typeface="Times New Roman" pitchFamily="18" charset="0"/>
-              </a:endParaRPr>
-            </a:p>
-          </p:txBody>
-        </p:sp>
-        <p:cxnSp>
-          <p:nvCxnSpPr>
-            <p:cNvPr id="10" name="Straight Connector 9"/>
-            <p:cNvCxnSpPr/>
-            <p:nvPr/>
-          </p:nvCxnSpPr>
-          <p:spPr>
-            <a:xfrm>
-              <a:off x="2817002" y="260867"/>
-              <a:ext cx="0" cy="914400"/>
-            </a:xfrm>
-            <a:prstGeom prst="line">
-              <a:avLst/>
-            </a:prstGeom>
-            <a:ln w="31750"/>
-          </p:spPr>
-          <p:style>
-            <a:lnRef idx="1">
-              <a:schemeClr val="accent1"/>
-            </a:lnRef>
-            <a:fillRef idx="0">
-              <a:schemeClr val="accent1"/>
-            </a:fillRef>
-            <a:effectRef idx="0">
-              <a:schemeClr val="accent1"/>
-            </a:effectRef>
-            <a:fontRef idx="minor">
+              </a:rPr>
+              <a:t>f(x)</a:t>
+            </a:r>
+            <a:endParaRPr lang="en-US" sz="1400" i="1" dirty="0">
+              <a:latin typeface="Times New Roman" pitchFamily="18" charset="0"/>
+              <a:cs typeface="Times New Roman" pitchFamily="18" charset="0"/>
+            </a:endParaRPr>
+          </a:p>
+        </p:txBody>
+      </p:sp>
+      <p:cxnSp>
+        <p:nvCxnSpPr>
+          <p:cNvPr id="10" name="Straight Connector 9"/>
+          <p:cNvCxnSpPr/>
+          <p:nvPr/>
+        </p:nvCxnSpPr>
+        <p:spPr>
+          <a:xfrm>
+            <a:off x="2969402" y="260867"/>
+            <a:ext cx="0" cy="914400"/>
+          </a:xfrm>
+          <a:prstGeom prst="line">
+            <a:avLst/>
+          </a:prstGeom>
+          <a:ln w="19050">
+            <a:solidFill>
               <a:schemeClr val="tx1"/>
-            </a:fontRef>
-          </p:style>
-        </p:cxnSp>
-        <p:cxnSp>
-          <p:nvCxnSpPr>
-            <p:cNvPr id="11" name="Straight Connector 10"/>
-            <p:cNvCxnSpPr/>
-            <p:nvPr/>
-          </p:nvCxnSpPr>
-          <p:spPr>
-            <a:xfrm>
-              <a:off x="2817002" y="1175267"/>
-              <a:ext cx="1066800" cy="0"/>
-            </a:xfrm>
-            <a:prstGeom prst="line">
-              <a:avLst/>
-            </a:prstGeom>
-            <a:ln w="31750"/>
-          </p:spPr>
-          <p:style>
-            <a:lnRef idx="1">
-              <a:schemeClr val="accent1"/>
-            </a:lnRef>
-            <a:fillRef idx="0">
-              <a:schemeClr val="accent1"/>
-            </a:fillRef>
-            <a:effectRef idx="0">
-              <a:schemeClr val="accent1"/>
-            </a:effectRef>
-            <a:fontRef idx="minor">
+            </a:solidFill>
+          </a:ln>
+        </p:spPr>
+        <p:style>
+          <a:lnRef idx="1">
+            <a:schemeClr val="accent1"/>
+          </a:lnRef>
+          <a:fillRef idx="0">
+            <a:schemeClr val="accent1"/>
+          </a:fillRef>
+          <a:effectRef idx="0">
+            <a:schemeClr val="accent1"/>
+          </a:effectRef>
+          <a:fontRef idx="minor">
+            <a:schemeClr val="tx1"/>
+          </a:fontRef>
+        </p:style>
+      </p:cxnSp>
+      <p:cxnSp>
+        <p:nvCxnSpPr>
+          <p:cNvPr id="11" name="Straight Connector 10"/>
+          <p:cNvCxnSpPr/>
+          <p:nvPr/>
+        </p:nvCxnSpPr>
+        <p:spPr>
+          <a:xfrm>
+            <a:off x="2969402" y="1175267"/>
+            <a:ext cx="1066800" cy="0"/>
+          </a:xfrm>
+          <a:prstGeom prst="line">
+            <a:avLst/>
+          </a:prstGeom>
+          <a:ln w="19050">
+            <a:solidFill>
               <a:schemeClr val="tx1"/>
-            </a:fontRef>
-          </p:style>
-        </p:cxnSp>
-        <p:sp>
-          <p:nvSpPr>
-            <p:cNvPr id="12" name="TextBox 11"/>
-            <p:cNvSpPr txBox="1"/>
-            <p:nvPr/>
-          </p:nvSpPr>
-          <p:spPr>
-            <a:xfrm>
-              <a:off x="3198001" y="1177326"/>
-              <a:ext cx="264816" cy="307777"/>
-            </a:xfrm>
-            <a:prstGeom prst="rect">
-              <a:avLst/>
-            </a:prstGeom>
-            <a:noFill/>
-          </p:spPr>
-          <p:txBody>
-            <a:bodyPr wrap="none" rtlCol="0">
-              <a:spAutoFit/>
-            </a:bodyPr>
-            <a:lstStyle/>
-            <a:p>
-              <a:r>
-                <a:rPr lang="en-US" sz="1400" i="1" dirty="0" smtClean="0">
-                  <a:latin typeface="Times New Roman" pitchFamily="18" charset="0"/>
-                  <a:cs typeface="Times New Roman" pitchFamily="18" charset="0"/>
-                </a:rPr>
-                <a:t>x</a:t>
-              </a:r>
-              <a:endParaRPr lang="en-US" sz="1400" i="1" dirty="0">
+            </a:solidFill>
+          </a:ln>
+        </p:spPr>
+        <p:style>
+          <a:lnRef idx="1">
+            <a:schemeClr val="accent1"/>
+          </a:lnRef>
+          <a:fillRef idx="0">
+            <a:schemeClr val="accent1"/>
+          </a:fillRef>
+          <a:effectRef idx="0">
+            <a:schemeClr val="accent1"/>
+          </a:effectRef>
+          <a:fontRef idx="minor">
+            <a:schemeClr val="tx1"/>
+          </a:fontRef>
+        </p:style>
+      </p:cxnSp>
+      <p:sp>
+        <p:nvSpPr>
+          <p:cNvPr id="12" name="TextBox 11"/>
+          <p:cNvSpPr txBox="1"/>
+          <p:nvPr/>
+        </p:nvSpPr>
+        <p:spPr>
+          <a:xfrm>
+            <a:off x="3350401" y="1177326"/>
+            <a:ext cx="264816" cy="307777"/>
+          </a:xfrm>
+          <a:prstGeom prst="rect">
+            <a:avLst/>
+          </a:prstGeom>
+          <a:noFill/>
+        </p:spPr>
+        <p:txBody>
+          <a:bodyPr wrap="none" rtlCol="0">
+            <a:spAutoFit/>
+          </a:bodyPr>
+          <a:lstStyle/>
+          <a:p>
+            <a:r>
+              <a:rPr lang="en-US" sz="1400" i="1" dirty="0" smtClean="0">
                 <a:latin typeface="Times New Roman" pitchFamily="18" charset="0"/>
                 <a:cs typeface="Times New Roman" pitchFamily="18" charset="0"/>
-              </a:endParaRPr>
-            </a:p>
-          </p:txBody>
-        </p:sp>
-        <p:sp>
-          <p:nvSpPr>
-            <p:cNvPr id="13" name="TextBox 12"/>
-            <p:cNvSpPr txBox="1"/>
-            <p:nvPr/>
-          </p:nvSpPr>
-          <p:spPr>
-            <a:xfrm>
-              <a:off x="2399951" y="533401"/>
-              <a:ext cx="571849" cy="307777"/>
-            </a:xfrm>
-            <a:prstGeom prst="rect">
-              <a:avLst/>
-            </a:prstGeom>
-            <a:noFill/>
-          </p:spPr>
-          <p:txBody>
-            <a:bodyPr wrap="square" rtlCol="0">
-              <a:spAutoFit/>
-            </a:bodyPr>
-            <a:lstStyle/>
-            <a:p>
-              <a:r>
-                <a:rPr lang="en-US" sz="1400" i="1" dirty="0" smtClean="0">
-                  <a:latin typeface="Times New Roman" pitchFamily="18" charset="0"/>
-                  <a:cs typeface="Times New Roman" pitchFamily="18" charset="0"/>
-                </a:rPr>
-                <a:t>g(x)</a:t>
-              </a:r>
-              <a:endParaRPr lang="en-US" sz="1400" i="1" dirty="0">
+              </a:rPr>
+              <a:t>x</a:t>
+            </a:r>
+            <a:endParaRPr lang="en-US" sz="1400" i="1" dirty="0">
+              <a:latin typeface="Times New Roman" pitchFamily="18" charset="0"/>
+              <a:cs typeface="Times New Roman" pitchFamily="18" charset="0"/>
+            </a:endParaRPr>
+          </a:p>
+        </p:txBody>
+      </p:sp>
+      <p:sp>
+        <p:nvSpPr>
+          <p:cNvPr id="13" name="TextBox 12"/>
+          <p:cNvSpPr txBox="1"/>
+          <p:nvPr/>
+        </p:nvSpPr>
+        <p:spPr>
+          <a:xfrm>
+            <a:off x="2552351" y="533401"/>
+            <a:ext cx="571849" cy="307777"/>
+          </a:xfrm>
+          <a:prstGeom prst="rect">
+            <a:avLst/>
+          </a:prstGeom>
+          <a:noFill/>
+        </p:spPr>
+        <p:txBody>
+          <a:bodyPr wrap="square" rtlCol="0">
+            <a:spAutoFit/>
+          </a:bodyPr>
+          <a:lstStyle/>
+          <a:p>
+            <a:r>
+              <a:rPr lang="en-US" sz="1400" i="1" dirty="0" smtClean="0">
                 <a:latin typeface="Times New Roman" pitchFamily="18" charset="0"/>
                 <a:cs typeface="Times New Roman" pitchFamily="18" charset="0"/>
-              </a:endParaRPr>
-            </a:p>
-          </p:txBody>
-        </p:sp>
-        <p:cxnSp>
-          <p:nvCxnSpPr>
-            <p:cNvPr id="23" name="Elbow Connector 22"/>
-            <p:cNvCxnSpPr/>
-            <p:nvPr/>
-          </p:nvCxnSpPr>
-          <p:spPr>
-            <a:xfrm flipV="1">
-              <a:off x="682834" y="718067"/>
-              <a:ext cx="381000" cy="228600"/>
-            </a:xfrm>
-            <a:prstGeom prst="bentConnector3">
-              <a:avLst/>
-            </a:prstGeom>
-            <a:ln w="15875"/>
-          </p:spPr>
-          <p:style>
-            <a:lnRef idx="1">
-              <a:schemeClr val="accent1"/>
-            </a:lnRef>
-            <a:fillRef idx="0">
-              <a:schemeClr val="accent1"/>
-            </a:fillRef>
-            <a:effectRef idx="0">
-              <a:schemeClr val="accent1"/>
-            </a:effectRef>
-            <a:fontRef idx="minor">
-              <a:schemeClr val="tx1"/>
-            </a:fontRef>
-          </p:style>
-        </p:cxnSp>
-        <p:cxnSp>
-          <p:nvCxnSpPr>
-            <p:cNvPr id="24" name="Elbow Connector 23"/>
-            <p:cNvCxnSpPr/>
-            <p:nvPr/>
-          </p:nvCxnSpPr>
-          <p:spPr>
-            <a:xfrm flipV="1">
-              <a:off x="873334" y="491526"/>
-              <a:ext cx="381000" cy="228600"/>
-            </a:xfrm>
-            <a:prstGeom prst="bentConnector3">
-              <a:avLst/>
-            </a:prstGeom>
-            <a:ln w="15875"/>
-          </p:spPr>
-          <p:style>
-            <a:lnRef idx="1">
-              <a:schemeClr val="accent1"/>
-            </a:lnRef>
-            <a:fillRef idx="0">
-              <a:schemeClr val="accent1"/>
-            </a:fillRef>
-            <a:effectRef idx="0">
-              <a:schemeClr val="accent1"/>
-            </a:effectRef>
-            <a:fontRef idx="minor">
-              <a:schemeClr val="tx1"/>
-            </a:fontRef>
-          </p:style>
-        </p:cxnSp>
-        <p:cxnSp>
-          <p:nvCxnSpPr>
-            <p:cNvPr id="25" name="Elbow Connector 24"/>
-            <p:cNvCxnSpPr/>
-            <p:nvPr/>
-          </p:nvCxnSpPr>
-          <p:spPr>
-            <a:xfrm>
-              <a:off x="1140034" y="491526"/>
-              <a:ext cx="281035" cy="59724"/>
-            </a:xfrm>
-            <a:prstGeom prst="bentConnector3">
-              <a:avLst>
-                <a:gd name="adj1" fmla="val 50000"/>
-              </a:avLst>
-            </a:prstGeom>
-            <a:ln w="15875"/>
-          </p:spPr>
-          <p:style>
-            <a:lnRef idx="1">
-              <a:schemeClr val="accent1"/>
-            </a:lnRef>
-            <a:fillRef idx="0">
-              <a:schemeClr val="accent1"/>
-            </a:fillRef>
-            <a:effectRef idx="0">
-              <a:schemeClr val="accent1"/>
-            </a:effectRef>
-            <a:fontRef idx="minor">
-              <a:schemeClr val="tx1"/>
-            </a:fontRef>
-          </p:style>
-        </p:cxnSp>
-        <p:cxnSp>
-          <p:nvCxnSpPr>
-            <p:cNvPr id="28" name="Elbow Connector 27"/>
-            <p:cNvCxnSpPr/>
-            <p:nvPr/>
-          </p:nvCxnSpPr>
-          <p:spPr>
-            <a:xfrm>
-              <a:off x="1296944" y="551250"/>
-              <a:ext cx="383929" cy="59209"/>
-            </a:xfrm>
-            <a:prstGeom prst="bentConnector3">
-              <a:avLst>
-                <a:gd name="adj1" fmla="val 50000"/>
-              </a:avLst>
-            </a:prstGeom>
-            <a:ln w="15875"/>
-          </p:spPr>
-          <p:style>
-            <a:lnRef idx="1">
-              <a:schemeClr val="accent1"/>
-            </a:lnRef>
-            <a:fillRef idx="0">
-              <a:schemeClr val="accent1"/>
-            </a:fillRef>
-            <a:effectRef idx="0">
-              <a:schemeClr val="accent1"/>
-            </a:effectRef>
-            <a:fontRef idx="minor">
-              <a:schemeClr val="tx1"/>
-            </a:fontRef>
-          </p:style>
-        </p:cxnSp>
-        <p:cxnSp>
-          <p:nvCxnSpPr>
-            <p:cNvPr id="38" name="Straight Connector 37"/>
-            <p:cNvCxnSpPr/>
-            <p:nvPr/>
-          </p:nvCxnSpPr>
-          <p:spPr>
-            <a:xfrm flipV="1">
-              <a:off x="2819400" y="491526"/>
-              <a:ext cx="609599" cy="455141"/>
-            </a:xfrm>
-            <a:prstGeom prst="line">
-              <a:avLst/>
-            </a:prstGeom>
-            <a:ln w="15875"/>
-          </p:spPr>
-          <p:style>
-            <a:lnRef idx="1">
-              <a:schemeClr val="accent1"/>
-            </a:lnRef>
-            <a:fillRef idx="0">
-              <a:schemeClr val="accent1"/>
-            </a:fillRef>
-            <a:effectRef idx="0">
-              <a:schemeClr val="accent1"/>
-            </a:effectRef>
-            <a:fontRef idx="minor">
-              <a:schemeClr val="tx1"/>
-            </a:fontRef>
-          </p:style>
-        </p:cxnSp>
-        <p:cxnSp>
-          <p:nvCxnSpPr>
-            <p:cNvPr id="39" name="Straight Connector 38"/>
-            <p:cNvCxnSpPr/>
-            <p:nvPr/>
-          </p:nvCxnSpPr>
-          <p:spPr>
-            <a:xfrm>
-              <a:off x="3417491" y="492942"/>
-              <a:ext cx="397272" cy="154758"/>
-            </a:xfrm>
-            <a:prstGeom prst="line">
-              <a:avLst/>
-            </a:prstGeom>
-            <a:ln w="15875"/>
-          </p:spPr>
-          <p:style>
-            <a:lnRef idx="1">
-              <a:schemeClr val="accent1"/>
-            </a:lnRef>
-            <a:fillRef idx="0">
-              <a:schemeClr val="accent1"/>
-            </a:fillRef>
-            <a:effectRef idx="0">
-              <a:schemeClr val="accent1"/>
-            </a:effectRef>
-            <a:fontRef idx="minor">
-              <a:schemeClr val="tx1"/>
-            </a:fontRef>
-          </p:style>
-        </p:cxnSp>
-        <p:sp>
-          <p:nvSpPr>
-            <p:cNvPr id="41" name="TextBox 40"/>
-            <p:cNvSpPr txBox="1"/>
-            <p:nvPr/>
-          </p:nvSpPr>
-          <p:spPr>
-            <a:xfrm>
-              <a:off x="454805" y="1099068"/>
-              <a:ext cx="274434" cy="307777"/>
-            </a:xfrm>
-            <a:prstGeom prst="rect">
-              <a:avLst/>
-            </a:prstGeom>
-            <a:noFill/>
-          </p:spPr>
-          <p:txBody>
-            <a:bodyPr wrap="none" rtlCol="0">
-              <a:spAutoFit/>
-            </a:bodyPr>
-            <a:lstStyle/>
-            <a:p>
-              <a:r>
-                <a:rPr lang="en-US" sz="1400" i="1" dirty="0" smtClean="0">
-                  <a:latin typeface="Times New Roman" pitchFamily="18" charset="0"/>
-                  <a:cs typeface="Times New Roman" pitchFamily="18" charset="0"/>
-                </a:rPr>
-                <a:t>0</a:t>
-              </a:r>
-              <a:endParaRPr lang="en-US" sz="1400" i="1" dirty="0">
+              </a:rPr>
+              <a:t>g(x)</a:t>
+            </a:r>
+            <a:endParaRPr lang="en-US" sz="1400" i="1" dirty="0">
+              <a:latin typeface="Times New Roman" pitchFamily="18" charset="0"/>
+              <a:cs typeface="Times New Roman" pitchFamily="18" charset="0"/>
+            </a:endParaRPr>
+          </a:p>
+        </p:txBody>
+      </p:sp>
+      <p:cxnSp>
+        <p:nvCxnSpPr>
+          <p:cNvPr id="23" name="Elbow Connector 22"/>
+          <p:cNvCxnSpPr/>
+          <p:nvPr/>
+        </p:nvCxnSpPr>
+        <p:spPr>
+          <a:xfrm flipV="1">
+            <a:off x="835234" y="718067"/>
+            <a:ext cx="381000" cy="228600"/>
+          </a:xfrm>
+          <a:prstGeom prst="bentConnector3">
+            <a:avLst/>
+          </a:prstGeom>
+          <a:ln w="15875">
+            <a:solidFill>
+              <a:srgbClr val="00B050"/>
+            </a:solidFill>
+          </a:ln>
+        </p:spPr>
+        <p:style>
+          <a:lnRef idx="1">
+            <a:schemeClr val="accent1"/>
+          </a:lnRef>
+          <a:fillRef idx="0">
+            <a:schemeClr val="accent1"/>
+          </a:fillRef>
+          <a:effectRef idx="0">
+            <a:schemeClr val="accent1"/>
+          </a:effectRef>
+          <a:fontRef idx="minor">
+            <a:schemeClr val="tx1"/>
+          </a:fontRef>
+        </p:style>
+      </p:cxnSp>
+      <p:cxnSp>
+        <p:nvCxnSpPr>
+          <p:cNvPr id="24" name="Elbow Connector 23"/>
+          <p:cNvCxnSpPr/>
+          <p:nvPr/>
+        </p:nvCxnSpPr>
+        <p:spPr>
+          <a:xfrm flipV="1">
+            <a:off x="1025734" y="491526"/>
+            <a:ext cx="381000" cy="228600"/>
+          </a:xfrm>
+          <a:prstGeom prst="bentConnector3">
+            <a:avLst/>
+          </a:prstGeom>
+          <a:ln w="15875">
+            <a:solidFill>
+              <a:srgbClr val="00B050"/>
+            </a:solidFill>
+          </a:ln>
+        </p:spPr>
+        <p:style>
+          <a:lnRef idx="1">
+            <a:schemeClr val="accent1"/>
+          </a:lnRef>
+          <a:fillRef idx="0">
+            <a:schemeClr val="accent1"/>
+          </a:fillRef>
+          <a:effectRef idx="0">
+            <a:schemeClr val="accent1"/>
+          </a:effectRef>
+          <a:fontRef idx="minor">
+            <a:schemeClr val="tx1"/>
+          </a:fontRef>
+        </p:style>
+      </p:cxnSp>
+      <p:cxnSp>
+        <p:nvCxnSpPr>
+          <p:cNvPr id="25" name="Elbow Connector 24"/>
+          <p:cNvCxnSpPr/>
+          <p:nvPr/>
+        </p:nvCxnSpPr>
+        <p:spPr>
+          <a:xfrm>
+            <a:off x="1292434" y="491526"/>
+            <a:ext cx="281035" cy="59724"/>
+          </a:xfrm>
+          <a:prstGeom prst="bentConnector3">
+            <a:avLst>
+              <a:gd name="adj1" fmla="val 50000"/>
+            </a:avLst>
+          </a:prstGeom>
+          <a:ln w="15875">
+            <a:solidFill>
+              <a:srgbClr val="00B050"/>
+            </a:solidFill>
+          </a:ln>
+        </p:spPr>
+        <p:style>
+          <a:lnRef idx="1">
+            <a:schemeClr val="accent1"/>
+          </a:lnRef>
+          <a:fillRef idx="0">
+            <a:schemeClr val="accent1"/>
+          </a:fillRef>
+          <a:effectRef idx="0">
+            <a:schemeClr val="accent1"/>
+          </a:effectRef>
+          <a:fontRef idx="minor">
+            <a:schemeClr val="tx1"/>
+          </a:fontRef>
+        </p:style>
+      </p:cxnSp>
+      <p:cxnSp>
+        <p:nvCxnSpPr>
+          <p:cNvPr id="28" name="Elbow Connector 27"/>
+          <p:cNvCxnSpPr/>
+          <p:nvPr/>
+        </p:nvCxnSpPr>
+        <p:spPr>
+          <a:xfrm>
+            <a:off x="1449344" y="551250"/>
+            <a:ext cx="383929" cy="59209"/>
+          </a:xfrm>
+          <a:prstGeom prst="bentConnector3">
+            <a:avLst>
+              <a:gd name="adj1" fmla="val 50000"/>
+            </a:avLst>
+          </a:prstGeom>
+          <a:ln w="15875">
+            <a:solidFill>
+              <a:srgbClr val="00B050"/>
+            </a:solidFill>
+          </a:ln>
+        </p:spPr>
+        <p:style>
+          <a:lnRef idx="1">
+            <a:schemeClr val="accent1"/>
+          </a:lnRef>
+          <a:fillRef idx="0">
+            <a:schemeClr val="accent1"/>
+          </a:fillRef>
+          <a:effectRef idx="0">
+            <a:schemeClr val="accent1"/>
+          </a:effectRef>
+          <a:fontRef idx="minor">
+            <a:schemeClr val="tx1"/>
+          </a:fontRef>
+        </p:style>
+      </p:cxnSp>
+      <p:cxnSp>
+        <p:nvCxnSpPr>
+          <p:cNvPr id="38" name="Straight Connector 37"/>
+          <p:cNvCxnSpPr/>
+          <p:nvPr/>
+        </p:nvCxnSpPr>
+        <p:spPr>
+          <a:xfrm flipV="1">
+            <a:off x="2971800" y="491526"/>
+            <a:ext cx="609599" cy="455141"/>
+          </a:xfrm>
+          <a:prstGeom prst="line">
+            <a:avLst/>
+          </a:prstGeom>
+          <a:ln w="15875">
+            <a:solidFill>
+              <a:srgbClr val="00B050"/>
+            </a:solidFill>
+          </a:ln>
+        </p:spPr>
+        <p:style>
+          <a:lnRef idx="1">
+            <a:schemeClr val="accent1"/>
+          </a:lnRef>
+          <a:fillRef idx="0">
+            <a:schemeClr val="accent1"/>
+          </a:fillRef>
+          <a:effectRef idx="0">
+            <a:schemeClr val="accent1"/>
+          </a:effectRef>
+          <a:fontRef idx="minor">
+            <a:schemeClr val="tx1"/>
+          </a:fontRef>
+        </p:style>
+      </p:cxnSp>
+      <p:cxnSp>
+        <p:nvCxnSpPr>
+          <p:cNvPr id="39" name="Straight Connector 38"/>
+          <p:cNvCxnSpPr/>
+          <p:nvPr/>
+        </p:nvCxnSpPr>
+        <p:spPr>
+          <a:xfrm>
+            <a:off x="3569891" y="492942"/>
+            <a:ext cx="397272" cy="154758"/>
+          </a:xfrm>
+          <a:prstGeom prst="line">
+            <a:avLst/>
+          </a:prstGeom>
+          <a:ln w="15875">
+            <a:solidFill>
+              <a:srgbClr val="00B050"/>
+            </a:solidFill>
+          </a:ln>
+        </p:spPr>
+        <p:style>
+          <a:lnRef idx="1">
+            <a:schemeClr val="accent1"/>
+          </a:lnRef>
+          <a:fillRef idx="0">
+            <a:schemeClr val="accent1"/>
+          </a:fillRef>
+          <a:effectRef idx="0">
+            <a:schemeClr val="accent1"/>
+          </a:effectRef>
+          <a:fontRef idx="minor">
+            <a:schemeClr val="tx1"/>
+          </a:fontRef>
+        </p:style>
+      </p:cxnSp>
+      <p:sp>
+        <p:nvSpPr>
+          <p:cNvPr id="41" name="TextBox 40"/>
+          <p:cNvSpPr txBox="1"/>
+          <p:nvPr/>
+        </p:nvSpPr>
+        <p:spPr>
+          <a:xfrm>
+            <a:off x="607205" y="1099068"/>
+            <a:ext cx="274434" cy="307777"/>
+          </a:xfrm>
+          <a:prstGeom prst="rect">
+            <a:avLst/>
+          </a:prstGeom>
+          <a:noFill/>
+        </p:spPr>
+        <p:txBody>
+          <a:bodyPr wrap="none" rtlCol="0">
+            <a:spAutoFit/>
+          </a:bodyPr>
+          <a:lstStyle/>
+          <a:p>
+            <a:r>
+              <a:rPr lang="en-US" sz="1400" i="1" dirty="0" smtClean="0">
                 <a:latin typeface="Times New Roman" pitchFamily="18" charset="0"/>
                 <a:cs typeface="Times New Roman" pitchFamily="18" charset="0"/>
-              </a:endParaRPr>
-            </a:p>
-          </p:txBody>
-        </p:sp>
-        <p:sp>
-          <p:nvSpPr>
-            <p:cNvPr id="42" name="TextBox 41"/>
-            <p:cNvSpPr txBox="1"/>
-            <p:nvPr/>
-          </p:nvSpPr>
-          <p:spPr>
-            <a:xfrm>
-              <a:off x="1524000" y="1110968"/>
-              <a:ext cx="274434" cy="307777"/>
-            </a:xfrm>
-            <a:prstGeom prst="rect">
-              <a:avLst/>
-            </a:prstGeom>
-            <a:noFill/>
-          </p:spPr>
-          <p:txBody>
-            <a:bodyPr wrap="none" rtlCol="0">
-              <a:spAutoFit/>
-            </a:bodyPr>
-            <a:lstStyle/>
-            <a:p>
-              <a:r>
-                <a:rPr lang="en-US" sz="1400" i="1" dirty="0" smtClean="0">
-                  <a:latin typeface="Times New Roman" pitchFamily="18" charset="0"/>
-                  <a:cs typeface="Times New Roman" pitchFamily="18" charset="0"/>
-                </a:rPr>
-                <a:t>5</a:t>
-              </a:r>
-              <a:endParaRPr lang="en-US" sz="1400" i="1" dirty="0">
+              </a:rPr>
+              <a:t>0</a:t>
+            </a:r>
+            <a:endParaRPr lang="en-US" sz="1400" i="1" dirty="0">
+              <a:latin typeface="Times New Roman" pitchFamily="18" charset="0"/>
+              <a:cs typeface="Times New Roman" pitchFamily="18" charset="0"/>
+            </a:endParaRPr>
+          </a:p>
+        </p:txBody>
+      </p:sp>
+      <p:sp>
+        <p:nvSpPr>
+          <p:cNvPr id="42" name="TextBox 41"/>
+          <p:cNvSpPr txBox="1"/>
+          <p:nvPr/>
+        </p:nvSpPr>
+        <p:spPr>
+          <a:xfrm>
+            <a:off x="1676400" y="1110968"/>
+            <a:ext cx="274434" cy="307777"/>
+          </a:xfrm>
+          <a:prstGeom prst="rect">
+            <a:avLst/>
+          </a:prstGeom>
+          <a:noFill/>
+        </p:spPr>
+        <p:txBody>
+          <a:bodyPr wrap="none" rtlCol="0">
+            <a:spAutoFit/>
+          </a:bodyPr>
+          <a:lstStyle/>
+          <a:p>
+            <a:r>
+              <a:rPr lang="en-US" sz="1400" i="1" dirty="0" smtClean="0">
                 <a:latin typeface="Times New Roman" pitchFamily="18" charset="0"/>
                 <a:cs typeface="Times New Roman" pitchFamily="18" charset="0"/>
-              </a:endParaRPr>
-            </a:p>
-          </p:txBody>
-        </p:sp>
-        <p:sp>
-          <p:nvSpPr>
-            <p:cNvPr id="43" name="TextBox 42"/>
-            <p:cNvSpPr txBox="1"/>
-            <p:nvPr/>
-          </p:nvSpPr>
-          <p:spPr>
-            <a:xfrm>
-              <a:off x="458952" y="76201"/>
-              <a:ext cx="274434" cy="307777"/>
-            </a:xfrm>
-            <a:prstGeom prst="rect">
-              <a:avLst/>
-            </a:prstGeom>
-            <a:noFill/>
-          </p:spPr>
-          <p:txBody>
-            <a:bodyPr wrap="none" rtlCol="0">
-              <a:spAutoFit/>
-            </a:bodyPr>
-            <a:lstStyle/>
-            <a:p>
-              <a:r>
-                <a:rPr lang="en-US" sz="1400" i="1" dirty="0" smtClean="0">
-                  <a:latin typeface="Times New Roman" pitchFamily="18" charset="0"/>
-                  <a:cs typeface="Times New Roman" pitchFamily="18" charset="0"/>
-                </a:rPr>
-                <a:t>4</a:t>
-              </a:r>
-              <a:endParaRPr lang="en-US" sz="1400" i="1" dirty="0">
+              </a:rPr>
+              <a:t>5</a:t>
+            </a:r>
+            <a:endParaRPr lang="en-US" sz="1400" i="1" dirty="0">
+              <a:latin typeface="Times New Roman" pitchFamily="18" charset="0"/>
+              <a:cs typeface="Times New Roman" pitchFamily="18" charset="0"/>
+            </a:endParaRPr>
+          </a:p>
+        </p:txBody>
+      </p:sp>
+      <p:sp>
+        <p:nvSpPr>
+          <p:cNvPr id="43" name="TextBox 42"/>
+          <p:cNvSpPr txBox="1"/>
+          <p:nvPr/>
+        </p:nvSpPr>
+        <p:spPr>
+          <a:xfrm>
+            <a:off x="611352" y="76201"/>
+            <a:ext cx="274434" cy="307777"/>
+          </a:xfrm>
+          <a:prstGeom prst="rect">
+            <a:avLst/>
+          </a:prstGeom>
+          <a:noFill/>
+        </p:spPr>
+        <p:txBody>
+          <a:bodyPr wrap="none" rtlCol="0">
+            <a:spAutoFit/>
+          </a:bodyPr>
+          <a:lstStyle/>
+          <a:p>
+            <a:r>
+              <a:rPr lang="en-US" sz="1400" i="1" dirty="0" smtClean="0">
                 <a:latin typeface="Times New Roman" pitchFamily="18" charset="0"/>
                 <a:cs typeface="Times New Roman" pitchFamily="18" charset="0"/>
-              </a:endParaRPr>
-            </a:p>
-          </p:txBody>
-        </p:sp>
-        <p:sp>
-          <p:nvSpPr>
-            <p:cNvPr id="44" name="TextBox 43"/>
-            <p:cNvSpPr txBox="1"/>
-            <p:nvPr/>
-          </p:nvSpPr>
-          <p:spPr>
-            <a:xfrm>
-              <a:off x="2588401" y="1108677"/>
-              <a:ext cx="274434" cy="307777"/>
-            </a:xfrm>
-            <a:prstGeom prst="rect">
-              <a:avLst/>
-            </a:prstGeom>
-            <a:noFill/>
-          </p:spPr>
-          <p:txBody>
-            <a:bodyPr wrap="none" rtlCol="0">
-              <a:spAutoFit/>
-            </a:bodyPr>
-            <a:lstStyle/>
-            <a:p>
-              <a:r>
-                <a:rPr lang="en-US" sz="1400" i="1" dirty="0" smtClean="0">
-                  <a:latin typeface="Times New Roman" pitchFamily="18" charset="0"/>
-                  <a:cs typeface="Times New Roman" pitchFamily="18" charset="0"/>
-                </a:rPr>
-                <a:t>0</a:t>
-              </a:r>
-              <a:endParaRPr lang="en-US" sz="1400" i="1" dirty="0">
+              </a:rPr>
+              <a:t>4</a:t>
+            </a:r>
+            <a:endParaRPr lang="en-US" sz="1400" i="1" dirty="0">
+              <a:latin typeface="Times New Roman" pitchFamily="18" charset="0"/>
+              <a:cs typeface="Times New Roman" pitchFamily="18" charset="0"/>
+            </a:endParaRPr>
+          </a:p>
+        </p:txBody>
+      </p:sp>
+      <p:sp>
+        <p:nvSpPr>
+          <p:cNvPr id="44" name="TextBox 43"/>
+          <p:cNvSpPr txBox="1"/>
+          <p:nvPr/>
+        </p:nvSpPr>
+        <p:spPr>
+          <a:xfrm>
+            <a:off x="2740801" y="1108677"/>
+            <a:ext cx="274434" cy="307777"/>
+          </a:xfrm>
+          <a:prstGeom prst="rect">
+            <a:avLst/>
+          </a:prstGeom>
+          <a:noFill/>
+        </p:spPr>
+        <p:txBody>
+          <a:bodyPr wrap="none" rtlCol="0">
+            <a:spAutoFit/>
+          </a:bodyPr>
+          <a:lstStyle/>
+          <a:p>
+            <a:r>
+              <a:rPr lang="en-US" sz="1400" i="1" dirty="0" smtClean="0">
                 <a:latin typeface="Times New Roman" pitchFamily="18" charset="0"/>
                 <a:cs typeface="Times New Roman" pitchFamily="18" charset="0"/>
-              </a:endParaRPr>
-            </a:p>
-          </p:txBody>
-        </p:sp>
-        <p:sp>
-          <p:nvSpPr>
-            <p:cNvPr id="45" name="TextBox 44"/>
-            <p:cNvSpPr txBox="1"/>
-            <p:nvPr/>
-          </p:nvSpPr>
-          <p:spPr>
-            <a:xfrm>
-              <a:off x="3662317" y="1110735"/>
-              <a:ext cx="274434" cy="307777"/>
-            </a:xfrm>
-            <a:prstGeom prst="rect">
-              <a:avLst/>
-            </a:prstGeom>
-            <a:noFill/>
-          </p:spPr>
-          <p:txBody>
-            <a:bodyPr wrap="none" rtlCol="0">
-              <a:spAutoFit/>
-            </a:bodyPr>
-            <a:lstStyle/>
-            <a:p>
-              <a:r>
-                <a:rPr lang="en-US" sz="1400" i="1" dirty="0" smtClean="0">
-                  <a:latin typeface="Times New Roman" pitchFamily="18" charset="0"/>
-                  <a:cs typeface="Times New Roman" pitchFamily="18" charset="0"/>
-                </a:rPr>
-                <a:t>5</a:t>
-              </a:r>
-              <a:endParaRPr lang="en-US" sz="1400" i="1" dirty="0">
+              </a:rPr>
+              <a:t>0</a:t>
+            </a:r>
+            <a:endParaRPr lang="en-US" sz="1400" i="1" dirty="0">
+              <a:latin typeface="Times New Roman" pitchFamily="18" charset="0"/>
+              <a:cs typeface="Times New Roman" pitchFamily="18" charset="0"/>
+            </a:endParaRPr>
+          </a:p>
+        </p:txBody>
+      </p:sp>
+      <p:sp>
+        <p:nvSpPr>
+          <p:cNvPr id="45" name="TextBox 44"/>
+          <p:cNvSpPr txBox="1"/>
+          <p:nvPr/>
+        </p:nvSpPr>
+        <p:spPr>
+          <a:xfrm>
+            <a:off x="3814717" y="1110735"/>
+            <a:ext cx="274434" cy="307777"/>
+          </a:xfrm>
+          <a:prstGeom prst="rect">
+            <a:avLst/>
+          </a:prstGeom>
+          <a:noFill/>
+        </p:spPr>
+        <p:txBody>
+          <a:bodyPr wrap="none" rtlCol="0">
+            <a:spAutoFit/>
+          </a:bodyPr>
+          <a:lstStyle/>
+          <a:p>
+            <a:r>
+              <a:rPr lang="en-US" sz="1400" i="1" dirty="0" smtClean="0">
                 <a:latin typeface="Times New Roman" pitchFamily="18" charset="0"/>
                 <a:cs typeface="Times New Roman" pitchFamily="18" charset="0"/>
-              </a:endParaRPr>
-            </a:p>
-          </p:txBody>
-        </p:sp>
-        <p:sp>
-          <p:nvSpPr>
-            <p:cNvPr id="46" name="TextBox 45"/>
-            <p:cNvSpPr txBox="1"/>
-            <p:nvPr/>
-          </p:nvSpPr>
-          <p:spPr>
-            <a:xfrm>
-              <a:off x="2593120" y="85810"/>
-              <a:ext cx="274434" cy="307777"/>
-            </a:xfrm>
-            <a:prstGeom prst="rect">
-              <a:avLst/>
-            </a:prstGeom>
-            <a:noFill/>
-          </p:spPr>
-          <p:txBody>
-            <a:bodyPr wrap="none" rtlCol="0">
-              <a:spAutoFit/>
-            </a:bodyPr>
-            <a:lstStyle/>
-            <a:p>
-              <a:r>
-                <a:rPr lang="en-US" sz="1400" i="1" dirty="0" smtClean="0">
-                  <a:latin typeface="Times New Roman" pitchFamily="18" charset="0"/>
-                  <a:cs typeface="Times New Roman" pitchFamily="18" charset="0"/>
-                </a:rPr>
-                <a:t>4</a:t>
-              </a:r>
-              <a:endParaRPr lang="en-US" sz="1400" i="1" dirty="0">
+              </a:rPr>
+              <a:t>5</a:t>
+            </a:r>
+            <a:endParaRPr lang="en-US" sz="1400" i="1" dirty="0">
+              <a:latin typeface="Times New Roman" pitchFamily="18" charset="0"/>
+              <a:cs typeface="Times New Roman" pitchFamily="18" charset="0"/>
+            </a:endParaRPr>
+          </a:p>
+        </p:txBody>
+      </p:sp>
+      <p:sp>
+        <p:nvSpPr>
+          <p:cNvPr id="46" name="TextBox 45"/>
+          <p:cNvSpPr txBox="1"/>
+          <p:nvPr/>
+        </p:nvSpPr>
+        <p:spPr>
+          <a:xfrm>
+            <a:off x="2745520" y="85810"/>
+            <a:ext cx="274434" cy="307777"/>
+          </a:xfrm>
+          <a:prstGeom prst="rect">
+            <a:avLst/>
+          </a:prstGeom>
+          <a:noFill/>
+        </p:spPr>
+        <p:txBody>
+          <a:bodyPr wrap="none" rtlCol="0">
+            <a:spAutoFit/>
+          </a:bodyPr>
+          <a:lstStyle/>
+          <a:p>
+            <a:r>
+              <a:rPr lang="en-US" sz="1400" i="1" dirty="0" smtClean="0">
                 <a:latin typeface="Times New Roman" pitchFamily="18" charset="0"/>
                 <a:cs typeface="Times New Roman" pitchFamily="18" charset="0"/>
-              </a:endParaRPr>
-            </a:p>
-          </p:txBody>
-        </p:sp>
-        <p:sp>
-          <p:nvSpPr>
-            <p:cNvPr id="58" name="Oval 57"/>
-            <p:cNvSpPr/>
-            <p:nvPr/>
-          </p:nvSpPr>
-          <p:spPr>
-            <a:xfrm>
-              <a:off x="232562" y="1524000"/>
-              <a:ext cx="457201" cy="266700"/>
-            </a:xfrm>
-            <a:prstGeom prst="ellipse">
-              <a:avLst/>
-            </a:prstGeom>
+              </a:rPr>
+              <a:t>4</a:t>
+            </a:r>
+            <a:endParaRPr lang="en-US" sz="1400" i="1" dirty="0">
+              <a:latin typeface="Times New Roman" pitchFamily="18" charset="0"/>
+              <a:cs typeface="Times New Roman" pitchFamily="18" charset="0"/>
+            </a:endParaRPr>
+          </a:p>
+        </p:txBody>
+      </p:sp>
+      <p:sp>
+        <p:nvSpPr>
+          <p:cNvPr id="58" name="Oval 57"/>
+          <p:cNvSpPr/>
+          <p:nvPr/>
+        </p:nvSpPr>
+        <p:spPr>
+          <a:xfrm>
+            <a:off x="384962" y="1524000"/>
+            <a:ext cx="457201" cy="266700"/>
+          </a:xfrm>
+          <a:prstGeom prst="ellipse">
+            <a:avLst/>
+          </a:prstGeom>
+          <a:solidFill>
+            <a:srgbClr val="C1EEF7"/>
+          </a:solidFill>
+          <a:ln w="12700">
             <a:solidFill>
-              <a:srgbClr val="C1EEF7"/>
+              <a:schemeClr val="tx1"/>
             </a:solidFill>
-            <a:ln w="12700">
-              <a:solidFill>
-                <a:schemeClr val="tx1"/>
-              </a:solidFill>
-            </a:ln>
-          </p:spPr>
-          <p:style>
-            <a:lnRef idx="2">
-              <a:schemeClr val="accent5">
-                <a:shade val="50000"/>
-              </a:schemeClr>
-            </a:lnRef>
-            <a:fillRef idx="1">
-              <a:schemeClr val="accent5"/>
-            </a:fillRef>
-            <a:effectRef idx="0">
-              <a:schemeClr val="accent5"/>
-            </a:effectRef>
-            <a:fontRef idx="minor">
-              <a:schemeClr val="lt1"/>
-            </a:fontRef>
-          </p:style>
-          <p:txBody>
-            <a:bodyPr lIns="0" tIns="0" rIns="0" bIns="0" rtlCol="0" anchor="ctr"/>
-            <a:lstStyle/>
-            <a:p>
-              <a:pPr algn="ctr"/>
-              <a:r>
-                <a:rPr lang="en-US" sz="900" b="1" i="1" dirty="0">
-                  <a:solidFill>
-                    <a:schemeClr val="tx1"/>
-                  </a:solidFill>
-                  <a:latin typeface="Times New Roman" pitchFamily="18" charset="0"/>
-                  <a:cs typeface="Times New Roman" pitchFamily="18" charset="0"/>
-                </a:rPr>
-                <a:t>x &lt; </a:t>
-              </a:r>
-              <a:r>
-                <a:rPr lang="en-US" sz="900" b="1" dirty="0">
-                  <a:solidFill>
-                    <a:schemeClr val="tx1"/>
-                  </a:solidFill>
-                  <a:latin typeface="Times New Roman" pitchFamily="18" charset="0"/>
-                  <a:cs typeface="Times New Roman" pitchFamily="18" charset="0"/>
-                </a:rPr>
-                <a:t>1</a:t>
-              </a:r>
-            </a:p>
-          </p:txBody>
-        </p:sp>
-        <p:sp>
-          <p:nvSpPr>
-            <p:cNvPr id="61" name="Oval 60"/>
-            <p:cNvSpPr/>
-            <p:nvPr/>
-          </p:nvSpPr>
-          <p:spPr>
-            <a:xfrm>
-              <a:off x="571460" y="1834633"/>
-              <a:ext cx="457201" cy="266700"/>
-            </a:xfrm>
-            <a:prstGeom prst="ellipse">
-              <a:avLst/>
-            </a:prstGeom>
-            <a:solidFill>
-              <a:srgbClr val="C1EEF7"/>
-            </a:solidFill>
-            <a:ln w="12700">
-              <a:solidFill>
-                <a:schemeClr val="tx1"/>
-              </a:solidFill>
-            </a:ln>
-          </p:spPr>
-          <p:style>
-            <a:lnRef idx="2">
-              <a:schemeClr val="accent5">
-                <a:shade val="50000"/>
-              </a:schemeClr>
-            </a:lnRef>
-            <a:fillRef idx="1">
-              <a:schemeClr val="accent5"/>
-            </a:fillRef>
-            <a:effectRef idx="0">
-              <a:schemeClr val="accent5"/>
-            </a:effectRef>
-            <a:fontRef idx="minor">
-              <a:schemeClr val="lt1"/>
-            </a:fontRef>
-          </p:style>
-          <p:txBody>
-            <a:bodyPr lIns="0" tIns="0" rIns="0" bIns="0" rtlCol="0" anchor="ctr"/>
-            <a:lstStyle/>
-            <a:p>
-              <a:pPr algn="ctr"/>
-              <a:r>
-                <a:rPr lang="en-US" sz="900" b="1" i="1" dirty="0">
-                  <a:solidFill>
-                    <a:schemeClr val="tx1"/>
-                  </a:solidFill>
-                  <a:latin typeface="Times New Roman" pitchFamily="18" charset="0"/>
-                  <a:cs typeface="Times New Roman" pitchFamily="18" charset="0"/>
-                </a:rPr>
-                <a:t>x &lt; </a:t>
-              </a:r>
-              <a:r>
-                <a:rPr lang="en-US" sz="900" b="1" dirty="0">
-                  <a:solidFill>
-                    <a:schemeClr val="tx1"/>
-                  </a:solidFill>
-                  <a:latin typeface="Times New Roman" pitchFamily="18" charset="0"/>
-                  <a:cs typeface="Times New Roman" pitchFamily="18" charset="0"/>
-                </a:rPr>
-                <a:t>2</a:t>
-              </a:r>
-            </a:p>
-          </p:txBody>
-        </p:sp>
-        <p:sp>
-          <p:nvSpPr>
-            <p:cNvPr id="62" name="Oval 61"/>
-            <p:cNvSpPr/>
-            <p:nvPr/>
-          </p:nvSpPr>
-          <p:spPr>
-            <a:xfrm>
-              <a:off x="959331" y="2146942"/>
-              <a:ext cx="457201" cy="266700"/>
-            </a:xfrm>
-            <a:prstGeom prst="ellipse">
-              <a:avLst/>
-            </a:prstGeom>
-            <a:solidFill>
-              <a:srgbClr val="C1EEF7"/>
-            </a:solidFill>
-            <a:ln w="12700">
-              <a:solidFill>
-                <a:schemeClr val="tx1"/>
-              </a:solidFill>
-            </a:ln>
-          </p:spPr>
-          <p:style>
-            <a:lnRef idx="2">
-              <a:schemeClr val="accent5">
-                <a:shade val="50000"/>
-              </a:schemeClr>
-            </a:lnRef>
-            <a:fillRef idx="1">
-              <a:schemeClr val="accent5"/>
-            </a:fillRef>
-            <a:effectRef idx="0">
-              <a:schemeClr val="accent5"/>
-            </a:effectRef>
-            <a:fontRef idx="minor">
-              <a:schemeClr val="lt1"/>
-            </a:fontRef>
-          </p:style>
-          <p:txBody>
-            <a:bodyPr lIns="0" tIns="0" rIns="0" bIns="0" rtlCol="0" anchor="ctr"/>
-            <a:lstStyle/>
-            <a:p>
-              <a:pPr algn="ctr"/>
-              <a:r>
-                <a:rPr lang="en-US" sz="900" b="1" i="1" dirty="0">
-                  <a:solidFill>
-                    <a:schemeClr val="tx1"/>
-                  </a:solidFill>
-                  <a:latin typeface="Times New Roman" pitchFamily="18" charset="0"/>
-                  <a:cs typeface="Times New Roman" pitchFamily="18" charset="0"/>
-                </a:rPr>
-                <a:t>x &lt; </a:t>
-              </a:r>
-              <a:r>
-                <a:rPr lang="en-US" sz="900" b="1" dirty="0">
-                  <a:solidFill>
-                    <a:schemeClr val="tx1"/>
-                  </a:solidFill>
-                  <a:latin typeface="Times New Roman" pitchFamily="18" charset="0"/>
-                  <a:cs typeface="Times New Roman" pitchFamily="18" charset="0"/>
-                </a:rPr>
-                <a:t>3</a:t>
-              </a:r>
-            </a:p>
-          </p:txBody>
-        </p:sp>
-        <p:sp>
-          <p:nvSpPr>
-            <p:cNvPr id="63" name="Oval 62"/>
-            <p:cNvSpPr/>
-            <p:nvPr/>
-          </p:nvSpPr>
-          <p:spPr>
-            <a:xfrm>
-              <a:off x="1342428" y="2443929"/>
-              <a:ext cx="457201" cy="266700"/>
-            </a:xfrm>
-            <a:prstGeom prst="ellipse">
-              <a:avLst/>
-            </a:prstGeom>
-            <a:solidFill>
-              <a:srgbClr val="C1EEF7"/>
-            </a:solidFill>
-            <a:ln w="12700">
-              <a:solidFill>
-                <a:schemeClr val="tx1"/>
-              </a:solidFill>
-            </a:ln>
-          </p:spPr>
-          <p:style>
-            <a:lnRef idx="2">
-              <a:schemeClr val="accent5">
-                <a:shade val="50000"/>
-              </a:schemeClr>
-            </a:lnRef>
-            <a:fillRef idx="1">
-              <a:schemeClr val="accent5"/>
-            </a:fillRef>
-            <a:effectRef idx="0">
-              <a:schemeClr val="accent5"/>
-            </a:effectRef>
-            <a:fontRef idx="minor">
-              <a:schemeClr val="lt1"/>
-            </a:fontRef>
-          </p:style>
-          <p:txBody>
-            <a:bodyPr lIns="0" tIns="0" rIns="0" bIns="0" rtlCol="0" anchor="ctr"/>
-            <a:lstStyle/>
-            <a:p>
-              <a:pPr algn="ctr"/>
-              <a:r>
-                <a:rPr lang="en-US" sz="900" b="1" i="1" dirty="0">
-                  <a:solidFill>
-                    <a:schemeClr val="tx1"/>
-                  </a:solidFill>
-                  <a:latin typeface="Times New Roman" pitchFamily="18" charset="0"/>
-                  <a:cs typeface="Times New Roman" pitchFamily="18" charset="0"/>
-                </a:rPr>
-                <a:t>x </a:t>
-              </a:r>
-              <a:r>
-                <a:rPr lang="en-US" sz="900" b="1" i="1" dirty="0" smtClean="0">
-                  <a:solidFill>
-                    <a:schemeClr val="tx1"/>
-                  </a:solidFill>
-                  <a:latin typeface="Times New Roman" pitchFamily="18" charset="0"/>
-                  <a:cs typeface="Times New Roman" pitchFamily="18" charset="0"/>
-                </a:rPr>
-                <a:t>&lt; </a:t>
-              </a:r>
-              <a:r>
-                <a:rPr lang="en-US" sz="900" b="1" dirty="0">
-                  <a:solidFill>
-                    <a:schemeClr val="tx1"/>
-                  </a:solidFill>
-                  <a:latin typeface="Times New Roman" pitchFamily="18" charset="0"/>
-                  <a:cs typeface="Times New Roman" pitchFamily="18" charset="0"/>
-                </a:rPr>
-                <a:t>4</a:t>
-              </a:r>
-            </a:p>
-          </p:txBody>
-        </p:sp>
-        <p:sp>
-          <p:nvSpPr>
-            <p:cNvPr id="64" name="Rectangle 63"/>
-            <p:cNvSpPr/>
-            <p:nvPr/>
-          </p:nvSpPr>
-          <p:spPr>
-            <a:xfrm>
-              <a:off x="76200" y="2863333"/>
-              <a:ext cx="266699" cy="228600"/>
-            </a:xfrm>
-            <a:prstGeom prst="rect">
-              <a:avLst/>
-            </a:prstGeom>
-            <a:solidFill>
-              <a:srgbClr val="FFB9B9"/>
-            </a:solidFill>
-            <a:ln w="12700">
-              <a:solidFill>
-                <a:schemeClr val="tx1"/>
-              </a:solidFill>
-            </a:ln>
-          </p:spPr>
-          <p:style>
-            <a:lnRef idx="2">
-              <a:schemeClr val="accent1">
-                <a:shade val="50000"/>
-              </a:schemeClr>
-            </a:lnRef>
-            <a:fillRef idx="1">
-              <a:schemeClr val="accent1"/>
-            </a:fillRef>
-            <a:effectRef idx="0">
-              <a:schemeClr val="accent1"/>
-            </a:effectRef>
-            <a:fontRef idx="minor">
-              <a:schemeClr val="lt1"/>
-            </a:fontRef>
-          </p:style>
-          <p:txBody>
-            <a:bodyPr lIns="0" tIns="0" rIns="0" bIns="0" rtlCol="0" anchor="ctr"/>
-            <a:lstStyle/>
-            <a:p>
-              <a:pPr algn="ctr"/>
-              <a:r>
-                <a:rPr lang="en-US" sz="900" b="1" dirty="0">
-                  <a:solidFill>
-                    <a:schemeClr val="tx1"/>
-                  </a:solidFill>
-                  <a:latin typeface="Times New Roman" pitchFamily="18" charset="0"/>
-                  <a:cs typeface="Times New Roman" pitchFamily="18" charset="0"/>
-                </a:rPr>
-                <a:t>1</a:t>
-              </a:r>
-            </a:p>
-          </p:txBody>
-        </p:sp>
-        <p:sp>
-          <p:nvSpPr>
-            <p:cNvPr id="65" name="Rectangle 64"/>
-            <p:cNvSpPr/>
-            <p:nvPr/>
-          </p:nvSpPr>
-          <p:spPr>
-            <a:xfrm>
-              <a:off x="524465" y="2863333"/>
-              <a:ext cx="266699" cy="228600"/>
-            </a:xfrm>
-            <a:prstGeom prst="rect">
-              <a:avLst/>
-            </a:prstGeom>
-            <a:solidFill>
-              <a:srgbClr val="FFB9B9"/>
-            </a:solidFill>
-            <a:ln w="12700">
-              <a:solidFill>
-                <a:schemeClr val="tx1"/>
-              </a:solidFill>
-            </a:ln>
-          </p:spPr>
-          <p:style>
-            <a:lnRef idx="2">
-              <a:schemeClr val="accent1">
-                <a:shade val="50000"/>
-              </a:schemeClr>
-            </a:lnRef>
-            <a:fillRef idx="1">
-              <a:schemeClr val="accent1"/>
-            </a:fillRef>
-            <a:effectRef idx="0">
-              <a:schemeClr val="accent1"/>
-            </a:effectRef>
-            <a:fontRef idx="minor">
-              <a:schemeClr val="lt1"/>
-            </a:fontRef>
-          </p:style>
-          <p:txBody>
-            <a:bodyPr lIns="0" tIns="0" rIns="0" bIns="0" rtlCol="0" anchor="ctr"/>
-            <a:lstStyle/>
-            <a:p>
-              <a:pPr algn="ctr"/>
-              <a:r>
-                <a:rPr lang="en-US" sz="900" b="1" dirty="0">
-                  <a:solidFill>
-                    <a:schemeClr val="tx1"/>
-                  </a:solidFill>
-                  <a:latin typeface="Times New Roman" pitchFamily="18" charset="0"/>
-                  <a:cs typeface="Times New Roman" pitchFamily="18" charset="0"/>
-                </a:rPr>
-                <a:t>2</a:t>
-              </a:r>
-            </a:p>
-          </p:txBody>
-        </p:sp>
-        <p:sp>
-          <p:nvSpPr>
-            <p:cNvPr id="66" name="Rectangle 65"/>
-            <p:cNvSpPr/>
-            <p:nvPr/>
-          </p:nvSpPr>
-          <p:spPr>
-            <a:xfrm>
-              <a:off x="972730" y="2863333"/>
-              <a:ext cx="266699" cy="228600"/>
-            </a:xfrm>
-            <a:prstGeom prst="rect">
-              <a:avLst/>
-            </a:prstGeom>
-            <a:solidFill>
-              <a:srgbClr val="FFB9B9"/>
-            </a:solidFill>
-            <a:ln w="12700">
-              <a:solidFill>
-                <a:schemeClr val="tx1"/>
-              </a:solidFill>
-            </a:ln>
-          </p:spPr>
-          <p:style>
-            <a:lnRef idx="2">
-              <a:schemeClr val="accent1">
-                <a:shade val="50000"/>
-              </a:schemeClr>
-            </a:lnRef>
-            <a:fillRef idx="1">
-              <a:schemeClr val="accent1"/>
-            </a:fillRef>
-            <a:effectRef idx="0">
-              <a:schemeClr val="accent1"/>
-            </a:effectRef>
-            <a:fontRef idx="minor">
-              <a:schemeClr val="lt1"/>
-            </a:fontRef>
-          </p:style>
-          <p:txBody>
-            <a:bodyPr lIns="0" tIns="0" rIns="0" bIns="0" rtlCol="0" anchor="ctr"/>
-            <a:lstStyle/>
-            <a:p>
-              <a:pPr algn="ctr"/>
-              <a:r>
-                <a:rPr lang="en-US" sz="900" b="1" dirty="0">
-                  <a:solidFill>
-                    <a:schemeClr val="tx1"/>
-                  </a:solidFill>
-                  <a:latin typeface="Times New Roman" pitchFamily="18" charset="0"/>
-                  <a:cs typeface="Times New Roman" pitchFamily="18" charset="0"/>
-                </a:rPr>
-                <a:t>3</a:t>
-              </a:r>
-            </a:p>
-          </p:txBody>
-        </p:sp>
-        <p:sp>
-          <p:nvSpPr>
-            <p:cNvPr id="67" name="Rectangle 66"/>
-            <p:cNvSpPr/>
-            <p:nvPr/>
-          </p:nvSpPr>
-          <p:spPr>
-            <a:xfrm>
-              <a:off x="1420995" y="2863333"/>
-              <a:ext cx="300627" cy="228600"/>
-            </a:xfrm>
-            <a:prstGeom prst="rect">
-              <a:avLst/>
-            </a:prstGeom>
-            <a:solidFill>
-              <a:srgbClr val="FFB9B9"/>
-            </a:solidFill>
-            <a:ln w="12700">
-              <a:solidFill>
-                <a:schemeClr val="tx1"/>
-              </a:solidFill>
-            </a:ln>
-          </p:spPr>
-          <p:style>
-            <a:lnRef idx="2">
-              <a:schemeClr val="accent1">
-                <a:shade val="50000"/>
-              </a:schemeClr>
-            </a:lnRef>
-            <a:fillRef idx="1">
-              <a:schemeClr val="accent1"/>
-            </a:fillRef>
-            <a:effectRef idx="0">
-              <a:schemeClr val="accent1"/>
-            </a:effectRef>
-            <a:fontRef idx="minor">
-              <a:schemeClr val="lt1"/>
-            </a:fontRef>
-          </p:style>
-          <p:txBody>
-            <a:bodyPr lIns="0" tIns="0" rIns="0" bIns="0" rtlCol="0" anchor="ctr"/>
-            <a:lstStyle/>
-            <a:p>
-              <a:pPr algn="ctr"/>
-              <a:r>
-                <a:rPr lang="en-US" sz="900" b="1" dirty="0" smtClean="0">
-                  <a:solidFill>
-                    <a:schemeClr val="tx1"/>
-                  </a:solidFill>
-                  <a:latin typeface="Times New Roman" pitchFamily="18" charset="0"/>
-                  <a:cs typeface="Times New Roman" pitchFamily="18" charset="0"/>
-                </a:rPr>
-                <a:t>2.75</a:t>
-              </a:r>
-              <a:endParaRPr lang="en-US" sz="900" b="1" dirty="0">
+          </a:ln>
+        </p:spPr>
+        <p:style>
+          <a:lnRef idx="2">
+            <a:schemeClr val="accent5">
+              <a:shade val="50000"/>
+            </a:schemeClr>
+          </a:lnRef>
+          <a:fillRef idx="1">
+            <a:schemeClr val="accent5"/>
+          </a:fillRef>
+          <a:effectRef idx="0">
+            <a:schemeClr val="accent5"/>
+          </a:effectRef>
+          <a:fontRef idx="minor">
+            <a:schemeClr val="lt1"/>
+          </a:fontRef>
+        </p:style>
+        <p:txBody>
+          <a:bodyPr lIns="0" tIns="0" rIns="0" bIns="0" rtlCol="0" anchor="ctr"/>
+          <a:lstStyle/>
+          <a:p>
+            <a:pPr algn="ctr"/>
+            <a:r>
+              <a:rPr lang="en-US" sz="900" b="1" i="1" dirty="0">
                 <a:solidFill>
                   <a:schemeClr val="tx1"/>
                 </a:solidFill>
                 <a:latin typeface="Times New Roman" pitchFamily="18" charset="0"/>
                 <a:cs typeface="Times New Roman" pitchFamily="18" charset="0"/>
-              </a:endParaRPr>
-            </a:p>
-          </p:txBody>
-        </p:sp>
-        <p:cxnSp>
-          <p:nvCxnSpPr>
-            <p:cNvPr id="69" name="Straight Arrow Connector 68"/>
-            <p:cNvCxnSpPr>
-              <a:stCxn id="58" idx="4"/>
-              <a:endCxn id="64" idx="0"/>
-            </p:cNvCxnSpPr>
-            <p:nvPr/>
-          </p:nvCxnSpPr>
-          <p:spPr>
-            <a:xfrm flipH="1">
-              <a:off x="209550" y="1790700"/>
-              <a:ext cx="251613" cy="1072633"/>
-            </a:xfrm>
-            <a:prstGeom prst="straightConnector1">
-              <a:avLst/>
-            </a:prstGeom>
-            <a:ln w="12700">
-              <a:solidFill>
-                <a:schemeClr val="tx1"/>
-              </a:solidFill>
-              <a:tailEnd type="triangle" w="med" len="med"/>
-            </a:ln>
-          </p:spPr>
-          <p:style>
-            <a:lnRef idx="1">
-              <a:schemeClr val="accent1"/>
-            </a:lnRef>
-            <a:fillRef idx="0">
-              <a:schemeClr val="accent1"/>
-            </a:fillRef>
-            <a:effectRef idx="0">
-              <a:schemeClr val="accent1"/>
-            </a:effectRef>
-            <a:fontRef idx="minor">
-              <a:schemeClr val="tx1"/>
-            </a:fontRef>
-          </p:style>
-        </p:cxnSp>
-        <p:cxnSp>
-          <p:nvCxnSpPr>
-            <p:cNvPr id="70" name="Straight Arrow Connector 69"/>
-            <p:cNvCxnSpPr>
-              <a:stCxn id="61" idx="4"/>
-              <a:endCxn id="65" idx="0"/>
-            </p:cNvCxnSpPr>
-            <p:nvPr/>
-          </p:nvCxnSpPr>
-          <p:spPr>
-            <a:xfrm flipH="1">
-              <a:off x="657815" y="2101333"/>
-              <a:ext cx="142246" cy="762000"/>
-            </a:xfrm>
-            <a:prstGeom prst="straightConnector1">
-              <a:avLst/>
-            </a:prstGeom>
-            <a:ln w="12700">
-              <a:solidFill>
-                <a:schemeClr val="tx1"/>
-              </a:solidFill>
-              <a:tailEnd type="triangle" w="med" len="med"/>
-            </a:ln>
-          </p:spPr>
-          <p:style>
-            <a:lnRef idx="1">
-              <a:schemeClr val="accent1"/>
-            </a:lnRef>
-            <a:fillRef idx="0">
-              <a:schemeClr val="accent1"/>
-            </a:fillRef>
-            <a:effectRef idx="0">
-              <a:schemeClr val="accent1"/>
-            </a:effectRef>
-            <a:fontRef idx="minor">
-              <a:schemeClr val="tx1"/>
-            </a:fontRef>
-          </p:style>
-        </p:cxnSp>
-        <p:cxnSp>
-          <p:nvCxnSpPr>
-            <p:cNvPr id="72" name="Straight Arrow Connector 71"/>
-            <p:cNvCxnSpPr>
-              <a:stCxn id="62" idx="4"/>
-              <a:endCxn id="66" idx="0"/>
-            </p:cNvCxnSpPr>
-            <p:nvPr/>
-          </p:nvCxnSpPr>
-          <p:spPr>
-            <a:xfrm flipH="1">
-              <a:off x="1106080" y="2413642"/>
-              <a:ext cx="81852" cy="449691"/>
-            </a:xfrm>
-            <a:prstGeom prst="straightConnector1">
-              <a:avLst/>
-            </a:prstGeom>
-            <a:ln w="12700">
-              <a:solidFill>
-                <a:schemeClr val="tx1"/>
-              </a:solidFill>
-              <a:tailEnd type="triangle" w="med" len="med"/>
-            </a:ln>
-          </p:spPr>
-          <p:style>
-            <a:lnRef idx="1">
-              <a:schemeClr val="accent1"/>
-            </a:lnRef>
-            <a:fillRef idx="0">
-              <a:schemeClr val="accent1"/>
-            </a:fillRef>
-            <a:effectRef idx="0">
-              <a:schemeClr val="accent1"/>
-            </a:effectRef>
-            <a:fontRef idx="minor">
-              <a:schemeClr val="tx1"/>
-            </a:fontRef>
-          </p:style>
-        </p:cxnSp>
-        <p:cxnSp>
-          <p:nvCxnSpPr>
-            <p:cNvPr id="75" name="Straight Arrow Connector 74"/>
-            <p:cNvCxnSpPr/>
-            <p:nvPr/>
-          </p:nvCxnSpPr>
-          <p:spPr>
-            <a:xfrm>
-              <a:off x="1721622" y="2681288"/>
-              <a:ext cx="316728" cy="176212"/>
-            </a:xfrm>
-            <a:prstGeom prst="straightConnector1">
-              <a:avLst/>
-            </a:prstGeom>
-            <a:ln w="12700">
-              <a:solidFill>
-                <a:schemeClr val="tx1"/>
-              </a:solidFill>
-              <a:prstDash val="sysDash"/>
-              <a:tailEnd type="triangle" w="med" len="med"/>
-            </a:ln>
-          </p:spPr>
-          <p:style>
-            <a:lnRef idx="1">
-              <a:schemeClr val="accent1"/>
-            </a:lnRef>
-            <a:fillRef idx="0">
-              <a:schemeClr val="accent1"/>
-            </a:fillRef>
-            <a:effectRef idx="0">
-              <a:schemeClr val="accent1"/>
-            </a:effectRef>
-            <a:fontRef idx="minor">
-              <a:schemeClr val="tx1"/>
-            </a:fontRef>
-          </p:style>
-        </p:cxnSp>
-        <p:cxnSp>
-          <p:nvCxnSpPr>
-            <p:cNvPr id="77" name="Straight Arrow Connector 76"/>
-            <p:cNvCxnSpPr/>
-            <p:nvPr/>
-          </p:nvCxnSpPr>
-          <p:spPr>
-            <a:xfrm flipH="1">
-              <a:off x="1536043" y="2714625"/>
-              <a:ext cx="33179" cy="142875"/>
-            </a:xfrm>
-            <a:prstGeom prst="straightConnector1">
-              <a:avLst/>
-            </a:prstGeom>
-            <a:ln w="12700">
-              <a:solidFill>
-                <a:schemeClr val="tx1"/>
-              </a:solidFill>
-              <a:prstDash val="solid"/>
-              <a:tailEnd type="triangle" w="med" len="med"/>
-            </a:ln>
-          </p:spPr>
-          <p:style>
-            <a:lnRef idx="1">
-              <a:schemeClr val="accent1"/>
-            </a:lnRef>
-            <a:fillRef idx="0">
-              <a:schemeClr val="accent1"/>
-            </a:fillRef>
-            <a:effectRef idx="0">
-              <a:schemeClr val="accent1"/>
-            </a:effectRef>
-            <a:fontRef idx="minor">
-              <a:schemeClr val="tx1"/>
-            </a:fontRef>
-          </p:style>
-        </p:cxnSp>
-        <p:cxnSp>
-          <p:nvCxnSpPr>
-            <p:cNvPr id="80" name="Straight Arrow Connector 79"/>
-            <p:cNvCxnSpPr/>
-            <p:nvPr/>
-          </p:nvCxnSpPr>
-          <p:spPr>
-            <a:xfrm>
-              <a:off x="1391464" y="2348468"/>
-              <a:ext cx="189471" cy="98854"/>
-            </a:xfrm>
-            <a:prstGeom prst="straightConnector1">
-              <a:avLst/>
-            </a:prstGeom>
-            <a:ln w="12700">
-              <a:solidFill>
-                <a:schemeClr val="tx1"/>
-              </a:solidFill>
-              <a:prstDash val="sysDash"/>
-              <a:tailEnd type="triangle" w="med" len="med"/>
-            </a:ln>
-          </p:spPr>
-          <p:style>
-            <a:lnRef idx="1">
-              <a:schemeClr val="accent1"/>
-            </a:lnRef>
-            <a:fillRef idx="0">
-              <a:schemeClr val="accent1"/>
-            </a:fillRef>
-            <a:effectRef idx="0">
-              <a:schemeClr val="accent1"/>
-            </a:effectRef>
-            <a:fontRef idx="minor">
-              <a:schemeClr val="tx1"/>
-            </a:fontRef>
-          </p:style>
-        </p:cxnSp>
-        <p:cxnSp>
-          <p:nvCxnSpPr>
-            <p:cNvPr id="83" name="Straight Arrow Connector 82"/>
-            <p:cNvCxnSpPr/>
-            <p:nvPr/>
-          </p:nvCxnSpPr>
-          <p:spPr>
-            <a:xfrm>
-              <a:off x="1012524" y="2035430"/>
-              <a:ext cx="205946" cy="123568"/>
-            </a:xfrm>
-            <a:prstGeom prst="straightConnector1">
-              <a:avLst/>
-            </a:prstGeom>
-            <a:ln w="12700">
-              <a:solidFill>
-                <a:schemeClr val="tx1"/>
-              </a:solidFill>
-              <a:prstDash val="sysDash"/>
-              <a:tailEnd type="triangle" w="med" len="med"/>
-            </a:ln>
-          </p:spPr>
-          <p:style>
-            <a:lnRef idx="1">
-              <a:schemeClr val="accent1"/>
-            </a:lnRef>
-            <a:fillRef idx="0">
-              <a:schemeClr val="accent1"/>
-            </a:fillRef>
-            <a:effectRef idx="0">
-              <a:schemeClr val="accent1"/>
-            </a:effectRef>
-            <a:fontRef idx="minor">
-              <a:schemeClr val="tx1"/>
-            </a:fontRef>
-          </p:style>
-        </p:cxnSp>
-        <p:cxnSp>
-          <p:nvCxnSpPr>
-            <p:cNvPr id="85" name="Straight Arrow Connector 84"/>
-            <p:cNvCxnSpPr/>
-            <p:nvPr/>
-          </p:nvCxnSpPr>
-          <p:spPr>
-            <a:xfrm>
-              <a:off x="638416" y="1730629"/>
-              <a:ext cx="184638" cy="115331"/>
-            </a:xfrm>
-            <a:prstGeom prst="straightConnector1">
-              <a:avLst/>
-            </a:prstGeom>
-            <a:ln w="12700">
-              <a:solidFill>
-                <a:schemeClr val="tx1"/>
-              </a:solidFill>
-              <a:prstDash val="sysDash"/>
-              <a:tailEnd type="triangle" w="med" len="med"/>
-            </a:ln>
-          </p:spPr>
-          <p:style>
-            <a:lnRef idx="1">
-              <a:schemeClr val="accent1"/>
-            </a:lnRef>
-            <a:fillRef idx="0">
-              <a:schemeClr val="accent1"/>
-            </a:fillRef>
-            <a:effectRef idx="0">
-              <a:schemeClr val="accent1"/>
-            </a:effectRef>
-            <a:fontRef idx="minor">
-              <a:schemeClr val="tx1"/>
-            </a:fontRef>
-          </p:style>
-        </p:cxnSp>
-        <p:sp>
-          <p:nvSpPr>
-            <p:cNvPr id="105" name="Oval 104"/>
-            <p:cNvSpPr/>
-            <p:nvPr/>
-          </p:nvSpPr>
-          <p:spPr>
-            <a:xfrm>
-              <a:off x="3113031" y="1982157"/>
-              <a:ext cx="457201" cy="266700"/>
-            </a:xfrm>
-            <a:prstGeom prst="ellipse">
-              <a:avLst/>
-            </a:prstGeom>
-            <a:solidFill>
-              <a:srgbClr val="C1EEF7"/>
-            </a:solidFill>
-            <a:ln w="12700">
-              <a:solidFill>
-                <a:schemeClr val="tx1"/>
-              </a:solidFill>
-            </a:ln>
-          </p:spPr>
-          <p:style>
-            <a:lnRef idx="2">
-              <a:schemeClr val="accent5">
-                <a:shade val="50000"/>
-              </a:schemeClr>
-            </a:lnRef>
-            <a:fillRef idx="1">
-              <a:schemeClr val="accent5"/>
-            </a:fillRef>
-            <a:effectRef idx="0">
-              <a:schemeClr val="accent5"/>
-            </a:effectRef>
-            <a:fontRef idx="minor">
-              <a:schemeClr val="lt1"/>
-            </a:fontRef>
-          </p:style>
-          <p:txBody>
-            <a:bodyPr lIns="0" tIns="0" rIns="0" bIns="0" rtlCol="0" anchor="ctr"/>
-            <a:lstStyle/>
-            <a:p>
-              <a:pPr algn="ctr"/>
-              <a:r>
-                <a:rPr lang="en-US" sz="900" b="1" i="1" dirty="0">
-                  <a:solidFill>
-                    <a:schemeClr val="tx1"/>
-                  </a:solidFill>
-                  <a:latin typeface="Times New Roman" pitchFamily="18" charset="0"/>
-                  <a:cs typeface="Times New Roman" pitchFamily="18" charset="0"/>
-                </a:rPr>
-                <a:t>x &lt; </a:t>
-              </a:r>
-              <a:r>
-                <a:rPr lang="en-US" sz="900" b="1" dirty="0">
-                  <a:solidFill>
-                    <a:schemeClr val="tx1"/>
-                  </a:solidFill>
-                  <a:latin typeface="Times New Roman" pitchFamily="18" charset="0"/>
-                  <a:cs typeface="Times New Roman" pitchFamily="18" charset="0"/>
-                </a:rPr>
-                <a:t>3</a:t>
-              </a:r>
-            </a:p>
-          </p:txBody>
-        </p:sp>
-        <p:sp>
-          <p:nvSpPr>
-            <p:cNvPr id="109" name="Rectangle 108"/>
-            <p:cNvSpPr/>
-            <p:nvPr/>
-          </p:nvSpPr>
-          <p:spPr>
-            <a:xfrm>
-              <a:off x="2669320" y="2514600"/>
-              <a:ext cx="607280" cy="228600"/>
-            </a:xfrm>
-            <a:prstGeom prst="rect">
-              <a:avLst/>
-            </a:prstGeom>
-            <a:solidFill>
-              <a:srgbClr val="FFB9B9"/>
-            </a:solidFill>
-            <a:ln w="12700">
-              <a:solidFill>
-                <a:schemeClr val="tx1"/>
-              </a:solidFill>
-            </a:ln>
-          </p:spPr>
-          <p:style>
-            <a:lnRef idx="2">
-              <a:schemeClr val="accent1">
-                <a:shade val="50000"/>
-              </a:schemeClr>
-            </a:lnRef>
-            <a:fillRef idx="1">
-              <a:schemeClr val="accent1"/>
-            </a:fillRef>
-            <a:effectRef idx="0">
-              <a:schemeClr val="accent1"/>
-            </a:effectRef>
-            <a:fontRef idx="minor">
-              <a:schemeClr val="lt1"/>
-            </a:fontRef>
-          </p:style>
-          <p:txBody>
-            <a:bodyPr lIns="0" tIns="0" rIns="0" bIns="0" rtlCol="0" anchor="ctr"/>
-            <a:lstStyle/>
-            <a:p>
-              <a:pPr algn="ctr"/>
-              <a:r>
-                <a:rPr lang="en-US" sz="900" b="1" dirty="0" smtClean="0">
-                  <a:solidFill>
-                    <a:schemeClr val="tx1"/>
-                  </a:solidFill>
-                  <a:latin typeface="Times New Roman" pitchFamily="18" charset="0"/>
-                  <a:cs typeface="Times New Roman" pitchFamily="18" charset="0"/>
-                </a:rPr>
-                <a:t>1 + 0.67</a:t>
-              </a:r>
-              <a:r>
-                <a:rPr lang="en-US" sz="900" b="1" i="1" dirty="0" smtClean="0">
-                  <a:solidFill>
-                    <a:schemeClr val="tx1"/>
-                  </a:solidFill>
-                  <a:latin typeface="Times New Roman" pitchFamily="18" charset="0"/>
-                  <a:cs typeface="Times New Roman" pitchFamily="18" charset="0"/>
-                </a:rPr>
-                <a:t>x</a:t>
-              </a:r>
-              <a:endParaRPr lang="en-US" sz="900" b="1" i="1" dirty="0">
+              </a:rPr>
+              <a:t>x &lt; </a:t>
+            </a:r>
+            <a:r>
+              <a:rPr lang="en-US" sz="900" b="1" dirty="0">
                 <a:solidFill>
                   <a:schemeClr val="tx1"/>
                 </a:solidFill>
                 <a:latin typeface="Times New Roman" pitchFamily="18" charset="0"/>
                 <a:cs typeface="Times New Roman" pitchFamily="18" charset="0"/>
-              </a:endParaRPr>
-            </a:p>
-          </p:txBody>
-        </p:sp>
-        <p:sp>
-          <p:nvSpPr>
-            <p:cNvPr id="110" name="Rectangle 109"/>
-            <p:cNvSpPr/>
-            <p:nvPr/>
-          </p:nvSpPr>
-          <p:spPr>
-            <a:xfrm>
-              <a:off x="3371850" y="2515887"/>
-              <a:ext cx="666750" cy="228600"/>
-            </a:xfrm>
-            <a:prstGeom prst="rect">
-              <a:avLst/>
-            </a:prstGeom>
+              </a:rPr>
+              <a:t>1</a:t>
+            </a:r>
+          </a:p>
+        </p:txBody>
+      </p:sp>
+      <p:sp>
+        <p:nvSpPr>
+          <p:cNvPr id="61" name="Oval 60"/>
+          <p:cNvSpPr/>
+          <p:nvPr/>
+        </p:nvSpPr>
+        <p:spPr>
+          <a:xfrm>
+            <a:off x="723860" y="1834633"/>
+            <a:ext cx="457201" cy="266700"/>
+          </a:xfrm>
+          <a:prstGeom prst="ellipse">
+            <a:avLst/>
+          </a:prstGeom>
+          <a:solidFill>
+            <a:srgbClr val="C1EEF7"/>
+          </a:solidFill>
+          <a:ln w="12700">
             <a:solidFill>
-              <a:srgbClr val="FFB9B9"/>
+              <a:schemeClr val="tx1"/>
             </a:solidFill>
-            <a:ln w="12700">
-              <a:solidFill>
-                <a:schemeClr val="tx1"/>
-              </a:solidFill>
-            </a:ln>
-          </p:spPr>
-          <p:style>
-            <a:lnRef idx="2">
-              <a:schemeClr val="accent1">
-                <a:shade val="50000"/>
-              </a:schemeClr>
-            </a:lnRef>
-            <a:fillRef idx="1">
-              <a:schemeClr val="accent1"/>
-            </a:fillRef>
-            <a:effectRef idx="0">
-              <a:schemeClr val="accent1"/>
-            </a:effectRef>
-            <a:fontRef idx="minor">
-              <a:schemeClr val="lt1"/>
-            </a:fontRef>
-          </p:style>
-          <p:txBody>
-            <a:bodyPr lIns="0" tIns="0" rIns="0" bIns="0" rtlCol="0" anchor="ctr"/>
-            <a:lstStyle/>
-            <a:p>
-              <a:pPr algn="ctr"/>
-              <a:r>
-                <a:rPr lang="en-US" sz="900" b="1" dirty="0" smtClean="0">
-                  <a:solidFill>
-                    <a:schemeClr val="tx1"/>
-                  </a:solidFill>
-                  <a:latin typeface="Times New Roman" pitchFamily="18" charset="0"/>
-                  <a:cs typeface="Times New Roman" pitchFamily="18" charset="0"/>
-                </a:rPr>
-                <a:t>3.8 </a:t>
-              </a:r>
-              <a:r>
-                <a:rPr lang="en-US" sz="900" b="1" dirty="0">
-                  <a:solidFill>
-                    <a:schemeClr val="tx1"/>
-                  </a:solidFill>
-                  <a:latin typeface="Times New Roman" pitchFamily="18" charset="0"/>
-                  <a:cs typeface="Times New Roman" pitchFamily="18" charset="0"/>
-                </a:rPr>
-                <a:t>– </a:t>
-              </a:r>
-              <a:r>
-                <a:rPr lang="en-US" sz="900" b="1" dirty="0" smtClean="0">
-                  <a:solidFill>
-                    <a:schemeClr val="tx1"/>
-                  </a:solidFill>
-                  <a:latin typeface="Times New Roman" pitchFamily="18" charset="0"/>
-                  <a:cs typeface="Times New Roman" pitchFamily="18" charset="0"/>
-                </a:rPr>
-                <a:t>0.27</a:t>
-              </a:r>
-              <a:r>
-                <a:rPr lang="en-US" sz="900" b="1" i="1" dirty="0" smtClean="0">
-                  <a:solidFill>
-                    <a:schemeClr val="tx1"/>
-                  </a:solidFill>
-                  <a:latin typeface="Times New Roman" pitchFamily="18" charset="0"/>
-                  <a:cs typeface="Times New Roman" pitchFamily="18" charset="0"/>
-                </a:rPr>
-                <a:t>x</a:t>
-              </a:r>
-              <a:endParaRPr lang="en-US" sz="900" b="1" i="1" dirty="0">
+          </a:ln>
+        </p:spPr>
+        <p:style>
+          <a:lnRef idx="2">
+            <a:schemeClr val="accent5">
+              <a:shade val="50000"/>
+            </a:schemeClr>
+          </a:lnRef>
+          <a:fillRef idx="1">
+            <a:schemeClr val="accent5"/>
+          </a:fillRef>
+          <a:effectRef idx="0">
+            <a:schemeClr val="accent5"/>
+          </a:effectRef>
+          <a:fontRef idx="minor">
+            <a:schemeClr val="lt1"/>
+          </a:fontRef>
+        </p:style>
+        <p:txBody>
+          <a:bodyPr lIns="0" tIns="0" rIns="0" bIns="0" rtlCol="0" anchor="ctr"/>
+          <a:lstStyle/>
+          <a:p>
+            <a:pPr algn="ctr"/>
+            <a:r>
+              <a:rPr lang="en-US" sz="900" b="1" i="1" dirty="0">
                 <a:solidFill>
                   <a:schemeClr val="tx1"/>
                 </a:solidFill>
                 <a:latin typeface="Times New Roman" pitchFamily="18" charset="0"/>
                 <a:cs typeface="Times New Roman" pitchFamily="18" charset="0"/>
-              </a:endParaRPr>
-            </a:p>
-          </p:txBody>
-        </p:sp>
-        <p:cxnSp>
-          <p:nvCxnSpPr>
-            <p:cNvPr id="113" name="Straight Arrow Connector 112"/>
-            <p:cNvCxnSpPr>
-              <a:endCxn id="109" idx="0"/>
-            </p:cNvCxnSpPr>
-            <p:nvPr/>
-          </p:nvCxnSpPr>
-          <p:spPr>
-            <a:xfrm flipH="1">
-              <a:off x="2972960" y="2247900"/>
-              <a:ext cx="303640" cy="266700"/>
-            </a:xfrm>
-            <a:prstGeom prst="straightConnector1">
-              <a:avLst/>
-            </a:prstGeom>
-            <a:ln w="12700">
-              <a:solidFill>
-                <a:schemeClr val="tx1"/>
-              </a:solidFill>
-              <a:tailEnd type="triangle" w="med" len="med"/>
-            </a:ln>
-          </p:spPr>
-          <p:style>
-            <a:lnRef idx="1">
-              <a:schemeClr val="accent1"/>
-            </a:lnRef>
-            <a:fillRef idx="0">
-              <a:schemeClr val="accent1"/>
-            </a:fillRef>
-            <a:effectRef idx="0">
-              <a:schemeClr val="accent1"/>
-            </a:effectRef>
-            <a:fontRef idx="minor">
-              <a:schemeClr val="tx1"/>
-            </a:fontRef>
-          </p:style>
-        </p:cxnSp>
-        <p:cxnSp>
-          <p:nvCxnSpPr>
-            <p:cNvPr id="125" name="Straight Arrow Connector 124"/>
-            <p:cNvCxnSpPr>
-              <a:endCxn id="110" idx="0"/>
-            </p:cNvCxnSpPr>
-            <p:nvPr/>
-          </p:nvCxnSpPr>
-          <p:spPr>
-            <a:xfrm>
-              <a:off x="3405188" y="2252663"/>
-              <a:ext cx="300037" cy="263224"/>
-            </a:xfrm>
-            <a:prstGeom prst="straightConnector1">
-              <a:avLst/>
-            </a:prstGeom>
-            <a:ln w="12700">
-              <a:solidFill>
-                <a:schemeClr val="tx1"/>
-              </a:solidFill>
-              <a:prstDash val="sysDash"/>
-              <a:tailEnd type="triangle" w="med" len="med"/>
-            </a:ln>
-          </p:spPr>
-          <p:style>
-            <a:lnRef idx="1">
-              <a:schemeClr val="accent1"/>
-            </a:lnRef>
-            <a:fillRef idx="0">
-              <a:schemeClr val="accent1"/>
-            </a:fillRef>
-            <a:effectRef idx="0">
-              <a:schemeClr val="accent1"/>
-            </a:effectRef>
-            <a:fontRef idx="minor">
-              <a:schemeClr val="tx1"/>
-            </a:fontRef>
-          </p:style>
-        </p:cxnSp>
-        <p:sp>
-          <p:nvSpPr>
-            <p:cNvPr id="156" name="TextBox 155"/>
-            <p:cNvSpPr txBox="1"/>
-            <p:nvPr/>
-          </p:nvSpPr>
-          <p:spPr>
-            <a:xfrm>
-              <a:off x="2095151" y="77912"/>
-              <a:ext cx="571849" cy="307777"/>
-            </a:xfrm>
-            <a:prstGeom prst="rect">
-              <a:avLst/>
-            </a:prstGeom>
-            <a:noFill/>
-          </p:spPr>
-          <p:txBody>
-            <a:bodyPr wrap="square" rtlCol="0">
-              <a:spAutoFit/>
-            </a:bodyPr>
-            <a:lstStyle/>
-            <a:p>
-              <a:r>
-                <a:rPr lang="en-US" sz="1400" dirty="0" smtClean="0">
-                  <a:latin typeface="Times New Roman" pitchFamily="18" charset="0"/>
-                  <a:cs typeface="Times New Roman" pitchFamily="18" charset="0"/>
-                </a:rPr>
-                <a:t>(b)</a:t>
-              </a:r>
-              <a:endParaRPr lang="en-US" sz="1400" dirty="0">
-                <a:latin typeface="Times New Roman" pitchFamily="18" charset="0"/>
-                <a:cs typeface="Times New Roman" pitchFamily="18" charset="0"/>
-              </a:endParaRPr>
-            </a:p>
-          </p:txBody>
-        </p:sp>
-        <p:cxnSp>
-          <p:nvCxnSpPr>
-            <p:cNvPr id="160" name="Elbow Connector 159"/>
-            <p:cNvCxnSpPr/>
-            <p:nvPr/>
-          </p:nvCxnSpPr>
-          <p:spPr>
-            <a:xfrm flipV="1">
-              <a:off x="2819400" y="721157"/>
-              <a:ext cx="381000" cy="228600"/>
-            </a:xfrm>
-            <a:prstGeom prst="bentConnector3">
-              <a:avLst/>
-            </a:prstGeom>
-            <a:ln w="15875">
-              <a:prstDash val="sysDot"/>
-            </a:ln>
-          </p:spPr>
-          <p:style>
-            <a:lnRef idx="1">
-              <a:schemeClr val="accent1"/>
-            </a:lnRef>
-            <a:fillRef idx="0">
-              <a:schemeClr val="accent1"/>
-            </a:fillRef>
-            <a:effectRef idx="0">
-              <a:schemeClr val="accent1"/>
-            </a:effectRef>
-            <a:fontRef idx="minor">
-              <a:schemeClr val="tx1"/>
-            </a:fontRef>
-          </p:style>
-        </p:cxnSp>
-        <p:cxnSp>
-          <p:nvCxnSpPr>
-            <p:cNvPr id="161" name="Elbow Connector 160"/>
-            <p:cNvCxnSpPr/>
-            <p:nvPr/>
-          </p:nvCxnSpPr>
-          <p:spPr>
-            <a:xfrm flipV="1">
-              <a:off x="3009900" y="494616"/>
-              <a:ext cx="381000" cy="228600"/>
-            </a:xfrm>
-            <a:prstGeom prst="bentConnector3">
-              <a:avLst/>
-            </a:prstGeom>
-            <a:ln w="15875">
-              <a:prstDash val="sysDot"/>
-            </a:ln>
-          </p:spPr>
-          <p:style>
-            <a:lnRef idx="1">
-              <a:schemeClr val="accent1"/>
-            </a:lnRef>
-            <a:fillRef idx="0">
-              <a:schemeClr val="accent1"/>
-            </a:fillRef>
-            <a:effectRef idx="0">
-              <a:schemeClr val="accent1"/>
-            </a:effectRef>
-            <a:fontRef idx="minor">
-              <a:schemeClr val="tx1"/>
-            </a:fontRef>
-          </p:style>
-        </p:cxnSp>
-        <p:cxnSp>
-          <p:nvCxnSpPr>
-            <p:cNvPr id="162" name="Elbow Connector 161"/>
-            <p:cNvCxnSpPr/>
-            <p:nvPr/>
-          </p:nvCxnSpPr>
-          <p:spPr>
-            <a:xfrm>
-              <a:off x="3276600" y="494616"/>
-              <a:ext cx="281035" cy="59724"/>
-            </a:xfrm>
-            <a:prstGeom prst="bentConnector3">
-              <a:avLst>
-                <a:gd name="adj1" fmla="val 50000"/>
-              </a:avLst>
-            </a:prstGeom>
-            <a:ln w="15875">
-              <a:prstDash val="sysDot"/>
-            </a:ln>
-          </p:spPr>
-          <p:style>
-            <a:lnRef idx="1">
-              <a:schemeClr val="accent1"/>
-            </a:lnRef>
-            <a:fillRef idx="0">
-              <a:schemeClr val="accent1"/>
-            </a:fillRef>
-            <a:effectRef idx="0">
-              <a:schemeClr val="accent1"/>
-            </a:effectRef>
-            <a:fontRef idx="minor">
-              <a:schemeClr val="tx1"/>
-            </a:fontRef>
-          </p:style>
-        </p:cxnSp>
-        <p:cxnSp>
-          <p:nvCxnSpPr>
-            <p:cNvPr id="163" name="Elbow Connector 162"/>
-            <p:cNvCxnSpPr/>
-            <p:nvPr/>
-          </p:nvCxnSpPr>
-          <p:spPr>
-            <a:xfrm>
-              <a:off x="3422209" y="554340"/>
-              <a:ext cx="383929" cy="59209"/>
-            </a:xfrm>
-            <a:prstGeom prst="bentConnector3">
-              <a:avLst>
-                <a:gd name="adj1" fmla="val 50000"/>
-              </a:avLst>
-            </a:prstGeom>
-            <a:ln w="15875">
-              <a:prstDash val="sysDot"/>
-            </a:ln>
-          </p:spPr>
-          <p:style>
-            <a:lnRef idx="1">
-              <a:schemeClr val="accent1"/>
-            </a:lnRef>
-            <a:fillRef idx="0">
-              <a:schemeClr val="accent1"/>
-            </a:fillRef>
-            <a:effectRef idx="0">
-              <a:schemeClr val="accent1"/>
-            </a:effectRef>
-            <a:fontRef idx="minor">
-              <a:schemeClr val="tx1"/>
-            </a:fontRef>
-          </p:style>
-        </p:cxnSp>
-        <p:sp>
-          <p:nvSpPr>
-            <p:cNvPr id="164" name="Rectangle 163"/>
-            <p:cNvSpPr/>
-            <p:nvPr/>
-          </p:nvSpPr>
-          <p:spPr>
-            <a:xfrm>
-              <a:off x="1905000" y="2863333"/>
-              <a:ext cx="266699" cy="228600"/>
-            </a:xfrm>
-            <a:prstGeom prst="rect">
-              <a:avLst/>
-            </a:prstGeom>
-            <a:solidFill>
-              <a:srgbClr val="FFB9B9"/>
-            </a:solidFill>
-            <a:ln w="12700">
-              <a:solidFill>
-                <a:schemeClr val="tx1"/>
-              </a:solidFill>
-            </a:ln>
-          </p:spPr>
-          <p:style>
-            <a:lnRef idx="2">
-              <a:schemeClr val="accent1">
-                <a:shade val="50000"/>
-              </a:schemeClr>
-            </a:lnRef>
-            <a:fillRef idx="1">
-              <a:schemeClr val="accent1"/>
-            </a:fillRef>
-            <a:effectRef idx="0">
-              <a:schemeClr val="accent1"/>
-            </a:effectRef>
-            <a:fontRef idx="minor">
-              <a:schemeClr val="lt1"/>
-            </a:fontRef>
-          </p:style>
-          <p:txBody>
-            <a:bodyPr lIns="0" tIns="0" rIns="0" bIns="0" rtlCol="0" anchor="ctr"/>
-            <a:lstStyle/>
-            <a:p>
-              <a:pPr algn="ctr"/>
-              <a:r>
-                <a:rPr lang="en-US" sz="900" b="1" dirty="0" smtClean="0">
-                  <a:solidFill>
-                    <a:schemeClr val="tx1"/>
-                  </a:solidFill>
-                  <a:latin typeface="Times New Roman" pitchFamily="18" charset="0"/>
-                  <a:cs typeface="Times New Roman" pitchFamily="18" charset="0"/>
-                </a:rPr>
-                <a:t>2.5</a:t>
-              </a:r>
-              <a:endParaRPr lang="en-US" sz="900" b="1" dirty="0">
+              </a:rPr>
+              <a:t>x &lt; </a:t>
+            </a:r>
+            <a:r>
+              <a:rPr lang="en-US" sz="900" b="1" dirty="0">
                 <a:solidFill>
                   <a:schemeClr val="tx1"/>
                 </a:solidFill>
                 <a:latin typeface="Times New Roman" pitchFamily="18" charset="0"/>
                 <a:cs typeface="Times New Roman" pitchFamily="18" charset="0"/>
-              </a:endParaRPr>
-            </a:p>
-          </p:txBody>
-        </p:sp>
-      </p:grpSp>
+              </a:rPr>
+              <a:t>2</a:t>
+            </a:r>
+          </a:p>
+        </p:txBody>
+      </p:sp>
+      <p:sp>
+        <p:nvSpPr>
+          <p:cNvPr id="62" name="Oval 61"/>
+          <p:cNvSpPr/>
+          <p:nvPr/>
+        </p:nvSpPr>
+        <p:spPr>
+          <a:xfrm>
+            <a:off x="1111731" y="2146942"/>
+            <a:ext cx="457201" cy="266700"/>
+          </a:xfrm>
+          <a:prstGeom prst="ellipse">
+            <a:avLst/>
+          </a:prstGeom>
+          <a:solidFill>
+            <a:srgbClr val="C1EEF7"/>
+          </a:solidFill>
+          <a:ln w="12700">
+            <a:solidFill>
+              <a:schemeClr val="tx1"/>
+            </a:solidFill>
+          </a:ln>
+        </p:spPr>
+        <p:style>
+          <a:lnRef idx="2">
+            <a:schemeClr val="accent5">
+              <a:shade val="50000"/>
+            </a:schemeClr>
+          </a:lnRef>
+          <a:fillRef idx="1">
+            <a:schemeClr val="accent5"/>
+          </a:fillRef>
+          <a:effectRef idx="0">
+            <a:schemeClr val="accent5"/>
+          </a:effectRef>
+          <a:fontRef idx="minor">
+            <a:schemeClr val="lt1"/>
+          </a:fontRef>
+        </p:style>
+        <p:txBody>
+          <a:bodyPr lIns="0" tIns="0" rIns="0" bIns="0" rtlCol="0" anchor="ctr"/>
+          <a:lstStyle/>
+          <a:p>
+            <a:pPr algn="ctr"/>
+            <a:r>
+              <a:rPr lang="en-US" sz="900" b="1" i="1" dirty="0">
+                <a:solidFill>
+                  <a:schemeClr val="tx1"/>
+                </a:solidFill>
+                <a:latin typeface="Times New Roman" pitchFamily="18" charset="0"/>
+                <a:cs typeface="Times New Roman" pitchFamily="18" charset="0"/>
+              </a:rPr>
+              <a:t>x &lt; </a:t>
+            </a:r>
+            <a:r>
+              <a:rPr lang="en-US" sz="900" b="1" dirty="0">
+                <a:solidFill>
+                  <a:schemeClr val="tx1"/>
+                </a:solidFill>
+                <a:latin typeface="Times New Roman" pitchFamily="18" charset="0"/>
+                <a:cs typeface="Times New Roman" pitchFamily="18" charset="0"/>
+              </a:rPr>
+              <a:t>3</a:t>
+            </a:r>
+          </a:p>
+        </p:txBody>
+      </p:sp>
+      <p:sp>
+        <p:nvSpPr>
+          <p:cNvPr id="63" name="Oval 62"/>
+          <p:cNvSpPr/>
+          <p:nvPr/>
+        </p:nvSpPr>
+        <p:spPr>
+          <a:xfrm>
+            <a:off x="1494828" y="2443929"/>
+            <a:ext cx="457201" cy="266700"/>
+          </a:xfrm>
+          <a:prstGeom prst="ellipse">
+            <a:avLst/>
+          </a:prstGeom>
+          <a:solidFill>
+            <a:srgbClr val="C1EEF7"/>
+          </a:solidFill>
+          <a:ln w="12700">
+            <a:solidFill>
+              <a:schemeClr val="tx1"/>
+            </a:solidFill>
+          </a:ln>
+        </p:spPr>
+        <p:style>
+          <a:lnRef idx="2">
+            <a:schemeClr val="accent5">
+              <a:shade val="50000"/>
+            </a:schemeClr>
+          </a:lnRef>
+          <a:fillRef idx="1">
+            <a:schemeClr val="accent5"/>
+          </a:fillRef>
+          <a:effectRef idx="0">
+            <a:schemeClr val="accent5"/>
+          </a:effectRef>
+          <a:fontRef idx="minor">
+            <a:schemeClr val="lt1"/>
+          </a:fontRef>
+        </p:style>
+        <p:txBody>
+          <a:bodyPr lIns="0" tIns="0" rIns="0" bIns="0" rtlCol="0" anchor="ctr"/>
+          <a:lstStyle/>
+          <a:p>
+            <a:pPr algn="ctr"/>
+            <a:r>
+              <a:rPr lang="en-US" sz="900" b="1" i="1" dirty="0">
+                <a:solidFill>
+                  <a:schemeClr val="tx1"/>
+                </a:solidFill>
+                <a:latin typeface="Times New Roman" pitchFamily="18" charset="0"/>
+                <a:cs typeface="Times New Roman" pitchFamily="18" charset="0"/>
+              </a:rPr>
+              <a:t>x </a:t>
+            </a:r>
+            <a:r>
+              <a:rPr lang="en-US" sz="900" b="1" i="1" dirty="0" smtClean="0">
+                <a:solidFill>
+                  <a:schemeClr val="tx1"/>
+                </a:solidFill>
+                <a:latin typeface="Times New Roman" pitchFamily="18" charset="0"/>
+                <a:cs typeface="Times New Roman" pitchFamily="18" charset="0"/>
+              </a:rPr>
+              <a:t>&lt; </a:t>
+            </a:r>
+            <a:r>
+              <a:rPr lang="en-US" sz="900" b="1" dirty="0">
+                <a:solidFill>
+                  <a:schemeClr val="tx1"/>
+                </a:solidFill>
+                <a:latin typeface="Times New Roman" pitchFamily="18" charset="0"/>
+                <a:cs typeface="Times New Roman" pitchFamily="18" charset="0"/>
+              </a:rPr>
+              <a:t>4</a:t>
+            </a:r>
+          </a:p>
+        </p:txBody>
+      </p:sp>
+      <p:sp>
+        <p:nvSpPr>
+          <p:cNvPr id="64" name="Rectangle 63"/>
+          <p:cNvSpPr/>
+          <p:nvPr/>
+        </p:nvSpPr>
+        <p:spPr>
+          <a:xfrm>
+            <a:off x="228600" y="2863333"/>
+            <a:ext cx="266699" cy="228600"/>
+          </a:xfrm>
+          <a:prstGeom prst="rect">
+            <a:avLst/>
+          </a:prstGeom>
+          <a:solidFill>
+            <a:srgbClr val="FFB9B9"/>
+          </a:solidFill>
+          <a:ln w="12700">
+            <a:solidFill>
+              <a:schemeClr val="tx1"/>
+            </a:solidFill>
+          </a:ln>
+        </p:spPr>
+        <p:style>
+          <a:lnRef idx="2">
+            <a:schemeClr val="accent1">
+              <a:shade val="50000"/>
+            </a:schemeClr>
+          </a:lnRef>
+          <a:fillRef idx="1">
+            <a:schemeClr val="accent1"/>
+          </a:fillRef>
+          <a:effectRef idx="0">
+            <a:schemeClr val="accent1"/>
+          </a:effectRef>
+          <a:fontRef idx="minor">
+            <a:schemeClr val="lt1"/>
+          </a:fontRef>
+        </p:style>
+        <p:txBody>
+          <a:bodyPr lIns="0" tIns="0" rIns="0" bIns="0" rtlCol="0" anchor="ctr"/>
+          <a:lstStyle/>
+          <a:p>
+            <a:pPr algn="ctr"/>
+            <a:r>
+              <a:rPr lang="en-US" sz="900" b="1" dirty="0">
+                <a:solidFill>
+                  <a:schemeClr val="tx1"/>
+                </a:solidFill>
+                <a:latin typeface="Times New Roman" pitchFamily="18" charset="0"/>
+                <a:cs typeface="Times New Roman" pitchFamily="18" charset="0"/>
+              </a:rPr>
+              <a:t>1</a:t>
+            </a:r>
+          </a:p>
+        </p:txBody>
+      </p:sp>
+      <p:sp>
+        <p:nvSpPr>
+          <p:cNvPr id="65" name="Rectangle 64"/>
+          <p:cNvSpPr/>
+          <p:nvPr/>
+        </p:nvSpPr>
+        <p:spPr>
+          <a:xfrm>
+            <a:off x="676865" y="2863333"/>
+            <a:ext cx="266699" cy="228600"/>
+          </a:xfrm>
+          <a:prstGeom prst="rect">
+            <a:avLst/>
+          </a:prstGeom>
+          <a:solidFill>
+            <a:srgbClr val="FFB9B9"/>
+          </a:solidFill>
+          <a:ln w="12700">
+            <a:solidFill>
+              <a:schemeClr val="tx1"/>
+            </a:solidFill>
+          </a:ln>
+        </p:spPr>
+        <p:style>
+          <a:lnRef idx="2">
+            <a:schemeClr val="accent1">
+              <a:shade val="50000"/>
+            </a:schemeClr>
+          </a:lnRef>
+          <a:fillRef idx="1">
+            <a:schemeClr val="accent1"/>
+          </a:fillRef>
+          <a:effectRef idx="0">
+            <a:schemeClr val="accent1"/>
+          </a:effectRef>
+          <a:fontRef idx="minor">
+            <a:schemeClr val="lt1"/>
+          </a:fontRef>
+        </p:style>
+        <p:txBody>
+          <a:bodyPr lIns="0" tIns="0" rIns="0" bIns="0" rtlCol="0" anchor="ctr"/>
+          <a:lstStyle/>
+          <a:p>
+            <a:pPr algn="ctr"/>
+            <a:r>
+              <a:rPr lang="en-US" sz="900" b="1" dirty="0">
+                <a:solidFill>
+                  <a:schemeClr val="tx1"/>
+                </a:solidFill>
+                <a:latin typeface="Times New Roman" pitchFamily="18" charset="0"/>
+                <a:cs typeface="Times New Roman" pitchFamily="18" charset="0"/>
+              </a:rPr>
+              <a:t>2</a:t>
+            </a:r>
+          </a:p>
+        </p:txBody>
+      </p:sp>
+      <p:sp>
+        <p:nvSpPr>
+          <p:cNvPr id="66" name="Rectangle 65"/>
+          <p:cNvSpPr/>
+          <p:nvPr/>
+        </p:nvSpPr>
+        <p:spPr>
+          <a:xfrm>
+            <a:off x="1125130" y="2863333"/>
+            <a:ext cx="266699" cy="228600"/>
+          </a:xfrm>
+          <a:prstGeom prst="rect">
+            <a:avLst/>
+          </a:prstGeom>
+          <a:solidFill>
+            <a:srgbClr val="FFB9B9"/>
+          </a:solidFill>
+          <a:ln w="12700">
+            <a:solidFill>
+              <a:schemeClr val="tx1"/>
+            </a:solidFill>
+          </a:ln>
+        </p:spPr>
+        <p:style>
+          <a:lnRef idx="2">
+            <a:schemeClr val="accent1">
+              <a:shade val="50000"/>
+            </a:schemeClr>
+          </a:lnRef>
+          <a:fillRef idx="1">
+            <a:schemeClr val="accent1"/>
+          </a:fillRef>
+          <a:effectRef idx="0">
+            <a:schemeClr val="accent1"/>
+          </a:effectRef>
+          <a:fontRef idx="minor">
+            <a:schemeClr val="lt1"/>
+          </a:fontRef>
+        </p:style>
+        <p:txBody>
+          <a:bodyPr lIns="0" tIns="0" rIns="0" bIns="0" rtlCol="0" anchor="ctr"/>
+          <a:lstStyle/>
+          <a:p>
+            <a:pPr algn="ctr"/>
+            <a:r>
+              <a:rPr lang="en-US" sz="900" b="1" dirty="0">
+                <a:solidFill>
+                  <a:schemeClr val="tx1"/>
+                </a:solidFill>
+                <a:latin typeface="Times New Roman" pitchFamily="18" charset="0"/>
+                <a:cs typeface="Times New Roman" pitchFamily="18" charset="0"/>
+              </a:rPr>
+              <a:t>3</a:t>
+            </a:r>
+          </a:p>
+        </p:txBody>
+      </p:sp>
+      <p:sp>
+        <p:nvSpPr>
+          <p:cNvPr id="67" name="Rectangle 66"/>
+          <p:cNvSpPr/>
+          <p:nvPr/>
+        </p:nvSpPr>
+        <p:spPr>
+          <a:xfrm>
+            <a:off x="1573395" y="2863333"/>
+            <a:ext cx="300627" cy="228600"/>
+          </a:xfrm>
+          <a:prstGeom prst="rect">
+            <a:avLst/>
+          </a:prstGeom>
+          <a:solidFill>
+            <a:srgbClr val="FFB9B9"/>
+          </a:solidFill>
+          <a:ln w="12700">
+            <a:solidFill>
+              <a:schemeClr val="tx1"/>
+            </a:solidFill>
+          </a:ln>
+        </p:spPr>
+        <p:style>
+          <a:lnRef idx="2">
+            <a:schemeClr val="accent1">
+              <a:shade val="50000"/>
+            </a:schemeClr>
+          </a:lnRef>
+          <a:fillRef idx="1">
+            <a:schemeClr val="accent1"/>
+          </a:fillRef>
+          <a:effectRef idx="0">
+            <a:schemeClr val="accent1"/>
+          </a:effectRef>
+          <a:fontRef idx="minor">
+            <a:schemeClr val="lt1"/>
+          </a:fontRef>
+        </p:style>
+        <p:txBody>
+          <a:bodyPr lIns="0" tIns="0" rIns="0" bIns="0" rtlCol="0" anchor="ctr"/>
+          <a:lstStyle/>
+          <a:p>
+            <a:pPr algn="ctr"/>
+            <a:r>
+              <a:rPr lang="en-US" sz="900" b="1" dirty="0" smtClean="0">
+                <a:solidFill>
+                  <a:schemeClr val="tx1"/>
+                </a:solidFill>
+                <a:latin typeface="Times New Roman" pitchFamily="18" charset="0"/>
+                <a:cs typeface="Times New Roman" pitchFamily="18" charset="0"/>
+              </a:rPr>
+              <a:t>2.75</a:t>
+            </a:r>
+            <a:endParaRPr lang="en-US" sz="900" b="1" dirty="0">
+              <a:solidFill>
+                <a:schemeClr val="tx1"/>
+              </a:solidFill>
+              <a:latin typeface="Times New Roman" pitchFamily="18" charset="0"/>
+              <a:cs typeface="Times New Roman" pitchFamily="18" charset="0"/>
+            </a:endParaRPr>
+          </a:p>
+        </p:txBody>
+      </p:sp>
+      <p:cxnSp>
+        <p:nvCxnSpPr>
+          <p:cNvPr id="69" name="Straight Arrow Connector 68"/>
+          <p:cNvCxnSpPr>
+            <a:stCxn id="58" idx="4"/>
+            <a:endCxn id="64" idx="0"/>
+          </p:cNvCxnSpPr>
+          <p:nvPr/>
+        </p:nvCxnSpPr>
+        <p:spPr>
+          <a:xfrm flipH="1">
+            <a:off x="361950" y="1790700"/>
+            <a:ext cx="251613" cy="1072633"/>
+          </a:xfrm>
+          <a:prstGeom prst="straightConnector1">
+            <a:avLst/>
+          </a:prstGeom>
+          <a:ln w="12700">
+            <a:solidFill>
+              <a:schemeClr val="tx1"/>
+            </a:solidFill>
+            <a:tailEnd type="triangle" w="med" len="med"/>
+          </a:ln>
+        </p:spPr>
+        <p:style>
+          <a:lnRef idx="1">
+            <a:schemeClr val="accent1"/>
+          </a:lnRef>
+          <a:fillRef idx="0">
+            <a:schemeClr val="accent1"/>
+          </a:fillRef>
+          <a:effectRef idx="0">
+            <a:schemeClr val="accent1"/>
+          </a:effectRef>
+          <a:fontRef idx="minor">
+            <a:schemeClr val="tx1"/>
+          </a:fontRef>
+        </p:style>
+      </p:cxnSp>
+      <p:cxnSp>
+        <p:nvCxnSpPr>
+          <p:cNvPr id="70" name="Straight Arrow Connector 69"/>
+          <p:cNvCxnSpPr>
+            <a:stCxn id="61" idx="4"/>
+            <a:endCxn id="65" idx="0"/>
+          </p:cNvCxnSpPr>
+          <p:nvPr/>
+        </p:nvCxnSpPr>
+        <p:spPr>
+          <a:xfrm flipH="1">
+            <a:off x="810215" y="2101333"/>
+            <a:ext cx="142246" cy="762000"/>
+          </a:xfrm>
+          <a:prstGeom prst="straightConnector1">
+            <a:avLst/>
+          </a:prstGeom>
+          <a:ln w="12700">
+            <a:solidFill>
+              <a:schemeClr val="tx1"/>
+            </a:solidFill>
+            <a:tailEnd type="triangle" w="med" len="med"/>
+          </a:ln>
+        </p:spPr>
+        <p:style>
+          <a:lnRef idx="1">
+            <a:schemeClr val="accent1"/>
+          </a:lnRef>
+          <a:fillRef idx="0">
+            <a:schemeClr val="accent1"/>
+          </a:fillRef>
+          <a:effectRef idx="0">
+            <a:schemeClr val="accent1"/>
+          </a:effectRef>
+          <a:fontRef idx="minor">
+            <a:schemeClr val="tx1"/>
+          </a:fontRef>
+        </p:style>
+      </p:cxnSp>
+      <p:cxnSp>
+        <p:nvCxnSpPr>
+          <p:cNvPr id="72" name="Straight Arrow Connector 71"/>
+          <p:cNvCxnSpPr>
+            <a:stCxn id="62" idx="4"/>
+            <a:endCxn id="66" idx="0"/>
+          </p:cNvCxnSpPr>
+          <p:nvPr/>
+        </p:nvCxnSpPr>
+        <p:spPr>
+          <a:xfrm flipH="1">
+            <a:off x="1258480" y="2413642"/>
+            <a:ext cx="81852" cy="449691"/>
+          </a:xfrm>
+          <a:prstGeom prst="straightConnector1">
+            <a:avLst/>
+          </a:prstGeom>
+          <a:ln w="12700">
+            <a:solidFill>
+              <a:schemeClr val="tx1"/>
+            </a:solidFill>
+            <a:tailEnd type="triangle" w="med" len="med"/>
+          </a:ln>
+        </p:spPr>
+        <p:style>
+          <a:lnRef idx="1">
+            <a:schemeClr val="accent1"/>
+          </a:lnRef>
+          <a:fillRef idx="0">
+            <a:schemeClr val="accent1"/>
+          </a:fillRef>
+          <a:effectRef idx="0">
+            <a:schemeClr val="accent1"/>
+          </a:effectRef>
+          <a:fontRef idx="minor">
+            <a:schemeClr val="tx1"/>
+          </a:fontRef>
+        </p:style>
+      </p:cxnSp>
+      <p:cxnSp>
+        <p:nvCxnSpPr>
+          <p:cNvPr id="75" name="Straight Arrow Connector 74"/>
+          <p:cNvCxnSpPr/>
+          <p:nvPr/>
+        </p:nvCxnSpPr>
+        <p:spPr>
+          <a:xfrm>
+            <a:off x="1874022" y="2681288"/>
+            <a:ext cx="316728" cy="176212"/>
+          </a:xfrm>
+          <a:prstGeom prst="straightConnector1">
+            <a:avLst/>
+          </a:prstGeom>
+          <a:ln w="12700">
+            <a:solidFill>
+              <a:schemeClr val="tx1"/>
+            </a:solidFill>
+            <a:prstDash val="sysDash"/>
+            <a:tailEnd type="triangle" w="med" len="med"/>
+          </a:ln>
+        </p:spPr>
+        <p:style>
+          <a:lnRef idx="1">
+            <a:schemeClr val="accent1"/>
+          </a:lnRef>
+          <a:fillRef idx="0">
+            <a:schemeClr val="accent1"/>
+          </a:fillRef>
+          <a:effectRef idx="0">
+            <a:schemeClr val="accent1"/>
+          </a:effectRef>
+          <a:fontRef idx="minor">
+            <a:schemeClr val="tx1"/>
+          </a:fontRef>
+        </p:style>
+      </p:cxnSp>
+      <p:cxnSp>
+        <p:nvCxnSpPr>
+          <p:cNvPr id="77" name="Straight Arrow Connector 76"/>
+          <p:cNvCxnSpPr/>
+          <p:nvPr/>
+        </p:nvCxnSpPr>
+        <p:spPr>
+          <a:xfrm flipH="1">
+            <a:off x="1688443" y="2714625"/>
+            <a:ext cx="33179" cy="142875"/>
+          </a:xfrm>
+          <a:prstGeom prst="straightConnector1">
+            <a:avLst/>
+          </a:prstGeom>
+          <a:ln w="12700">
+            <a:solidFill>
+              <a:schemeClr val="tx1"/>
+            </a:solidFill>
+            <a:prstDash val="solid"/>
+            <a:tailEnd type="triangle" w="med" len="med"/>
+          </a:ln>
+        </p:spPr>
+        <p:style>
+          <a:lnRef idx="1">
+            <a:schemeClr val="accent1"/>
+          </a:lnRef>
+          <a:fillRef idx="0">
+            <a:schemeClr val="accent1"/>
+          </a:fillRef>
+          <a:effectRef idx="0">
+            <a:schemeClr val="accent1"/>
+          </a:effectRef>
+          <a:fontRef idx="minor">
+            <a:schemeClr val="tx1"/>
+          </a:fontRef>
+        </p:style>
+      </p:cxnSp>
+      <p:cxnSp>
+        <p:nvCxnSpPr>
+          <p:cNvPr id="80" name="Straight Arrow Connector 79"/>
+          <p:cNvCxnSpPr/>
+          <p:nvPr/>
+        </p:nvCxnSpPr>
+        <p:spPr>
+          <a:xfrm>
+            <a:off x="1543864" y="2348468"/>
+            <a:ext cx="189471" cy="98854"/>
+          </a:xfrm>
+          <a:prstGeom prst="straightConnector1">
+            <a:avLst/>
+          </a:prstGeom>
+          <a:ln w="12700">
+            <a:solidFill>
+              <a:schemeClr val="tx1"/>
+            </a:solidFill>
+            <a:prstDash val="sysDash"/>
+            <a:tailEnd type="triangle" w="med" len="med"/>
+          </a:ln>
+        </p:spPr>
+        <p:style>
+          <a:lnRef idx="1">
+            <a:schemeClr val="accent1"/>
+          </a:lnRef>
+          <a:fillRef idx="0">
+            <a:schemeClr val="accent1"/>
+          </a:fillRef>
+          <a:effectRef idx="0">
+            <a:schemeClr val="accent1"/>
+          </a:effectRef>
+          <a:fontRef idx="minor">
+            <a:schemeClr val="tx1"/>
+          </a:fontRef>
+        </p:style>
+      </p:cxnSp>
+      <p:cxnSp>
+        <p:nvCxnSpPr>
+          <p:cNvPr id="83" name="Straight Arrow Connector 82"/>
+          <p:cNvCxnSpPr/>
+          <p:nvPr/>
+        </p:nvCxnSpPr>
+        <p:spPr>
+          <a:xfrm>
+            <a:off x="1164924" y="2035430"/>
+            <a:ext cx="205946" cy="123568"/>
+          </a:xfrm>
+          <a:prstGeom prst="straightConnector1">
+            <a:avLst/>
+          </a:prstGeom>
+          <a:ln w="12700">
+            <a:solidFill>
+              <a:schemeClr val="tx1"/>
+            </a:solidFill>
+            <a:prstDash val="sysDash"/>
+            <a:tailEnd type="triangle" w="med" len="med"/>
+          </a:ln>
+        </p:spPr>
+        <p:style>
+          <a:lnRef idx="1">
+            <a:schemeClr val="accent1"/>
+          </a:lnRef>
+          <a:fillRef idx="0">
+            <a:schemeClr val="accent1"/>
+          </a:fillRef>
+          <a:effectRef idx="0">
+            <a:schemeClr val="accent1"/>
+          </a:effectRef>
+          <a:fontRef idx="minor">
+            <a:schemeClr val="tx1"/>
+          </a:fontRef>
+        </p:style>
+      </p:cxnSp>
+      <p:cxnSp>
+        <p:nvCxnSpPr>
+          <p:cNvPr id="85" name="Straight Arrow Connector 84"/>
+          <p:cNvCxnSpPr/>
+          <p:nvPr/>
+        </p:nvCxnSpPr>
+        <p:spPr>
+          <a:xfrm>
+            <a:off x="790816" y="1730629"/>
+            <a:ext cx="184638" cy="115331"/>
+          </a:xfrm>
+          <a:prstGeom prst="straightConnector1">
+            <a:avLst/>
+          </a:prstGeom>
+          <a:ln w="12700">
+            <a:solidFill>
+              <a:schemeClr val="tx1"/>
+            </a:solidFill>
+            <a:prstDash val="sysDash"/>
+            <a:tailEnd type="triangle" w="med" len="med"/>
+          </a:ln>
+        </p:spPr>
+        <p:style>
+          <a:lnRef idx="1">
+            <a:schemeClr val="accent1"/>
+          </a:lnRef>
+          <a:fillRef idx="0">
+            <a:schemeClr val="accent1"/>
+          </a:fillRef>
+          <a:effectRef idx="0">
+            <a:schemeClr val="accent1"/>
+          </a:effectRef>
+          <a:fontRef idx="minor">
+            <a:schemeClr val="tx1"/>
+          </a:fontRef>
+        </p:style>
+      </p:cxnSp>
+      <p:sp>
+        <p:nvSpPr>
+          <p:cNvPr id="105" name="Oval 104"/>
+          <p:cNvSpPr/>
+          <p:nvPr/>
+        </p:nvSpPr>
+        <p:spPr>
+          <a:xfrm>
+            <a:off x="3265431" y="1982157"/>
+            <a:ext cx="457201" cy="266700"/>
+          </a:xfrm>
+          <a:prstGeom prst="ellipse">
+            <a:avLst/>
+          </a:prstGeom>
+          <a:solidFill>
+            <a:srgbClr val="C1EEF7"/>
+          </a:solidFill>
+          <a:ln w="12700">
+            <a:solidFill>
+              <a:schemeClr val="tx1"/>
+            </a:solidFill>
+          </a:ln>
+        </p:spPr>
+        <p:style>
+          <a:lnRef idx="2">
+            <a:schemeClr val="accent5">
+              <a:shade val="50000"/>
+            </a:schemeClr>
+          </a:lnRef>
+          <a:fillRef idx="1">
+            <a:schemeClr val="accent5"/>
+          </a:fillRef>
+          <a:effectRef idx="0">
+            <a:schemeClr val="accent5"/>
+          </a:effectRef>
+          <a:fontRef idx="minor">
+            <a:schemeClr val="lt1"/>
+          </a:fontRef>
+        </p:style>
+        <p:txBody>
+          <a:bodyPr lIns="0" tIns="0" rIns="0" bIns="0" rtlCol="0" anchor="ctr"/>
+          <a:lstStyle/>
+          <a:p>
+            <a:pPr algn="ctr"/>
+            <a:r>
+              <a:rPr lang="en-US" sz="900" b="1" i="1" dirty="0">
+                <a:solidFill>
+                  <a:schemeClr val="tx1"/>
+                </a:solidFill>
+                <a:latin typeface="Times New Roman" pitchFamily="18" charset="0"/>
+                <a:cs typeface="Times New Roman" pitchFamily="18" charset="0"/>
+              </a:rPr>
+              <a:t>x &lt; </a:t>
+            </a:r>
+            <a:r>
+              <a:rPr lang="en-US" sz="900" b="1" dirty="0">
+                <a:solidFill>
+                  <a:schemeClr val="tx1"/>
+                </a:solidFill>
+                <a:latin typeface="Times New Roman" pitchFamily="18" charset="0"/>
+                <a:cs typeface="Times New Roman" pitchFamily="18" charset="0"/>
+              </a:rPr>
+              <a:t>3</a:t>
+            </a:r>
+          </a:p>
+        </p:txBody>
+      </p:sp>
+      <p:sp>
+        <p:nvSpPr>
+          <p:cNvPr id="109" name="Rectangle 108"/>
+          <p:cNvSpPr/>
+          <p:nvPr/>
+        </p:nvSpPr>
+        <p:spPr>
+          <a:xfrm>
+            <a:off x="2821720" y="2514600"/>
+            <a:ext cx="607280" cy="228600"/>
+          </a:xfrm>
+          <a:prstGeom prst="rect">
+            <a:avLst/>
+          </a:prstGeom>
+          <a:solidFill>
+            <a:srgbClr val="FFB9B9"/>
+          </a:solidFill>
+          <a:ln w="12700">
+            <a:solidFill>
+              <a:schemeClr val="tx1"/>
+            </a:solidFill>
+          </a:ln>
+        </p:spPr>
+        <p:style>
+          <a:lnRef idx="2">
+            <a:schemeClr val="accent1">
+              <a:shade val="50000"/>
+            </a:schemeClr>
+          </a:lnRef>
+          <a:fillRef idx="1">
+            <a:schemeClr val="accent1"/>
+          </a:fillRef>
+          <a:effectRef idx="0">
+            <a:schemeClr val="accent1"/>
+          </a:effectRef>
+          <a:fontRef idx="minor">
+            <a:schemeClr val="lt1"/>
+          </a:fontRef>
+        </p:style>
+        <p:txBody>
+          <a:bodyPr lIns="0" tIns="0" rIns="0" bIns="0" rtlCol="0" anchor="ctr"/>
+          <a:lstStyle/>
+          <a:p>
+            <a:pPr algn="ctr"/>
+            <a:r>
+              <a:rPr lang="en-US" sz="900" b="1" dirty="0" smtClean="0">
+                <a:solidFill>
+                  <a:schemeClr val="tx1"/>
+                </a:solidFill>
+                <a:latin typeface="Times New Roman" pitchFamily="18" charset="0"/>
+                <a:cs typeface="Times New Roman" pitchFamily="18" charset="0"/>
+              </a:rPr>
+              <a:t>1 + 0.67</a:t>
+            </a:r>
+            <a:r>
+              <a:rPr lang="en-US" sz="900" b="1" i="1" dirty="0" smtClean="0">
+                <a:solidFill>
+                  <a:schemeClr val="tx1"/>
+                </a:solidFill>
+                <a:latin typeface="Times New Roman" pitchFamily="18" charset="0"/>
+                <a:cs typeface="Times New Roman" pitchFamily="18" charset="0"/>
+              </a:rPr>
+              <a:t>x</a:t>
+            </a:r>
+            <a:endParaRPr lang="en-US" sz="900" b="1" i="1" dirty="0">
+              <a:solidFill>
+                <a:schemeClr val="tx1"/>
+              </a:solidFill>
+              <a:latin typeface="Times New Roman" pitchFamily="18" charset="0"/>
+              <a:cs typeface="Times New Roman" pitchFamily="18" charset="0"/>
+            </a:endParaRPr>
+          </a:p>
+        </p:txBody>
+      </p:sp>
+      <p:sp>
+        <p:nvSpPr>
+          <p:cNvPr id="110" name="Rectangle 109"/>
+          <p:cNvSpPr/>
+          <p:nvPr/>
+        </p:nvSpPr>
+        <p:spPr>
+          <a:xfrm>
+            <a:off x="3524250" y="2515887"/>
+            <a:ext cx="666750" cy="228600"/>
+          </a:xfrm>
+          <a:prstGeom prst="rect">
+            <a:avLst/>
+          </a:prstGeom>
+          <a:solidFill>
+            <a:srgbClr val="FFB9B9"/>
+          </a:solidFill>
+          <a:ln w="12700">
+            <a:solidFill>
+              <a:schemeClr val="tx1"/>
+            </a:solidFill>
+          </a:ln>
+        </p:spPr>
+        <p:style>
+          <a:lnRef idx="2">
+            <a:schemeClr val="accent1">
+              <a:shade val="50000"/>
+            </a:schemeClr>
+          </a:lnRef>
+          <a:fillRef idx="1">
+            <a:schemeClr val="accent1"/>
+          </a:fillRef>
+          <a:effectRef idx="0">
+            <a:schemeClr val="accent1"/>
+          </a:effectRef>
+          <a:fontRef idx="minor">
+            <a:schemeClr val="lt1"/>
+          </a:fontRef>
+        </p:style>
+        <p:txBody>
+          <a:bodyPr lIns="0" tIns="0" rIns="0" bIns="0" rtlCol="0" anchor="ctr"/>
+          <a:lstStyle/>
+          <a:p>
+            <a:pPr algn="ctr"/>
+            <a:r>
+              <a:rPr lang="en-US" sz="900" b="1" dirty="0" smtClean="0">
+                <a:solidFill>
+                  <a:schemeClr val="tx1"/>
+                </a:solidFill>
+                <a:latin typeface="Times New Roman" pitchFamily="18" charset="0"/>
+                <a:cs typeface="Times New Roman" pitchFamily="18" charset="0"/>
+              </a:rPr>
+              <a:t>3.8 </a:t>
+            </a:r>
+            <a:r>
+              <a:rPr lang="en-US" sz="900" b="1" dirty="0">
+                <a:solidFill>
+                  <a:schemeClr val="tx1"/>
+                </a:solidFill>
+                <a:latin typeface="Times New Roman" pitchFamily="18" charset="0"/>
+                <a:cs typeface="Times New Roman" pitchFamily="18" charset="0"/>
+              </a:rPr>
+              <a:t>– </a:t>
+            </a:r>
+            <a:r>
+              <a:rPr lang="en-US" sz="900" b="1" dirty="0" smtClean="0">
+                <a:solidFill>
+                  <a:schemeClr val="tx1"/>
+                </a:solidFill>
+                <a:latin typeface="Times New Roman" pitchFamily="18" charset="0"/>
+                <a:cs typeface="Times New Roman" pitchFamily="18" charset="0"/>
+              </a:rPr>
+              <a:t>0.27</a:t>
+            </a:r>
+            <a:r>
+              <a:rPr lang="en-US" sz="900" b="1" i="1" dirty="0" smtClean="0">
+                <a:solidFill>
+                  <a:schemeClr val="tx1"/>
+                </a:solidFill>
+                <a:latin typeface="Times New Roman" pitchFamily="18" charset="0"/>
+                <a:cs typeface="Times New Roman" pitchFamily="18" charset="0"/>
+              </a:rPr>
+              <a:t>x</a:t>
+            </a:r>
+            <a:endParaRPr lang="en-US" sz="900" b="1" i="1" dirty="0">
+              <a:solidFill>
+                <a:schemeClr val="tx1"/>
+              </a:solidFill>
+              <a:latin typeface="Times New Roman" pitchFamily="18" charset="0"/>
+              <a:cs typeface="Times New Roman" pitchFamily="18" charset="0"/>
+            </a:endParaRPr>
+          </a:p>
+        </p:txBody>
+      </p:sp>
+      <p:cxnSp>
+        <p:nvCxnSpPr>
+          <p:cNvPr id="113" name="Straight Arrow Connector 112"/>
+          <p:cNvCxnSpPr>
+            <a:endCxn id="109" idx="0"/>
+          </p:cNvCxnSpPr>
+          <p:nvPr/>
+        </p:nvCxnSpPr>
+        <p:spPr>
+          <a:xfrm flipH="1">
+            <a:off x="3125360" y="2247900"/>
+            <a:ext cx="303640" cy="266700"/>
+          </a:xfrm>
+          <a:prstGeom prst="straightConnector1">
+            <a:avLst/>
+          </a:prstGeom>
+          <a:ln w="12700">
+            <a:solidFill>
+              <a:schemeClr val="tx1"/>
+            </a:solidFill>
+            <a:tailEnd type="triangle" w="med" len="med"/>
+          </a:ln>
+        </p:spPr>
+        <p:style>
+          <a:lnRef idx="1">
+            <a:schemeClr val="accent1"/>
+          </a:lnRef>
+          <a:fillRef idx="0">
+            <a:schemeClr val="accent1"/>
+          </a:fillRef>
+          <a:effectRef idx="0">
+            <a:schemeClr val="accent1"/>
+          </a:effectRef>
+          <a:fontRef idx="minor">
+            <a:schemeClr val="tx1"/>
+          </a:fontRef>
+        </p:style>
+      </p:cxnSp>
+      <p:cxnSp>
+        <p:nvCxnSpPr>
+          <p:cNvPr id="125" name="Straight Arrow Connector 124"/>
+          <p:cNvCxnSpPr>
+            <a:endCxn id="110" idx="0"/>
+          </p:cNvCxnSpPr>
+          <p:nvPr/>
+        </p:nvCxnSpPr>
+        <p:spPr>
+          <a:xfrm>
+            <a:off x="3557588" y="2252663"/>
+            <a:ext cx="300037" cy="263224"/>
+          </a:xfrm>
+          <a:prstGeom prst="straightConnector1">
+            <a:avLst/>
+          </a:prstGeom>
+          <a:ln w="12700">
+            <a:solidFill>
+              <a:schemeClr val="tx1"/>
+            </a:solidFill>
+            <a:prstDash val="sysDash"/>
+            <a:tailEnd type="triangle" w="med" len="med"/>
+          </a:ln>
+        </p:spPr>
+        <p:style>
+          <a:lnRef idx="1">
+            <a:schemeClr val="accent1"/>
+          </a:lnRef>
+          <a:fillRef idx="0">
+            <a:schemeClr val="accent1"/>
+          </a:fillRef>
+          <a:effectRef idx="0">
+            <a:schemeClr val="accent1"/>
+          </a:effectRef>
+          <a:fontRef idx="minor">
+            <a:schemeClr val="tx1"/>
+          </a:fontRef>
+        </p:style>
+      </p:cxnSp>
+      <p:sp>
+        <p:nvSpPr>
+          <p:cNvPr id="156" name="TextBox 155"/>
+          <p:cNvSpPr txBox="1"/>
+          <p:nvPr/>
+        </p:nvSpPr>
+        <p:spPr>
+          <a:xfrm>
+            <a:off x="2247551" y="77912"/>
+            <a:ext cx="571849" cy="307777"/>
+          </a:xfrm>
+          <a:prstGeom prst="rect">
+            <a:avLst/>
+          </a:prstGeom>
+          <a:noFill/>
+        </p:spPr>
+        <p:txBody>
+          <a:bodyPr wrap="square" rtlCol="0">
+            <a:spAutoFit/>
+          </a:bodyPr>
+          <a:lstStyle/>
+          <a:p>
+            <a:r>
+              <a:rPr lang="en-US" sz="1400" dirty="0" smtClean="0">
+                <a:latin typeface="Times New Roman" pitchFamily="18" charset="0"/>
+                <a:cs typeface="Times New Roman" pitchFamily="18" charset="0"/>
+              </a:rPr>
+              <a:t>(b)</a:t>
+            </a:r>
+            <a:endParaRPr lang="en-US" sz="1400" dirty="0">
+              <a:latin typeface="Times New Roman" pitchFamily="18" charset="0"/>
+              <a:cs typeface="Times New Roman" pitchFamily="18" charset="0"/>
+            </a:endParaRPr>
+          </a:p>
+        </p:txBody>
+      </p:sp>
+      <p:sp>
+        <p:nvSpPr>
+          <p:cNvPr id="164" name="Rectangle 163"/>
+          <p:cNvSpPr/>
+          <p:nvPr/>
+        </p:nvSpPr>
+        <p:spPr>
+          <a:xfrm>
+            <a:off x="2057400" y="2863333"/>
+            <a:ext cx="266699" cy="228600"/>
+          </a:xfrm>
+          <a:prstGeom prst="rect">
+            <a:avLst/>
+          </a:prstGeom>
+          <a:solidFill>
+            <a:srgbClr val="FFB9B9"/>
+          </a:solidFill>
+          <a:ln w="12700">
+            <a:solidFill>
+              <a:schemeClr val="tx1"/>
+            </a:solidFill>
+          </a:ln>
+        </p:spPr>
+        <p:style>
+          <a:lnRef idx="2">
+            <a:schemeClr val="accent1">
+              <a:shade val="50000"/>
+            </a:schemeClr>
+          </a:lnRef>
+          <a:fillRef idx="1">
+            <a:schemeClr val="accent1"/>
+          </a:fillRef>
+          <a:effectRef idx="0">
+            <a:schemeClr val="accent1"/>
+          </a:effectRef>
+          <a:fontRef idx="minor">
+            <a:schemeClr val="lt1"/>
+          </a:fontRef>
+        </p:style>
+        <p:txBody>
+          <a:bodyPr lIns="0" tIns="0" rIns="0" bIns="0" rtlCol="0" anchor="ctr"/>
+          <a:lstStyle/>
+          <a:p>
+            <a:pPr algn="ctr"/>
+            <a:r>
+              <a:rPr lang="en-US" sz="900" b="1" dirty="0" smtClean="0">
+                <a:solidFill>
+                  <a:schemeClr val="tx1"/>
+                </a:solidFill>
+                <a:latin typeface="Times New Roman" pitchFamily="18" charset="0"/>
+                <a:cs typeface="Times New Roman" pitchFamily="18" charset="0"/>
+              </a:rPr>
+              <a:t>2.5</a:t>
+            </a:r>
+            <a:endParaRPr lang="en-US" sz="900" b="1" dirty="0">
+              <a:solidFill>
+                <a:schemeClr val="tx1"/>
+              </a:solidFill>
+              <a:latin typeface="Times New Roman" pitchFamily="18" charset="0"/>
+              <a:cs typeface="Times New Roman" pitchFamily="18" charset="0"/>
+            </a:endParaRPr>
+          </a:p>
+        </p:txBody>
+      </p:sp>
     </p:spTree>
     <p:extLst>
       <p:ext uri="{BB962C8B-B14F-4D97-AF65-F5344CB8AC3E}">

</xml_diff>